<commit_message>
Updated to correct number of risk factors 62
</commit_message>
<xml_diff>
--- a/20250321-SAG-CTR.pptx
+++ b/20250321-SAG-CTR.pptx
@@ -537,7 +537,7 @@
           <a:noFill/>
           <a:extLst>
             <a:ext uri="{909E8E84-426E-40dd-AFC4-6F175D3DCCD1}">
-              <a14:hiddenFill xmlns:a14="http://schemas.microsoft.com/office/drawing/2010/main" xmlns="">
+              <a14:hiddenFill xmlns="" xmlns:a14="http://schemas.microsoft.com/office/drawing/2010/main">
                 <a:solidFill>
                   <a:srgbClr val="FFFFFF"/>
                 </a:solidFill>
@@ -597,7 +597,7 @@
             </a:ln>
             <a:extLst>
               <a:ext uri="{91240B29-F687-4f45-9708-019B960494DF}">
-                <a14:hiddenLine xmlns:a14="http://schemas.microsoft.com/office/drawing/2010/main" xmlns="" w="9525">
+                <a14:hiddenLine xmlns="" xmlns:a14="http://schemas.microsoft.com/office/drawing/2010/main" w="9525">
                   <a:solidFill>
                     <a:srgbClr val="000000"/>
                   </a:solidFill>
@@ -687,7 +687,7 @@
             </a:ln>
             <a:extLst>
               <a:ext uri="{91240B29-F687-4f45-9708-019B960494DF}">
-                <a14:hiddenLine xmlns:a14="http://schemas.microsoft.com/office/drawing/2010/main" xmlns="" w="9525">
+                <a14:hiddenLine xmlns="" xmlns:a14="http://schemas.microsoft.com/office/drawing/2010/main" w="9525">
                   <a:solidFill>
                     <a:srgbClr val="000000"/>
                   </a:solidFill>
@@ -777,7 +777,7 @@
             </a:ln>
             <a:extLst>
               <a:ext uri="{91240B29-F687-4f45-9708-019B960494DF}">
-                <a14:hiddenLine xmlns:a14="http://schemas.microsoft.com/office/drawing/2010/main" xmlns="" w="9525">
+                <a14:hiddenLine xmlns="" xmlns:a14="http://schemas.microsoft.com/office/drawing/2010/main" w="9525">
                   <a:solidFill>
                     <a:srgbClr val="000000"/>
                   </a:solidFill>
@@ -811,7 +811,7 @@
             </a:ln>
             <a:extLst>
               <a:ext uri="{91240B29-F687-4f45-9708-019B960494DF}">
-                <a14:hiddenLine xmlns:a14="http://schemas.microsoft.com/office/drawing/2010/main" xmlns="" w="9525">
+                <a14:hiddenLine xmlns="" xmlns:a14="http://schemas.microsoft.com/office/drawing/2010/main" w="9525">
                   <a:solidFill>
                     <a:srgbClr val="000000"/>
                   </a:solidFill>
@@ -901,7 +901,7 @@
             </a:ln>
             <a:extLst>
               <a:ext uri="{91240B29-F687-4f45-9708-019B960494DF}">
-                <a14:hiddenLine xmlns:a14="http://schemas.microsoft.com/office/drawing/2010/main" xmlns="" w="9525">
+                <a14:hiddenLine xmlns="" xmlns:a14="http://schemas.microsoft.com/office/drawing/2010/main" w="9525">
                   <a:solidFill>
                     <a:srgbClr val="000000"/>
                   </a:solidFill>
@@ -963,7 +963,7 @@
             </a:ln>
             <a:extLst>
               <a:ext uri="{91240B29-F687-4f45-9708-019B960494DF}">
-                <a14:hiddenLine xmlns:a14="http://schemas.microsoft.com/office/drawing/2010/main" xmlns="" w="9525">
+                <a14:hiddenLine xmlns="" xmlns:a14="http://schemas.microsoft.com/office/drawing/2010/main" w="9525">
                   <a:solidFill>
                     <a:srgbClr val="000000"/>
                   </a:solidFill>
@@ -1025,7 +1025,7 @@
             </a:ln>
             <a:extLst>
               <a:ext uri="{91240B29-F687-4f45-9708-019B960494DF}">
-                <a14:hiddenLine xmlns:a14="http://schemas.microsoft.com/office/drawing/2010/main" xmlns="" w="9525">
+                <a14:hiddenLine xmlns="" xmlns:a14="http://schemas.microsoft.com/office/drawing/2010/main" w="9525">
                   <a:solidFill>
                     <a:srgbClr val="000000"/>
                   </a:solidFill>
@@ -1115,7 +1115,7 @@
             </a:ln>
             <a:extLst>
               <a:ext uri="{91240B29-F687-4f45-9708-019B960494DF}">
-                <a14:hiddenLine xmlns:a14="http://schemas.microsoft.com/office/drawing/2010/main" xmlns="" w="9525">
+                <a14:hiddenLine xmlns="" xmlns:a14="http://schemas.microsoft.com/office/drawing/2010/main" w="9525">
                   <a:solidFill>
                     <a:srgbClr val="000000"/>
                   </a:solidFill>
@@ -1177,7 +1177,7 @@
             </a:ln>
             <a:extLst>
               <a:ext uri="{91240B29-F687-4f45-9708-019B960494DF}">
-                <a14:hiddenLine xmlns:a14="http://schemas.microsoft.com/office/drawing/2010/main" xmlns="" w="9525">
+                <a14:hiddenLine xmlns="" xmlns:a14="http://schemas.microsoft.com/office/drawing/2010/main" w="9525">
                   <a:solidFill>
                     <a:srgbClr val="000000"/>
                   </a:solidFill>
@@ -1239,7 +1239,7 @@
             </a:ln>
             <a:extLst>
               <a:ext uri="{91240B29-F687-4f45-9708-019B960494DF}">
-                <a14:hiddenLine xmlns:a14="http://schemas.microsoft.com/office/drawing/2010/main" xmlns="" w="9525">
+                <a14:hiddenLine xmlns="" xmlns:a14="http://schemas.microsoft.com/office/drawing/2010/main" w="9525">
                   <a:solidFill>
                     <a:srgbClr val="000000"/>
                   </a:solidFill>
@@ -1329,7 +1329,7 @@
             </a:ln>
             <a:extLst>
               <a:ext uri="{91240B29-F687-4f45-9708-019B960494DF}">
-                <a14:hiddenLine xmlns:a14="http://schemas.microsoft.com/office/drawing/2010/main" xmlns="" w="9525">
+                <a14:hiddenLine xmlns="" xmlns:a14="http://schemas.microsoft.com/office/drawing/2010/main" w="9525">
                   <a:solidFill>
                     <a:srgbClr val="000000"/>
                   </a:solidFill>
@@ -1419,7 +1419,7 @@
             </a:ln>
             <a:extLst>
               <a:ext uri="{91240B29-F687-4f45-9708-019B960494DF}">
-                <a14:hiddenLine xmlns:a14="http://schemas.microsoft.com/office/drawing/2010/main" xmlns="" w="9525">
+                <a14:hiddenLine xmlns="" xmlns:a14="http://schemas.microsoft.com/office/drawing/2010/main" w="9525">
                   <a:solidFill>
                     <a:srgbClr val="000000"/>
                   </a:solidFill>
@@ -1481,7 +1481,7 @@
             </a:ln>
             <a:extLst>
               <a:ext uri="{91240B29-F687-4f45-9708-019B960494DF}">
-                <a14:hiddenLine xmlns:a14="http://schemas.microsoft.com/office/drawing/2010/main" xmlns="" w="9525">
+                <a14:hiddenLine xmlns="" xmlns:a14="http://schemas.microsoft.com/office/drawing/2010/main" w="9525">
                   <a:solidFill>
                     <a:srgbClr val="000000"/>
                   </a:solidFill>
@@ -1591,7 +1591,7 @@
             </a:ln>
             <a:extLst>
               <a:ext uri="{91240B29-F687-4f45-9708-019B960494DF}">
-                <a14:hiddenLine xmlns:a14="http://schemas.microsoft.com/office/drawing/2010/main" xmlns="" w="9525">
+                <a14:hiddenLine xmlns="" xmlns:a14="http://schemas.microsoft.com/office/drawing/2010/main" w="9525">
                   <a:solidFill>
                     <a:srgbClr val="000000"/>
                   </a:solidFill>
@@ -1653,7 +1653,7 @@
             </a:ln>
             <a:extLst>
               <a:ext uri="{91240B29-F687-4f45-9708-019B960494DF}">
-                <a14:hiddenLine xmlns:a14="http://schemas.microsoft.com/office/drawing/2010/main" xmlns="" w="9525">
+                <a14:hiddenLine xmlns="" xmlns:a14="http://schemas.microsoft.com/office/drawing/2010/main" w="9525">
                   <a:solidFill>
                     <a:srgbClr val="000000"/>
                   </a:solidFill>
@@ -1743,7 +1743,7 @@
             </a:ln>
             <a:extLst>
               <a:ext uri="{91240B29-F687-4f45-9708-019B960494DF}">
-                <a14:hiddenLine xmlns:a14="http://schemas.microsoft.com/office/drawing/2010/main" xmlns="" w="9525">
+                <a14:hiddenLine xmlns="" xmlns:a14="http://schemas.microsoft.com/office/drawing/2010/main" w="9525">
                   <a:solidFill>
                     <a:srgbClr val="000000"/>
                   </a:solidFill>
@@ -1833,7 +1833,7 @@
             </a:ln>
             <a:extLst>
               <a:ext uri="{91240B29-F687-4f45-9708-019B960494DF}">
-                <a14:hiddenLine xmlns:a14="http://schemas.microsoft.com/office/drawing/2010/main" xmlns="" w="9525">
+                <a14:hiddenLine xmlns="" xmlns:a14="http://schemas.microsoft.com/office/drawing/2010/main" w="9525">
                   <a:solidFill>
                     <a:srgbClr val="000000"/>
                   </a:solidFill>
@@ -1895,7 +1895,7 @@
             </a:ln>
             <a:extLst>
               <a:ext uri="{91240B29-F687-4f45-9708-019B960494DF}">
-                <a14:hiddenLine xmlns:a14="http://schemas.microsoft.com/office/drawing/2010/main" xmlns="" w="9525">
+                <a14:hiddenLine xmlns="" xmlns:a14="http://schemas.microsoft.com/office/drawing/2010/main" w="9525">
                   <a:solidFill>
                     <a:srgbClr val="000000"/>
                   </a:solidFill>
@@ -1985,7 +1985,7 @@
             </a:ln>
             <a:extLst>
               <a:ext uri="{91240B29-F687-4f45-9708-019B960494DF}">
-                <a14:hiddenLine xmlns:a14="http://schemas.microsoft.com/office/drawing/2010/main" xmlns="" w="9525">
+                <a14:hiddenLine xmlns="" xmlns:a14="http://schemas.microsoft.com/office/drawing/2010/main" w="9525">
                   <a:solidFill>
                     <a:srgbClr val="000000"/>
                   </a:solidFill>
@@ -2075,7 +2075,7 @@
             </a:ln>
             <a:extLst>
               <a:ext uri="{91240B29-F687-4f45-9708-019B960494DF}">
-                <a14:hiddenLine xmlns:a14="http://schemas.microsoft.com/office/drawing/2010/main" xmlns="" w="9525">
+                <a14:hiddenLine xmlns="" xmlns:a14="http://schemas.microsoft.com/office/drawing/2010/main" w="9525">
                   <a:solidFill>
                     <a:srgbClr val="000000"/>
                   </a:solidFill>
@@ -2131,7 +2131,7 @@
             </a:ln>
             <a:extLst>
               <a:ext uri="{91240B29-F687-4f45-9708-019B960494DF}">
-                <a14:hiddenLine xmlns:a14="http://schemas.microsoft.com/office/drawing/2010/main" xmlns="" w="9525">
+                <a14:hiddenLine xmlns="" xmlns:a14="http://schemas.microsoft.com/office/drawing/2010/main" w="9525">
                   <a:solidFill>
                     <a:srgbClr val="000000"/>
                   </a:solidFill>
@@ -2221,7 +2221,7 @@
             </a:ln>
             <a:extLst>
               <a:ext uri="{91240B29-F687-4f45-9708-019B960494DF}">
-                <a14:hiddenLine xmlns:a14="http://schemas.microsoft.com/office/drawing/2010/main" xmlns="" w="9525">
+                <a14:hiddenLine xmlns="" xmlns:a14="http://schemas.microsoft.com/office/drawing/2010/main" w="9525">
                   <a:solidFill>
                     <a:srgbClr val="000000"/>
                   </a:solidFill>
@@ -2277,7 +2277,7 @@
             </a:ln>
             <a:extLst>
               <a:ext uri="{91240B29-F687-4f45-9708-019B960494DF}">
-                <a14:hiddenLine xmlns:a14="http://schemas.microsoft.com/office/drawing/2010/main" xmlns="" w="9525">
+                <a14:hiddenLine xmlns="" xmlns:a14="http://schemas.microsoft.com/office/drawing/2010/main" w="9525">
                   <a:solidFill>
                     <a:srgbClr val="000000"/>
                   </a:solidFill>
@@ -2367,7 +2367,7 @@
             </a:ln>
             <a:extLst>
               <a:ext uri="{91240B29-F687-4f45-9708-019B960494DF}">
-                <a14:hiddenLine xmlns:a14="http://schemas.microsoft.com/office/drawing/2010/main" xmlns="" w="9525">
+                <a14:hiddenLine xmlns="" xmlns:a14="http://schemas.microsoft.com/office/drawing/2010/main" w="9525">
                   <a:solidFill>
                     <a:srgbClr val="000000"/>
                   </a:solidFill>
@@ -2435,7 +2435,7 @@
             </a:ln>
             <a:extLst>
               <a:ext uri="{91240B29-F687-4f45-9708-019B960494DF}">
-                <a14:hiddenLine xmlns:a14="http://schemas.microsoft.com/office/drawing/2010/main" xmlns="" w="9525">
+                <a14:hiddenLine xmlns="" xmlns:a14="http://schemas.microsoft.com/office/drawing/2010/main" w="9525">
                   <a:solidFill>
                     <a:srgbClr val="000000"/>
                   </a:solidFill>
@@ -2525,7 +2525,7 @@
             </a:ln>
             <a:extLst>
               <a:ext uri="{91240B29-F687-4f45-9708-019B960494DF}">
-                <a14:hiddenLine xmlns:a14="http://schemas.microsoft.com/office/drawing/2010/main" xmlns="" w="9525">
+                <a14:hiddenLine xmlns="" xmlns:a14="http://schemas.microsoft.com/office/drawing/2010/main" w="9525">
                   <a:solidFill>
                     <a:srgbClr val="000000"/>
                   </a:solidFill>
@@ -2593,7 +2593,7 @@
             </a:ln>
             <a:extLst>
               <a:ext uri="{91240B29-F687-4f45-9708-019B960494DF}">
-                <a14:hiddenLine xmlns:a14="http://schemas.microsoft.com/office/drawing/2010/main" xmlns="" w="9525">
+                <a14:hiddenLine xmlns="" xmlns:a14="http://schemas.microsoft.com/office/drawing/2010/main" w="9525">
                   <a:solidFill>
                     <a:srgbClr val="000000"/>
                   </a:solidFill>
@@ -2683,7 +2683,7 @@
             </a:ln>
             <a:extLst>
               <a:ext uri="{91240B29-F687-4f45-9708-019B960494DF}">
-                <a14:hiddenLine xmlns:a14="http://schemas.microsoft.com/office/drawing/2010/main" xmlns="" w="9525">
+                <a14:hiddenLine xmlns="" xmlns:a14="http://schemas.microsoft.com/office/drawing/2010/main" w="9525">
                   <a:solidFill>
                     <a:srgbClr val="000000"/>
                   </a:solidFill>
@@ -2717,7 +2717,7 @@
             </a:ln>
             <a:extLst>
               <a:ext uri="{91240B29-F687-4f45-9708-019B960494DF}">
-                <a14:hiddenLine xmlns:a14="http://schemas.microsoft.com/office/drawing/2010/main" xmlns="" w="9525">
+                <a14:hiddenLine xmlns="" xmlns:a14="http://schemas.microsoft.com/office/drawing/2010/main" w="9525">
                   <a:solidFill>
                     <a:srgbClr val="000000"/>
                   </a:solidFill>
@@ -2807,7 +2807,7 @@
             </a:ln>
             <a:extLst>
               <a:ext uri="{91240B29-F687-4f45-9708-019B960494DF}">
-                <a14:hiddenLine xmlns:a14="http://schemas.microsoft.com/office/drawing/2010/main" xmlns="" w="9525">
+                <a14:hiddenLine xmlns="" xmlns:a14="http://schemas.microsoft.com/office/drawing/2010/main" w="9525">
                   <a:solidFill>
                     <a:srgbClr val="000000"/>
                   </a:solidFill>
@@ -2869,7 +2869,7 @@
             </a:ln>
             <a:extLst>
               <a:ext uri="{91240B29-F687-4f45-9708-019B960494DF}">
-                <a14:hiddenLine xmlns:a14="http://schemas.microsoft.com/office/drawing/2010/main" xmlns="" w="9525">
+                <a14:hiddenLine xmlns="" xmlns:a14="http://schemas.microsoft.com/office/drawing/2010/main" w="9525">
                   <a:solidFill>
                     <a:srgbClr val="000000"/>
                   </a:solidFill>
@@ -2931,7 +2931,7 @@
             </a:ln>
             <a:extLst>
               <a:ext uri="{91240B29-F687-4f45-9708-019B960494DF}">
-                <a14:hiddenLine xmlns:a14="http://schemas.microsoft.com/office/drawing/2010/main" xmlns="" w="9525">
+                <a14:hiddenLine xmlns="" xmlns:a14="http://schemas.microsoft.com/office/drawing/2010/main" w="9525">
                   <a:solidFill>
                     <a:srgbClr val="000000"/>
                   </a:solidFill>
@@ -3021,7 +3021,7 @@
             </a:ln>
             <a:extLst>
               <a:ext uri="{91240B29-F687-4f45-9708-019B960494DF}">
-                <a14:hiddenLine xmlns:a14="http://schemas.microsoft.com/office/drawing/2010/main" xmlns="" w="9525">
+                <a14:hiddenLine xmlns="" xmlns:a14="http://schemas.microsoft.com/office/drawing/2010/main" w="9525">
                   <a:solidFill>
                     <a:srgbClr val="000000"/>
                   </a:solidFill>
@@ -3089,7 +3089,7 @@
             </a:ln>
             <a:extLst>
               <a:ext uri="{91240B29-F687-4f45-9708-019B960494DF}">
-                <a14:hiddenLine xmlns:a14="http://schemas.microsoft.com/office/drawing/2010/main" xmlns="" w="9525">
+                <a14:hiddenLine xmlns="" xmlns:a14="http://schemas.microsoft.com/office/drawing/2010/main" w="9525">
                   <a:solidFill>
                     <a:srgbClr val="000000"/>
                   </a:solidFill>
@@ -3151,7 +3151,7 @@
             </a:ln>
             <a:extLst>
               <a:ext uri="{91240B29-F687-4f45-9708-019B960494DF}">
-                <a14:hiddenLine xmlns:a14="http://schemas.microsoft.com/office/drawing/2010/main" xmlns="" w="9525">
+                <a14:hiddenLine xmlns="" xmlns:a14="http://schemas.microsoft.com/office/drawing/2010/main" w="9525">
                   <a:solidFill>
                     <a:srgbClr val="000000"/>
                   </a:solidFill>
@@ -3241,7 +3241,7 @@
             </a:ln>
             <a:extLst>
               <a:ext uri="{91240B29-F687-4f45-9708-019B960494DF}">
-                <a14:hiddenLine xmlns:a14="http://schemas.microsoft.com/office/drawing/2010/main" xmlns="" w="9525">
+                <a14:hiddenLine xmlns="" xmlns:a14="http://schemas.microsoft.com/office/drawing/2010/main" w="9525">
                   <a:solidFill>
                     <a:srgbClr val="000000"/>
                   </a:solidFill>
@@ -3303,7 +3303,7 @@
             </a:ln>
             <a:extLst>
               <a:ext uri="{91240B29-F687-4f45-9708-019B960494DF}">
-                <a14:hiddenLine xmlns:a14="http://schemas.microsoft.com/office/drawing/2010/main" xmlns="" w="9525">
+                <a14:hiddenLine xmlns="" xmlns:a14="http://schemas.microsoft.com/office/drawing/2010/main" w="9525">
                   <a:solidFill>
                     <a:srgbClr val="000000"/>
                   </a:solidFill>
@@ -3393,7 +3393,7 @@
             </a:ln>
             <a:extLst>
               <a:ext uri="{91240B29-F687-4f45-9708-019B960494DF}">
-                <a14:hiddenLine xmlns:a14="http://schemas.microsoft.com/office/drawing/2010/main" xmlns="" w="9525">
+                <a14:hiddenLine xmlns="" xmlns:a14="http://schemas.microsoft.com/office/drawing/2010/main" w="9525">
                   <a:solidFill>
                     <a:srgbClr val="000000"/>
                   </a:solidFill>
@@ -3455,7 +3455,7 @@
             </a:ln>
             <a:extLst>
               <a:ext uri="{91240B29-F687-4f45-9708-019B960494DF}">
-                <a14:hiddenLine xmlns:a14="http://schemas.microsoft.com/office/drawing/2010/main" xmlns="" w="9525">
+                <a14:hiddenLine xmlns="" xmlns:a14="http://schemas.microsoft.com/office/drawing/2010/main" w="9525">
                   <a:solidFill>
                     <a:srgbClr val="000000"/>
                   </a:solidFill>
@@ -3545,7 +3545,7 @@
             </a:ln>
             <a:extLst>
               <a:ext uri="{91240B29-F687-4f45-9708-019B960494DF}">
-                <a14:hiddenLine xmlns:a14="http://schemas.microsoft.com/office/drawing/2010/main" xmlns="" w="9525">
+                <a14:hiddenLine xmlns="" xmlns:a14="http://schemas.microsoft.com/office/drawing/2010/main" w="9525">
                   <a:solidFill>
                     <a:srgbClr val="000000"/>
                   </a:solidFill>
@@ -3579,7 +3579,7 @@
             </a:ln>
             <a:extLst>
               <a:ext uri="{91240B29-F687-4f45-9708-019B960494DF}">
-                <a14:hiddenLine xmlns:a14="http://schemas.microsoft.com/office/drawing/2010/main" xmlns="" w="9525">
+                <a14:hiddenLine xmlns="" xmlns:a14="http://schemas.microsoft.com/office/drawing/2010/main" w="9525">
                   <a:solidFill>
                     <a:srgbClr val="000000"/>
                   </a:solidFill>
@@ -3644,7 +3644,7 @@
             </a:ln>
             <a:extLst>
               <a:ext uri="{91240B29-F687-4f45-9708-019B960494DF}">
-                <a14:hiddenLine xmlns:a14="http://schemas.microsoft.com/office/drawing/2010/main" xmlns="" w="9525">
+                <a14:hiddenLine xmlns="" xmlns:a14="http://schemas.microsoft.com/office/drawing/2010/main" w="9525">
                   <a:solidFill>
                     <a:srgbClr val="000000"/>
                   </a:solidFill>
@@ -3734,7 +3734,7 @@
             </a:ln>
             <a:extLst>
               <a:ext uri="{91240B29-F687-4f45-9708-019B960494DF}">
-                <a14:hiddenLine xmlns:a14="http://schemas.microsoft.com/office/drawing/2010/main" xmlns="" w="9525">
+                <a14:hiddenLine xmlns="" xmlns:a14="http://schemas.microsoft.com/office/drawing/2010/main" w="9525">
                   <a:solidFill>
                     <a:srgbClr val="000000"/>
                   </a:solidFill>
@@ -3796,7 +3796,7 @@
             </a:ln>
             <a:extLst>
               <a:ext uri="{91240B29-F687-4f45-9708-019B960494DF}">
-                <a14:hiddenLine xmlns:a14="http://schemas.microsoft.com/office/drawing/2010/main" xmlns="" w="9525">
+                <a14:hiddenLine xmlns="" xmlns:a14="http://schemas.microsoft.com/office/drawing/2010/main" w="9525">
                   <a:solidFill>
                     <a:srgbClr val="000000"/>
                   </a:solidFill>
@@ -3886,7 +3886,7 @@
             </a:ln>
             <a:extLst>
               <a:ext uri="{91240B29-F687-4f45-9708-019B960494DF}">
-                <a14:hiddenLine xmlns:a14="http://schemas.microsoft.com/office/drawing/2010/main" xmlns="" w="9525">
+                <a14:hiddenLine xmlns="" xmlns:a14="http://schemas.microsoft.com/office/drawing/2010/main" w="9525">
                   <a:solidFill>
                     <a:srgbClr val="000000"/>
                   </a:solidFill>
@@ -3976,7 +3976,7 @@
             </a:ln>
             <a:extLst>
               <a:ext uri="{91240B29-F687-4f45-9708-019B960494DF}">
-                <a14:hiddenLine xmlns:a14="http://schemas.microsoft.com/office/drawing/2010/main" xmlns="" w="9525">
+                <a14:hiddenLine xmlns="" xmlns:a14="http://schemas.microsoft.com/office/drawing/2010/main" w="9525">
                   <a:solidFill>
                     <a:srgbClr val="000000"/>
                   </a:solidFill>
@@ -4041,7 +4041,7 @@
             </a:ln>
             <a:extLst>
               <a:ext uri="{91240B29-F687-4f45-9708-019B960494DF}">
-                <a14:hiddenLine xmlns:a14="http://schemas.microsoft.com/office/drawing/2010/main" xmlns="" w="9525">
+                <a14:hiddenLine xmlns="" xmlns:a14="http://schemas.microsoft.com/office/drawing/2010/main" w="9525">
                   <a:solidFill>
                     <a:srgbClr val="000000"/>
                   </a:solidFill>
@@ -4103,7 +4103,7 @@
             </a:ln>
             <a:extLst>
               <a:ext uri="{91240B29-F687-4f45-9708-019B960494DF}">
-                <a14:hiddenLine xmlns:a14="http://schemas.microsoft.com/office/drawing/2010/main" xmlns="" w="9525">
+                <a14:hiddenLine xmlns="" xmlns:a14="http://schemas.microsoft.com/office/drawing/2010/main" w="9525">
                   <a:solidFill>
                     <a:srgbClr val="000000"/>
                   </a:solidFill>
@@ -4193,7 +4193,7 @@
             </a:ln>
             <a:extLst>
               <a:ext uri="{91240B29-F687-4f45-9708-019B960494DF}">
-                <a14:hiddenLine xmlns:a14="http://schemas.microsoft.com/office/drawing/2010/main" xmlns="" w="9525">
+                <a14:hiddenLine xmlns="" xmlns:a14="http://schemas.microsoft.com/office/drawing/2010/main" w="9525">
                   <a:solidFill>
                     <a:srgbClr val="000000"/>
                   </a:solidFill>
@@ -4283,7 +4283,7 @@
             </a:ln>
             <a:extLst>
               <a:ext uri="{91240B29-F687-4f45-9708-019B960494DF}">
-                <a14:hiddenLine xmlns:a14="http://schemas.microsoft.com/office/drawing/2010/main" xmlns="" w="9525">
+                <a14:hiddenLine xmlns="" xmlns:a14="http://schemas.microsoft.com/office/drawing/2010/main" w="9525">
                   <a:solidFill>
                     <a:srgbClr val="000000"/>
                   </a:solidFill>
@@ -4345,7 +4345,7 @@
             </a:ln>
             <a:extLst>
               <a:ext uri="{91240B29-F687-4f45-9708-019B960494DF}">
-                <a14:hiddenLine xmlns:a14="http://schemas.microsoft.com/office/drawing/2010/main" xmlns="" w="9525">
+                <a14:hiddenLine xmlns="" xmlns:a14="http://schemas.microsoft.com/office/drawing/2010/main" w="9525">
                   <a:solidFill>
                     <a:srgbClr val="000000"/>
                   </a:solidFill>
@@ -4465,7 +4465,7 @@
             </a:ln>
             <a:extLst>
               <a:ext uri="{91240B29-F687-4f45-9708-019B960494DF}">
-                <a14:hiddenLine xmlns:a14="http://schemas.microsoft.com/office/drawing/2010/main" xmlns="" w="9525">
+                <a14:hiddenLine xmlns="" xmlns:a14="http://schemas.microsoft.com/office/drawing/2010/main" w="9525">
                   <a:solidFill>
                     <a:srgbClr val="000000"/>
                   </a:solidFill>
@@ -4533,7 +4533,7 @@
             </a:ln>
             <a:extLst>
               <a:ext uri="{91240B29-F687-4f45-9708-019B960494DF}">
-                <a14:hiddenLine xmlns:a14="http://schemas.microsoft.com/office/drawing/2010/main" xmlns="" w="9525">
+                <a14:hiddenLine xmlns="" xmlns:a14="http://schemas.microsoft.com/office/drawing/2010/main" w="9525">
                   <a:solidFill>
                     <a:srgbClr val="000000"/>
                   </a:solidFill>
@@ -4623,7 +4623,7 @@
             </a:ln>
             <a:extLst>
               <a:ext uri="{91240B29-F687-4f45-9708-019B960494DF}">
-                <a14:hiddenLine xmlns:a14="http://schemas.microsoft.com/office/drawing/2010/main" xmlns="" w="9525">
+                <a14:hiddenLine xmlns="" xmlns:a14="http://schemas.microsoft.com/office/drawing/2010/main" w="9525">
                   <a:solidFill>
                     <a:srgbClr val="000000"/>
                   </a:solidFill>
@@ -9433,7 +9433,7 @@
           <a:noFill/>
           <a:extLst>
             <a:ext uri="{909E8E84-426E-40dd-AFC4-6F175D3DCCD1}">
-              <a14:hiddenFill xmlns:a14="http://schemas.microsoft.com/office/drawing/2010/main" xmlns="">
+              <a14:hiddenFill xmlns="" xmlns:a14="http://schemas.microsoft.com/office/drawing/2010/main">
                 <a:solidFill>
                   <a:srgbClr val="FFFFFF"/>
                 </a:solidFill>
@@ -9507,7 +9507,7 @@
               </a:ln>
               <a:extLst>
                 <a:ext uri="{91240B29-F687-4f45-9708-019B960494DF}">
-                  <a14:hiddenLine xmlns:a14="http://schemas.microsoft.com/office/drawing/2010/main" xmlns="" w="9525">
+                  <a14:hiddenLine xmlns="" xmlns:a14="http://schemas.microsoft.com/office/drawing/2010/main" w="9525">
                     <a:solidFill>
                       <a:srgbClr val="000000"/>
                     </a:solidFill>
@@ -9597,7 +9597,7 @@
               </a:ln>
               <a:extLst>
                 <a:ext uri="{91240B29-F687-4f45-9708-019B960494DF}">
-                  <a14:hiddenLine xmlns:a14="http://schemas.microsoft.com/office/drawing/2010/main" xmlns="" w="9525">
+                  <a14:hiddenLine xmlns="" xmlns:a14="http://schemas.microsoft.com/office/drawing/2010/main" w="9525">
                     <a:solidFill>
                       <a:srgbClr val="000000"/>
                     </a:solidFill>
@@ -9687,7 +9687,7 @@
               </a:ln>
               <a:extLst>
                 <a:ext uri="{91240B29-F687-4f45-9708-019B960494DF}">
-                  <a14:hiddenLine xmlns:a14="http://schemas.microsoft.com/office/drawing/2010/main" xmlns="" w="9525">
+                  <a14:hiddenLine xmlns="" xmlns:a14="http://schemas.microsoft.com/office/drawing/2010/main" w="9525">
                     <a:solidFill>
                       <a:srgbClr val="000000"/>
                     </a:solidFill>
@@ -9749,7 +9749,7 @@
               </a:ln>
               <a:extLst>
                 <a:ext uri="{91240B29-F687-4f45-9708-019B960494DF}">
-                  <a14:hiddenLine xmlns:a14="http://schemas.microsoft.com/office/drawing/2010/main" xmlns="" w="9525">
+                  <a14:hiddenLine xmlns="" xmlns:a14="http://schemas.microsoft.com/office/drawing/2010/main" w="9525">
                     <a:solidFill>
                       <a:srgbClr val="000000"/>
                     </a:solidFill>
@@ -9839,7 +9839,7 @@
               </a:ln>
               <a:extLst>
                 <a:ext uri="{91240B29-F687-4f45-9708-019B960494DF}">
-                  <a14:hiddenLine xmlns:a14="http://schemas.microsoft.com/office/drawing/2010/main" xmlns="" w="9525">
+                  <a14:hiddenLine xmlns="" xmlns:a14="http://schemas.microsoft.com/office/drawing/2010/main" w="9525">
                     <a:solidFill>
                       <a:srgbClr val="000000"/>
                     </a:solidFill>
@@ -9901,7 +9901,7 @@
               </a:ln>
               <a:extLst>
                 <a:ext uri="{91240B29-F687-4f45-9708-019B960494DF}">
-                  <a14:hiddenLine xmlns:a14="http://schemas.microsoft.com/office/drawing/2010/main" xmlns="" w="9525">
+                  <a14:hiddenLine xmlns="" xmlns:a14="http://schemas.microsoft.com/office/drawing/2010/main" w="9525">
                     <a:solidFill>
                       <a:srgbClr val="000000"/>
                     </a:solidFill>
@@ -9963,7 +9963,7 @@
               </a:ln>
               <a:extLst>
                 <a:ext uri="{91240B29-F687-4f45-9708-019B960494DF}">
-                  <a14:hiddenLine xmlns:a14="http://schemas.microsoft.com/office/drawing/2010/main" xmlns="" w="9525">
+                  <a14:hiddenLine xmlns="" xmlns:a14="http://schemas.microsoft.com/office/drawing/2010/main" w="9525">
                     <a:solidFill>
                       <a:srgbClr val="000000"/>
                     </a:solidFill>
@@ -10053,7 +10053,7 @@
               </a:ln>
               <a:extLst>
                 <a:ext uri="{91240B29-F687-4f45-9708-019B960494DF}">
-                  <a14:hiddenLine xmlns:a14="http://schemas.microsoft.com/office/drawing/2010/main" xmlns="" w="9525">
+                  <a14:hiddenLine xmlns="" xmlns:a14="http://schemas.microsoft.com/office/drawing/2010/main" w="9525">
                     <a:solidFill>
                       <a:srgbClr val="000000"/>
                     </a:solidFill>
@@ -10143,7 +10143,7 @@
               </a:ln>
               <a:extLst>
                 <a:ext uri="{91240B29-F687-4f45-9708-019B960494DF}">
-                  <a14:hiddenLine xmlns:a14="http://schemas.microsoft.com/office/drawing/2010/main" xmlns="" w="9525">
+                  <a14:hiddenLine xmlns="" xmlns:a14="http://schemas.microsoft.com/office/drawing/2010/main" w="9525">
                     <a:solidFill>
                       <a:srgbClr val="000000"/>
                     </a:solidFill>
@@ -10205,7 +10205,7 @@
               </a:ln>
               <a:extLst>
                 <a:ext uri="{91240B29-F687-4f45-9708-019B960494DF}">
-                  <a14:hiddenLine xmlns:a14="http://schemas.microsoft.com/office/drawing/2010/main" xmlns="" w="9525">
+                  <a14:hiddenLine xmlns="" xmlns:a14="http://schemas.microsoft.com/office/drawing/2010/main" w="9525">
                     <a:solidFill>
                       <a:srgbClr val="000000"/>
                     </a:solidFill>
@@ -10315,7 +10315,7 @@
               </a:ln>
               <a:extLst>
                 <a:ext uri="{91240B29-F687-4f45-9708-019B960494DF}">
-                  <a14:hiddenLine xmlns:a14="http://schemas.microsoft.com/office/drawing/2010/main" xmlns="" w="9525">
+                  <a14:hiddenLine xmlns="" xmlns:a14="http://schemas.microsoft.com/office/drawing/2010/main" w="9525">
                     <a:solidFill>
                       <a:srgbClr val="000000"/>
                     </a:solidFill>
@@ -10399,7 +10399,7 @@
               </a:ln>
               <a:extLst>
                 <a:ext uri="{91240B29-F687-4f45-9708-019B960494DF}">
-                  <a14:hiddenLine xmlns:a14="http://schemas.microsoft.com/office/drawing/2010/main" xmlns="" w="9525">
+                  <a14:hiddenLine xmlns="" xmlns:a14="http://schemas.microsoft.com/office/drawing/2010/main" w="9525">
                     <a:solidFill>
                       <a:srgbClr val="000000"/>
                     </a:solidFill>
@@ -10461,7 +10461,7 @@
               </a:ln>
               <a:extLst>
                 <a:ext uri="{91240B29-F687-4f45-9708-019B960494DF}">
-                  <a14:hiddenLine xmlns:a14="http://schemas.microsoft.com/office/drawing/2010/main" xmlns="" w="9525">
+                  <a14:hiddenLine xmlns="" xmlns:a14="http://schemas.microsoft.com/office/drawing/2010/main" w="9525">
                     <a:solidFill>
                       <a:srgbClr val="000000"/>
                     </a:solidFill>
@@ -10523,7 +10523,7 @@
               </a:ln>
               <a:extLst>
                 <a:ext uri="{91240B29-F687-4f45-9708-019B960494DF}">
-                  <a14:hiddenLine xmlns:a14="http://schemas.microsoft.com/office/drawing/2010/main" xmlns="" w="9525">
+                  <a14:hiddenLine xmlns="" xmlns:a14="http://schemas.microsoft.com/office/drawing/2010/main" w="9525">
                     <a:solidFill>
                       <a:srgbClr val="000000"/>
                     </a:solidFill>
@@ -10613,7 +10613,7 @@
               </a:ln>
               <a:extLst>
                 <a:ext uri="{91240B29-F687-4f45-9708-019B960494DF}">
-                  <a14:hiddenLine xmlns:a14="http://schemas.microsoft.com/office/drawing/2010/main" xmlns="" w="9525">
+                  <a14:hiddenLine xmlns="" xmlns:a14="http://schemas.microsoft.com/office/drawing/2010/main" w="9525">
                     <a:solidFill>
                       <a:srgbClr val="000000"/>
                     </a:solidFill>
@@ -10647,7 +10647,7 @@
               </a:ln>
               <a:extLst>
                 <a:ext uri="{91240B29-F687-4f45-9708-019B960494DF}">
-                  <a14:hiddenLine xmlns:a14="http://schemas.microsoft.com/office/drawing/2010/main" xmlns="" w="9525">
+                  <a14:hiddenLine xmlns="" xmlns:a14="http://schemas.microsoft.com/office/drawing/2010/main" w="9525">
                     <a:solidFill>
                       <a:srgbClr val="000000"/>
                     </a:solidFill>
@@ -10712,7 +10712,7 @@
               </a:ln>
               <a:extLst>
                 <a:ext uri="{91240B29-F687-4f45-9708-019B960494DF}">
-                  <a14:hiddenLine xmlns:a14="http://schemas.microsoft.com/office/drawing/2010/main" xmlns="" w="9525">
+                  <a14:hiddenLine xmlns="" xmlns:a14="http://schemas.microsoft.com/office/drawing/2010/main" w="9525">
                     <a:solidFill>
                       <a:srgbClr val="000000"/>
                     </a:solidFill>
@@ -10802,7 +10802,7 @@
               </a:ln>
               <a:extLst>
                 <a:ext uri="{91240B29-F687-4f45-9708-019B960494DF}">
-                  <a14:hiddenLine xmlns:a14="http://schemas.microsoft.com/office/drawing/2010/main" xmlns="" w="9525">
+                  <a14:hiddenLine xmlns="" xmlns:a14="http://schemas.microsoft.com/office/drawing/2010/main" w="9525">
                     <a:solidFill>
                       <a:srgbClr val="000000"/>
                     </a:solidFill>
@@ -10864,7 +10864,7 @@
               </a:ln>
               <a:extLst>
                 <a:ext uri="{91240B29-F687-4f45-9708-019B960494DF}">
-                  <a14:hiddenLine xmlns:a14="http://schemas.microsoft.com/office/drawing/2010/main" xmlns="" w="9525">
+                  <a14:hiddenLine xmlns="" xmlns:a14="http://schemas.microsoft.com/office/drawing/2010/main" w="9525">
                     <a:solidFill>
                       <a:srgbClr val="000000"/>
                     </a:solidFill>
@@ -10954,7 +10954,7 @@
               </a:ln>
               <a:extLst>
                 <a:ext uri="{91240B29-F687-4f45-9708-019B960494DF}">
-                  <a14:hiddenLine xmlns:a14="http://schemas.microsoft.com/office/drawing/2010/main" xmlns="" w="9525">
+                  <a14:hiddenLine xmlns="" xmlns:a14="http://schemas.microsoft.com/office/drawing/2010/main" w="9525">
                     <a:solidFill>
                       <a:srgbClr val="000000"/>
                     </a:solidFill>
@@ -11019,7 +11019,7 @@
               </a:ln>
               <a:extLst>
                 <a:ext uri="{91240B29-F687-4f45-9708-019B960494DF}">
-                  <a14:hiddenLine xmlns:a14="http://schemas.microsoft.com/office/drawing/2010/main" xmlns="" w="9525">
+                  <a14:hiddenLine xmlns="" xmlns:a14="http://schemas.microsoft.com/office/drawing/2010/main" w="9525">
                     <a:solidFill>
                       <a:srgbClr val="000000"/>
                     </a:solidFill>
@@ -11081,7 +11081,7 @@
               </a:ln>
               <a:extLst>
                 <a:ext uri="{91240B29-F687-4f45-9708-019B960494DF}">
-                  <a14:hiddenLine xmlns:a14="http://schemas.microsoft.com/office/drawing/2010/main" xmlns="" w="9525">
+                  <a14:hiddenLine xmlns="" xmlns:a14="http://schemas.microsoft.com/office/drawing/2010/main" w="9525">
                     <a:solidFill>
                       <a:srgbClr val="000000"/>
                     </a:solidFill>
@@ -11171,7 +11171,7 @@
               </a:ln>
               <a:extLst>
                 <a:ext uri="{91240B29-F687-4f45-9708-019B960494DF}">
-                  <a14:hiddenLine xmlns:a14="http://schemas.microsoft.com/office/drawing/2010/main" xmlns="" w="9525">
+                  <a14:hiddenLine xmlns="" xmlns:a14="http://schemas.microsoft.com/office/drawing/2010/main" w="9525">
                     <a:solidFill>
                       <a:srgbClr val="000000"/>
                     </a:solidFill>
@@ -11261,7 +11261,7 @@
               </a:ln>
               <a:extLst>
                 <a:ext uri="{91240B29-F687-4f45-9708-019B960494DF}">
-                  <a14:hiddenLine xmlns:a14="http://schemas.microsoft.com/office/drawing/2010/main" xmlns="" w="9525">
+                  <a14:hiddenLine xmlns="" xmlns:a14="http://schemas.microsoft.com/office/drawing/2010/main" w="9525">
                     <a:solidFill>
                       <a:srgbClr val="000000"/>
                     </a:solidFill>
@@ -11326,7 +11326,7 @@
               </a:ln>
               <a:extLst>
                 <a:ext uri="{91240B29-F687-4f45-9708-019B960494DF}">
-                  <a14:hiddenLine xmlns:a14="http://schemas.microsoft.com/office/drawing/2010/main" xmlns="" w="9525">
+                  <a14:hiddenLine xmlns="" xmlns:a14="http://schemas.microsoft.com/office/drawing/2010/main" w="9525">
                     <a:solidFill>
                       <a:srgbClr val="000000"/>
                     </a:solidFill>
@@ -11446,7 +11446,7 @@
               </a:ln>
               <a:extLst>
                 <a:ext uri="{91240B29-F687-4f45-9708-019B960494DF}">
-                  <a14:hiddenLine xmlns:a14="http://schemas.microsoft.com/office/drawing/2010/main" xmlns="" w="9525">
+                  <a14:hiddenLine xmlns="" xmlns:a14="http://schemas.microsoft.com/office/drawing/2010/main" w="9525">
                     <a:solidFill>
                       <a:srgbClr val="000000"/>
                     </a:solidFill>
@@ -11544,7 +11544,7 @@
               </a:ln>
               <a:extLst>
                 <a:ext uri="{91240B29-F687-4f45-9708-019B960494DF}">
-                  <a14:hiddenLine xmlns:a14="http://schemas.microsoft.com/office/drawing/2010/main" xmlns="" w="9525">
+                  <a14:hiddenLine xmlns="" xmlns:a14="http://schemas.microsoft.com/office/drawing/2010/main" w="9525">
                     <a:solidFill>
                       <a:srgbClr val="000000"/>
                     </a:solidFill>
@@ -11659,7 +11659,7 @@
               </a:ln>
               <a:extLst>
                 <a:ext uri="{91240B29-F687-4f45-9708-019B960494DF}">
-                  <a14:hiddenLine xmlns:a14="http://schemas.microsoft.com/office/drawing/2010/main" xmlns="" w="9525">
+                  <a14:hiddenLine xmlns="" xmlns:a14="http://schemas.microsoft.com/office/drawing/2010/main" w="9525">
                     <a:solidFill>
                       <a:srgbClr val="000000"/>
                     </a:solidFill>
@@ -11749,7 +11749,7 @@
               </a:ln>
               <a:extLst>
                 <a:ext uri="{91240B29-F687-4f45-9708-019B960494DF}">
-                  <a14:hiddenLine xmlns:a14="http://schemas.microsoft.com/office/drawing/2010/main" xmlns="" w="9525">
+                  <a14:hiddenLine xmlns="" xmlns:a14="http://schemas.microsoft.com/office/drawing/2010/main" w="9525">
                     <a:solidFill>
                       <a:srgbClr val="000000"/>
                     </a:solidFill>
@@ -11814,7 +11814,7 @@
               </a:ln>
               <a:extLst>
                 <a:ext uri="{91240B29-F687-4f45-9708-019B960494DF}">
-                  <a14:hiddenLine xmlns:a14="http://schemas.microsoft.com/office/drawing/2010/main" xmlns="" w="9525">
+                  <a14:hiddenLine xmlns="" xmlns:a14="http://schemas.microsoft.com/office/drawing/2010/main" w="9525">
                     <a:solidFill>
                       <a:srgbClr val="000000"/>
                     </a:solidFill>
@@ -11904,7 +11904,7 @@
               </a:ln>
               <a:extLst>
                 <a:ext uri="{91240B29-F687-4f45-9708-019B960494DF}">
-                  <a14:hiddenLine xmlns:a14="http://schemas.microsoft.com/office/drawing/2010/main" xmlns="" w="9525">
+                  <a14:hiddenLine xmlns="" xmlns:a14="http://schemas.microsoft.com/office/drawing/2010/main" w="9525">
                     <a:solidFill>
                       <a:srgbClr val="000000"/>
                     </a:solidFill>
@@ -11972,7 +11972,7 @@
               </a:ln>
               <a:extLst>
                 <a:ext uri="{91240B29-F687-4f45-9708-019B960494DF}">
-                  <a14:hiddenLine xmlns:a14="http://schemas.microsoft.com/office/drawing/2010/main" xmlns="" w="9525">
+                  <a14:hiddenLine xmlns="" xmlns:a14="http://schemas.microsoft.com/office/drawing/2010/main" w="9525">
                     <a:solidFill>
                       <a:srgbClr val="000000"/>
                     </a:solidFill>
@@ -12062,7 +12062,7 @@
               </a:ln>
               <a:extLst>
                 <a:ext uri="{91240B29-F687-4f45-9708-019B960494DF}">
-                  <a14:hiddenLine xmlns:a14="http://schemas.microsoft.com/office/drawing/2010/main" xmlns="" w="9525">
+                  <a14:hiddenLine xmlns="" xmlns:a14="http://schemas.microsoft.com/office/drawing/2010/main" w="9525">
                     <a:solidFill>
                       <a:srgbClr val="000000"/>
                     </a:solidFill>
@@ -12130,7 +12130,7 @@
               </a:ln>
               <a:extLst>
                 <a:ext uri="{91240B29-F687-4f45-9708-019B960494DF}">
-                  <a14:hiddenLine xmlns:a14="http://schemas.microsoft.com/office/drawing/2010/main" xmlns="" w="9525">
+                  <a14:hiddenLine xmlns="" xmlns:a14="http://schemas.microsoft.com/office/drawing/2010/main" w="9525">
                     <a:solidFill>
                       <a:srgbClr val="000000"/>
                     </a:solidFill>
@@ -12220,7 +12220,7 @@
               </a:ln>
               <a:extLst>
                 <a:ext uri="{91240B29-F687-4f45-9708-019B960494DF}">
-                  <a14:hiddenLine xmlns:a14="http://schemas.microsoft.com/office/drawing/2010/main" xmlns="" w="9525">
+                  <a14:hiddenLine xmlns="" xmlns:a14="http://schemas.microsoft.com/office/drawing/2010/main" w="9525">
                     <a:solidFill>
                       <a:srgbClr val="000000"/>
                     </a:solidFill>
@@ -12254,7 +12254,7 @@
               </a:ln>
               <a:extLst>
                 <a:ext uri="{91240B29-F687-4f45-9708-019B960494DF}">
-                  <a14:hiddenLine xmlns:a14="http://schemas.microsoft.com/office/drawing/2010/main" xmlns="" w="9525">
+                  <a14:hiddenLine xmlns="" xmlns:a14="http://schemas.microsoft.com/office/drawing/2010/main" w="9525">
                     <a:solidFill>
                       <a:srgbClr val="000000"/>
                     </a:solidFill>
@@ -14554,7 +14554,7 @@
                   <a:schemeClr val="bg1"/>
                 </a:solidFill>
               </a:rPr>
-              <a:t>Statistically calculated using 42 factors across 7 risk categories</a:t>
+              <a:t>Statistically calculated using 62 factors across 7 risk categories</a:t>
             </a:r>
           </a:p>
           <a:p>

</xml_diff>

<commit_message>
Better alignment with IETF SCITT concepts - terms
</commit_message>
<xml_diff>
--- a/20250321-SAG-CTR.pptx
+++ b/20250321-SAG-CTR.pptx
@@ -220,7 +220,7 @@
           <a:p>
             <a:fld id="{332E4851-9EEE-4C44-B0F3-632DB06B8768}" type="datetimeFigureOut">
               <a:rPr lang="en-US" smtClean="0"/>
-              <a:t>3/12/2025</a:t>
+              <a:t>3/14/2025</a:t>
             </a:fld>
             <a:endParaRPr lang="en-US"/>
           </a:p>
@@ -537,7 +537,7 @@
           <a:noFill/>
           <a:extLst>
             <a:ext uri="{909E8E84-426E-40dd-AFC4-6F175D3DCCD1}">
-              <a14:hiddenFill xmlns="" xmlns:a14="http://schemas.microsoft.com/office/drawing/2010/main">
+              <a14:hiddenFill xmlns:a14="http://schemas.microsoft.com/office/drawing/2010/main" xmlns="">
                 <a:solidFill>
                   <a:srgbClr val="FFFFFF"/>
                 </a:solidFill>
@@ -597,7 +597,7 @@
             </a:ln>
             <a:extLst>
               <a:ext uri="{91240B29-F687-4f45-9708-019B960494DF}">
-                <a14:hiddenLine xmlns="" xmlns:a14="http://schemas.microsoft.com/office/drawing/2010/main" w="9525">
+                <a14:hiddenLine xmlns:a14="http://schemas.microsoft.com/office/drawing/2010/main" xmlns="" w="9525">
                   <a:solidFill>
                     <a:srgbClr val="000000"/>
                   </a:solidFill>
@@ -687,7 +687,7 @@
             </a:ln>
             <a:extLst>
               <a:ext uri="{91240B29-F687-4f45-9708-019B960494DF}">
-                <a14:hiddenLine xmlns="" xmlns:a14="http://schemas.microsoft.com/office/drawing/2010/main" w="9525">
+                <a14:hiddenLine xmlns:a14="http://schemas.microsoft.com/office/drawing/2010/main" xmlns="" w="9525">
                   <a:solidFill>
                     <a:srgbClr val="000000"/>
                   </a:solidFill>
@@ -777,7 +777,7 @@
             </a:ln>
             <a:extLst>
               <a:ext uri="{91240B29-F687-4f45-9708-019B960494DF}">
-                <a14:hiddenLine xmlns="" xmlns:a14="http://schemas.microsoft.com/office/drawing/2010/main" w="9525">
+                <a14:hiddenLine xmlns:a14="http://schemas.microsoft.com/office/drawing/2010/main" xmlns="" w="9525">
                   <a:solidFill>
                     <a:srgbClr val="000000"/>
                   </a:solidFill>
@@ -811,7 +811,7 @@
             </a:ln>
             <a:extLst>
               <a:ext uri="{91240B29-F687-4f45-9708-019B960494DF}">
-                <a14:hiddenLine xmlns="" xmlns:a14="http://schemas.microsoft.com/office/drawing/2010/main" w="9525">
+                <a14:hiddenLine xmlns:a14="http://schemas.microsoft.com/office/drawing/2010/main" xmlns="" w="9525">
                   <a:solidFill>
                     <a:srgbClr val="000000"/>
                   </a:solidFill>
@@ -901,7 +901,7 @@
             </a:ln>
             <a:extLst>
               <a:ext uri="{91240B29-F687-4f45-9708-019B960494DF}">
-                <a14:hiddenLine xmlns="" xmlns:a14="http://schemas.microsoft.com/office/drawing/2010/main" w="9525">
+                <a14:hiddenLine xmlns:a14="http://schemas.microsoft.com/office/drawing/2010/main" xmlns="" w="9525">
                   <a:solidFill>
                     <a:srgbClr val="000000"/>
                   </a:solidFill>
@@ -963,7 +963,7 @@
             </a:ln>
             <a:extLst>
               <a:ext uri="{91240B29-F687-4f45-9708-019B960494DF}">
-                <a14:hiddenLine xmlns="" xmlns:a14="http://schemas.microsoft.com/office/drawing/2010/main" w="9525">
+                <a14:hiddenLine xmlns:a14="http://schemas.microsoft.com/office/drawing/2010/main" xmlns="" w="9525">
                   <a:solidFill>
                     <a:srgbClr val="000000"/>
                   </a:solidFill>
@@ -1025,7 +1025,7 @@
             </a:ln>
             <a:extLst>
               <a:ext uri="{91240B29-F687-4f45-9708-019B960494DF}">
-                <a14:hiddenLine xmlns="" xmlns:a14="http://schemas.microsoft.com/office/drawing/2010/main" w="9525">
+                <a14:hiddenLine xmlns:a14="http://schemas.microsoft.com/office/drawing/2010/main" xmlns="" w="9525">
                   <a:solidFill>
                     <a:srgbClr val="000000"/>
                   </a:solidFill>
@@ -1115,7 +1115,7 @@
             </a:ln>
             <a:extLst>
               <a:ext uri="{91240B29-F687-4f45-9708-019B960494DF}">
-                <a14:hiddenLine xmlns="" xmlns:a14="http://schemas.microsoft.com/office/drawing/2010/main" w="9525">
+                <a14:hiddenLine xmlns:a14="http://schemas.microsoft.com/office/drawing/2010/main" xmlns="" w="9525">
                   <a:solidFill>
                     <a:srgbClr val="000000"/>
                   </a:solidFill>
@@ -1177,7 +1177,7 @@
             </a:ln>
             <a:extLst>
               <a:ext uri="{91240B29-F687-4f45-9708-019B960494DF}">
-                <a14:hiddenLine xmlns="" xmlns:a14="http://schemas.microsoft.com/office/drawing/2010/main" w="9525">
+                <a14:hiddenLine xmlns:a14="http://schemas.microsoft.com/office/drawing/2010/main" xmlns="" w="9525">
                   <a:solidFill>
                     <a:srgbClr val="000000"/>
                   </a:solidFill>
@@ -1239,7 +1239,7 @@
             </a:ln>
             <a:extLst>
               <a:ext uri="{91240B29-F687-4f45-9708-019B960494DF}">
-                <a14:hiddenLine xmlns="" xmlns:a14="http://schemas.microsoft.com/office/drawing/2010/main" w="9525">
+                <a14:hiddenLine xmlns:a14="http://schemas.microsoft.com/office/drawing/2010/main" xmlns="" w="9525">
                   <a:solidFill>
                     <a:srgbClr val="000000"/>
                   </a:solidFill>
@@ -1329,7 +1329,7 @@
             </a:ln>
             <a:extLst>
               <a:ext uri="{91240B29-F687-4f45-9708-019B960494DF}">
-                <a14:hiddenLine xmlns="" xmlns:a14="http://schemas.microsoft.com/office/drawing/2010/main" w="9525">
+                <a14:hiddenLine xmlns:a14="http://schemas.microsoft.com/office/drawing/2010/main" xmlns="" w="9525">
                   <a:solidFill>
                     <a:srgbClr val="000000"/>
                   </a:solidFill>
@@ -1419,7 +1419,7 @@
             </a:ln>
             <a:extLst>
               <a:ext uri="{91240B29-F687-4f45-9708-019B960494DF}">
-                <a14:hiddenLine xmlns="" xmlns:a14="http://schemas.microsoft.com/office/drawing/2010/main" w="9525">
+                <a14:hiddenLine xmlns:a14="http://schemas.microsoft.com/office/drawing/2010/main" xmlns="" w="9525">
                   <a:solidFill>
                     <a:srgbClr val="000000"/>
                   </a:solidFill>
@@ -1481,7 +1481,7 @@
             </a:ln>
             <a:extLst>
               <a:ext uri="{91240B29-F687-4f45-9708-019B960494DF}">
-                <a14:hiddenLine xmlns="" xmlns:a14="http://schemas.microsoft.com/office/drawing/2010/main" w="9525">
+                <a14:hiddenLine xmlns:a14="http://schemas.microsoft.com/office/drawing/2010/main" xmlns="" w="9525">
                   <a:solidFill>
                     <a:srgbClr val="000000"/>
                   </a:solidFill>
@@ -1591,7 +1591,7 @@
             </a:ln>
             <a:extLst>
               <a:ext uri="{91240B29-F687-4f45-9708-019B960494DF}">
-                <a14:hiddenLine xmlns="" xmlns:a14="http://schemas.microsoft.com/office/drawing/2010/main" w="9525">
+                <a14:hiddenLine xmlns:a14="http://schemas.microsoft.com/office/drawing/2010/main" xmlns="" w="9525">
                   <a:solidFill>
                     <a:srgbClr val="000000"/>
                   </a:solidFill>
@@ -1653,7 +1653,7 @@
             </a:ln>
             <a:extLst>
               <a:ext uri="{91240B29-F687-4f45-9708-019B960494DF}">
-                <a14:hiddenLine xmlns="" xmlns:a14="http://schemas.microsoft.com/office/drawing/2010/main" w="9525">
+                <a14:hiddenLine xmlns:a14="http://schemas.microsoft.com/office/drawing/2010/main" xmlns="" w="9525">
                   <a:solidFill>
                     <a:srgbClr val="000000"/>
                   </a:solidFill>
@@ -1743,7 +1743,7 @@
             </a:ln>
             <a:extLst>
               <a:ext uri="{91240B29-F687-4f45-9708-019B960494DF}">
-                <a14:hiddenLine xmlns="" xmlns:a14="http://schemas.microsoft.com/office/drawing/2010/main" w="9525">
+                <a14:hiddenLine xmlns:a14="http://schemas.microsoft.com/office/drawing/2010/main" xmlns="" w="9525">
                   <a:solidFill>
                     <a:srgbClr val="000000"/>
                   </a:solidFill>
@@ -1833,7 +1833,7 @@
             </a:ln>
             <a:extLst>
               <a:ext uri="{91240B29-F687-4f45-9708-019B960494DF}">
-                <a14:hiddenLine xmlns="" xmlns:a14="http://schemas.microsoft.com/office/drawing/2010/main" w="9525">
+                <a14:hiddenLine xmlns:a14="http://schemas.microsoft.com/office/drawing/2010/main" xmlns="" w="9525">
                   <a:solidFill>
                     <a:srgbClr val="000000"/>
                   </a:solidFill>
@@ -1895,7 +1895,7 @@
             </a:ln>
             <a:extLst>
               <a:ext uri="{91240B29-F687-4f45-9708-019B960494DF}">
-                <a14:hiddenLine xmlns="" xmlns:a14="http://schemas.microsoft.com/office/drawing/2010/main" w="9525">
+                <a14:hiddenLine xmlns:a14="http://schemas.microsoft.com/office/drawing/2010/main" xmlns="" w="9525">
                   <a:solidFill>
                     <a:srgbClr val="000000"/>
                   </a:solidFill>
@@ -1985,7 +1985,7 @@
             </a:ln>
             <a:extLst>
               <a:ext uri="{91240B29-F687-4f45-9708-019B960494DF}">
-                <a14:hiddenLine xmlns="" xmlns:a14="http://schemas.microsoft.com/office/drawing/2010/main" w="9525">
+                <a14:hiddenLine xmlns:a14="http://schemas.microsoft.com/office/drawing/2010/main" xmlns="" w="9525">
                   <a:solidFill>
                     <a:srgbClr val="000000"/>
                   </a:solidFill>
@@ -2075,7 +2075,7 @@
             </a:ln>
             <a:extLst>
               <a:ext uri="{91240B29-F687-4f45-9708-019B960494DF}">
-                <a14:hiddenLine xmlns="" xmlns:a14="http://schemas.microsoft.com/office/drawing/2010/main" w="9525">
+                <a14:hiddenLine xmlns:a14="http://schemas.microsoft.com/office/drawing/2010/main" xmlns="" w="9525">
                   <a:solidFill>
                     <a:srgbClr val="000000"/>
                   </a:solidFill>
@@ -2131,7 +2131,7 @@
             </a:ln>
             <a:extLst>
               <a:ext uri="{91240B29-F687-4f45-9708-019B960494DF}">
-                <a14:hiddenLine xmlns="" xmlns:a14="http://schemas.microsoft.com/office/drawing/2010/main" w="9525">
+                <a14:hiddenLine xmlns:a14="http://schemas.microsoft.com/office/drawing/2010/main" xmlns="" w="9525">
                   <a:solidFill>
                     <a:srgbClr val="000000"/>
                   </a:solidFill>
@@ -2221,7 +2221,7 @@
             </a:ln>
             <a:extLst>
               <a:ext uri="{91240B29-F687-4f45-9708-019B960494DF}">
-                <a14:hiddenLine xmlns="" xmlns:a14="http://schemas.microsoft.com/office/drawing/2010/main" w="9525">
+                <a14:hiddenLine xmlns:a14="http://schemas.microsoft.com/office/drawing/2010/main" xmlns="" w="9525">
                   <a:solidFill>
                     <a:srgbClr val="000000"/>
                   </a:solidFill>
@@ -2277,7 +2277,7 @@
             </a:ln>
             <a:extLst>
               <a:ext uri="{91240B29-F687-4f45-9708-019B960494DF}">
-                <a14:hiddenLine xmlns="" xmlns:a14="http://schemas.microsoft.com/office/drawing/2010/main" w="9525">
+                <a14:hiddenLine xmlns:a14="http://schemas.microsoft.com/office/drawing/2010/main" xmlns="" w="9525">
                   <a:solidFill>
                     <a:srgbClr val="000000"/>
                   </a:solidFill>
@@ -2367,7 +2367,7 @@
             </a:ln>
             <a:extLst>
               <a:ext uri="{91240B29-F687-4f45-9708-019B960494DF}">
-                <a14:hiddenLine xmlns="" xmlns:a14="http://schemas.microsoft.com/office/drawing/2010/main" w="9525">
+                <a14:hiddenLine xmlns:a14="http://schemas.microsoft.com/office/drawing/2010/main" xmlns="" w="9525">
                   <a:solidFill>
                     <a:srgbClr val="000000"/>
                   </a:solidFill>
@@ -2435,7 +2435,7 @@
             </a:ln>
             <a:extLst>
               <a:ext uri="{91240B29-F687-4f45-9708-019B960494DF}">
-                <a14:hiddenLine xmlns="" xmlns:a14="http://schemas.microsoft.com/office/drawing/2010/main" w="9525">
+                <a14:hiddenLine xmlns:a14="http://schemas.microsoft.com/office/drawing/2010/main" xmlns="" w="9525">
                   <a:solidFill>
                     <a:srgbClr val="000000"/>
                   </a:solidFill>
@@ -2525,7 +2525,7 @@
             </a:ln>
             <a:extLst>
               <a:ext uri="{91240B29-F687-4f45-9708-019B960494DF}">
-                <a14:hiddenLine xmlns="" xmlns:a14="http://schemas.microsoft.com/office/drawing/2010/main" w="9525">
+                <a14:hiddenLine xmlns:a14="http://schemas.microsoft.com/office/drawing/2010/main" xmlns="" w="9525">
                   <a:solidFill>
                     <a:srgbClr val="000000"/>
                   </a:solidFill>
@@ -2593,7 +2593,7 @@
             </a:ln>
             <a:extLst>
               <a:ext uri="{91240B29-F687-4f45-9708-019B960494DF}">
-                <a14:hiddenLine xmlns="" xmlns:a14="http://schemas.microsoft.com/office/drawing/2010/main" w="9525">
+                <a14:hiddenLine xmlns:a14="http://schemas.microsoft.com/office/drawing/2010/main" xmlns="" w="9525">
                   <a:solidFill>
                     <a:srgbClr val="000000"/>
                   </a:solidFill>
@@ -2683,7 +2683,7 @@
             </a:ln>
             <a:extLst>
               <a:ext uri="{91240B29-F687-4f45-9708-019B960494DF}">
-                <a14:hiddenLine xmlns="" xmlns:a14="http://schemas.microsoft.com/office/drawing/2010/main" w="9525">
+                <a14:hiddenLine xmlns:a14="http://schemas.microsoft.com/office/drawing/2010/main" xmlns="" w="9525">
                   <a:solidFill>
                     <a:srgbClr val="000000"/>
                   </a:solidFill>
@@ -2717,7 +2717,7 @@
             </a:ln>
             <a:extLst>
               <a:ext uri="{91240B29-F687-4f45-9708-019B960494DF}">
-                <a14:hiddenLine xmlns="" xmlns:a14="http://schemas.microsoft.com/office/drawing/2010/main" w="9525">
+                <a14:hiddenLine xmlns:a14="http://schemas.microsoft.com/office/drawing/2010/main" xmlns="" w="9525">
                   <a:solidFill>
                     <a:srgbClr val="000000"/>
                   </a:solidFill>
@@ -2807,7 +2807,7 @@
             </a:ln>
             <a:extLst>
               <a:ext uri="{91240B29-F687-4f45-9708-019B960494DF}">
-                <a14:hiddenLine xmlns="" xmlns:a14="http://schemas.microsoft.com/office/drawing/2010/main" w="9525">
+                <a14:hiddenLine xmlns:a14="http://schemas.microsoft.com/office/drawing/2010/main" xmlns="" w="9525">
                   <a:solidFill>
                     <a:srgbClr val="000000"/>
                   </a:solidFill>
@@ -2869,7 +2869,7 @@
             </a:ln>
             <a:extLst>
               <a:ext uri="{91240B29-F687-4f45-9708-019B960494DF}">
-                <a14:hiddenLine xmlns="" xmlns:a14="http://schemas.microsoft.com/office/drawing/2010/main" w="9525">
+                <a14:hiddenLine xmlns:a14="http://schemas.microsoft.com/office/drawing/2010/main" xmlns="" w="9525">
                   <a:solidFill>
                     <a:srgbClr val="000000"/>
                   </a:solidFill>
@@ -2931,7 +2931,7 @@
             </a:ln>
             <a:extLst>
               <a:ext uri="{91240B29-F687-4f45-9708-019B960494DF}">
-                <a14:hiddenLine xmlns="" xmlns:a14="http://schemas.microsoft.com/office/drawing/2010/main" w="9525">
+                <a14:hiddenLine xmlns:a14="http://schemas.microsoft.com/office/drawing/2010/main" xmlns="" w="9525">
                   <a:solidFill>
                     <a:srgbClr val="000000"/>
                   </a:solidFill>
@@ -3021,7 +3021,7 @@
             </a:ln>
             <a:extLst>
               <a:ext uri="{91240B29-F687-4f45-9708-019B960494DF}">
-                <a14:hiddenLine xmlns="" xmlns:a14="http://schemas.microsoft.com/office/drawing/2010/main" w="9525">
+                <a14:hiddenLine xmlns:a14="http://schemas.microsoft.com/office/drawing/2010/main" xmlns="" w="9525">
                   <a:solidFill>
                     <a:srgbClr val="000000"/>
                   </a:solidFill>
@@ -3089,7 +3089,7 @@
             </a:ln>
             <a:extLst>
               <a:ext uri="{91240B29-F687-4f45-9708-019B960494DF}">
-                <a14:hiddenLine xmlns="" xmlns:a14="http://schemas.microsoft.com/office/drawing/2010/main" w="9525">
+                <a14:hiddenLine xmlns:a14="http://schemas.microsoft.com/office/drawing/2010/main" xmlns="" w="9525">
                   <a:solidFill>
                     <a:srgbClr val="000000"/>
                   </a:solidFill>
@@ -3151,7 +3151,7 @@
             </a:ln>
             <a:extLst>
               <a:ext uri="{91240B29-F687-4f45-9708-019B960494DF}">
-                <a14:hiddenLine xmlns="" xmlns:a14="http://schemas.microsoft.com/office/drawing/2010/main" w="9525">
+                <a14:hiddenLine xmlns:a14="http://schemas.microsoft.com/office/drawing/2010/main" xmlns="" w="9525">
                   <a:solidFill>
                     <a:srgbClr val="000000"/>
                   </a:solidFill>
@@ -3241,7 +3241,7 @@
             </a:ln>
             <a:extLst>
               <a:ext uri="{91240B29-F687-4f45-9708-019B960494DF}">
-                <a14:hiddenLine xmlns="" xmlns:a14="http://schemas.microsoft.com/office/drawing/2010/main" w="9525">
+                <a14:hiddenLine xmlns:a14="http://schemas.microsoft.com/office/drawing/2010/main" xmlns="" w="9525">
                   <a:solidFill>
                     <a:srgbClr val="000000"/>
                   </a:solidFill>
@@ -3303,7 +3303,7 @@
             </a:ln>
             <a:extLst>
               <a:ext uri="{91240B29-F687-4f45-9708-019B960494DF}">
-                <a14:hiddenLine xmlns="" xmlns:a14="http://schemas.microsoft.com/office/drawing/2010/main" w="9525">
+                <a14:hiddenLine xmlns:a14="http://schemas.microsoft.com/office/drawing/2010/main" xmlns="" w="9525">
                   <a:solidFill>
                     <a:srgbClr val="000000"/>
                   </a:solidFill>
@@ -3393,7 +3393,7 @@
             </a:ln>
             <a:extLst>
               <a:ext uri="{91240B29-F687-4f45-9708-019B960494DF}">
-                <a14:hiddenLine xmlns="" xmlns:a14="http://schemas.microsoft.com/office/drawing/2010/main" w="9525">
+                <a14:hiddenLine xmlns:a14="http://schemas.microsoft.com/office/drawing/2010/main" xmlns="" w="9525">
                   <a:solidFill>
                     <a:srgbClr val="000000"/>
                   </a:solidFill>
@@ -3455,7 +3455,7 @@
             </a:ln>
             <a:extLst>
               <a:ext uri="{91240B29-F687-4f45-9708-019B960494DF}">
-                <a14:hiddenLine xmlns="" xmlns:a14="http://schemas.microsoft.com/office/drawing/2010/main" w="9525">
+                <a14:hiddenLine xmlns:a14="http://schemas.microsoft.com/office/drawing/2010/main" xmlns="" w="9525">
                   <a:solidFill>
                     <a:srgbClr val="000000"/>
                   </a:solidFill>
@@ -3545,7 +3545,7 @@
             </a:ln>
             <a:extLst>
               <a:ext uri="{91240B29-F687-4f45-9708-019B960494DF}">
-                <a14:hiddenLine xmlns="" xmlns:a14="http://schemas.microsoft.com/office/drawing/2010/main" w="9525">
+                <a14:hiddenLine xmlns:a14="http://schemas.microsoft.com/office/drawing/2010/main" xmlns="" w="9525">
                   <a:solidFill>
                     <a:srgbClr val="000000"/>
                   </a:solidFill>
@@ -3579,7 +3579,7 @@
             </a:ln>
             <a:extLst>
               <a:ext uri="{91240B29-F687-4f45-9708-019B960494DF}">
-                <a14:hiddenLine xmlns="" xmlns:a14="http://schemas.microsoft.com/office/drawing/2010/main" w="9525">
+                <a14:hiddenLine xmlns:a14="http://schemas.microsoft.com/office/drawing/2010/main" xmlns="" w="9525">
                   <a:solidFill>
                     <a:srgbClr val="000000"/>
                   </a:solidFill>
@@ -3644,7 +3644,7 @@
             </a:ln>
             <a:extLst>
               <a:ext uri="{91240B29-F687-4f45-9708-019B960494DF}">
-                <a14:hiddenLine xmlns="" xmlns:a14="http://schemas.microsoft.com/office/drawing/2010/main" w="9525">
+                <a14:hiddenLine xmlns:a14="http://schemas.microsoft.com/office/drawing/2010/main" xmlns="" w="9525">
                   <a:solidFill>
                     <a:srgbClr val="000000"/>
                   </a:solidFill>
@@ -3734,7 +3734,7 @@
             </a:ln>
             <a:extLst>
               <a:ext uri="{91240B29-F687-4f45-9708-019B960494DF}">
-                <a14:hiddenLine xmlns="" xmlns:a14="http://schemas.microsoft.com/office/drawing/2010/main" w="9525">
+                <a14:hiddenLine xmlns:a14="http://schemas.microsoft.com/office/drawing/2010/main" xmlns="" w="9525">
                   <a:solidFill>
                     <a:srgbClr val="000000"/>
                   </a:solidFill>
@@ -3796,7 +3796,7 @@
             </a:ln>
             <a:extLst>
               <a:ext uri="{91240B29-F687-4f45-9708-019B960494DF}">
-                <a14:hiddenLine xmlns="" xmlns:a14="http://schemas.microsoft.com/office/drawing/2010/main" w="9525">
+                <a14:hiddenLine xmlns:a14="http://schemas.microsoft.com/office/drawing/2010/main" xmlns="" w="9525">
                   <a:solidFill>
                     <a:srgbClr val="000000"/>
                   </a:solidFill>
@@ -3886,7 +3886,7 @@
             </a:ln>
             <a:extLst>
               <a:ext uri="{91240B29-F687-4f45-9708-019B960494DF}">
-                <a14:hiddenLine xmlns="" xmlns:a14="http://schemas.microsoft.com/office/drawing/2010/main" w="9525">
+                <a14:hiddenLine xmlns:a14="http://schemas.microsoft.com/office/drawing/2010/main" xmlns="" w="9525">
                   <a:solidFill>
                     <a:srgbClr val="000000"/>
                   </a:solidFill>
@@ -3976,7 +3976,7 @@
             </a:ln>
             <a:extLst>
               <a:ext uri="{91240B29-F687-4f45-9708-019B960494DF}">
-                <a14:hiddenLine xmlns="" xmlns:a14="http://schemas.microsoft.com/office/drawing/2010/main" w="9525">
+                <a14:hiddenLine xmlns:a14="http://schemas.microsoft.com/office/drawing/2010/main" xmlns="" w="9525">
                   <a:solidFill>
                     <a:srgbClr val="000000"/>
                   </a:solidFill>
@@ -4041,7 +4041,7 @@
             </a:ln>
             <a:extLst>
               <a:ext uri="{91240B29-F687-4f45-9708-019B960494DF}">
-                <a14:hiddenLine xmlns="" xmlns:a14="http://schemas.microsoft.com/office/drawing/2010/main" w="9525">
+                <a14:hiddenLine xmlns:a14="http://schemas.microsoft.com/office/drawing/2010/main" xmlns="" w="9525">
                   <a:solidFill>
                     <a:srgbClr val="000000"/>
                   </a:solidFill>
@@ -4103,7 +4103,7 @@
             </a:ln>
             <a:extLst>
               <a:ext uri="{91240B29-F687-4f45-9708-019B960494DF}">
-                <a14:hiddenLine xmlns="" xmlns:a14="http://schemas.microsoft.com/office/drawing/2010/main" w="9525">
+                <a14:hiddenLine xmlns:a14="http://schemas.microsoft.com/office/drawing/2010/main" xmlns="" w="9525">
                   <a:solidFill>
                     <a:srgbClr val="000000"/>
                   </a:solidFill>
@@ -4193,7 +4193,7 @@
             </a:ln>
             <a:extLst>
               <a:ext uri="{91240B29-F687-4f45-9708-019B960494DF}">
-                <a14:hiddenLine xmlns="" xmlns:a14="http://schemas.microsoft.com/office/drawing/2010/main" w="9525">
+                <a14:hiddenLine xmlns:a14="http://schemas.microsoft.com/office/drawing/2010/main" xmlns="" w="9525">
                   <a:solidFill>
                     <a:srgbClr val="000000"/>
                   </a:solidFill>
@@ -4283,7 +4283,7 @@
             </a:ln>
             <a:extLst>
               <a:ext uri="{91240B29-F687-4f45-9708-019B960494DF}">
-                <a14:hiddenLine xmlns="" xmlns:a14="http://schemas.microsoft.com/office/drawing/2010/main" w="9525">
+                <a14:hiddenLine xmlns:a14="http://schemas.microsoft.com/office/drawing/2010/main" xmlns="" w="9525">
                   <a:solidFill>
                     <a:srgbClr val="000000"/>
                   </a:solidFill>
@@ -4345,7 +4345,7 @@
             </a:ln>
             <a:extLst>
               <a:ext uri="{91240B29-F687-4f45-9708-019B960494DF}">
-                <a14:hiddenLine xmlns="" xmlns:a14="http://schemas.microsoft.com/office/drawing/2010/main" w="9525">
+                <a14:hiddenLine xmlns:a14="http://schemas.microsoft.com/office/drawing/2010/main" xmlns="" w="9525">
                   <a:solidFill>
                     <a:srgbClr val="000000"/>
                   </a:solidFill>
@@ -4465,7 +4465,7 @@
             </a:ln>
             <a:extLst>
               <a:ext uri="{91240B29-F687-4f45-9708-019B960494DF}">
-                <a14:hiddenLine xmlns="" xmlns:a14="http://schemas.microsoft.com/office/drawing/2010/main" w="9525">
+                <a14:hiddenLine xmlns:a14="http://schemas.microsoft.com/office/drawing/2010/main" xmlns="" w="9525">
                   <a:solidFill>
                     <a:srgbClr val="000000"/>
                   </a:solidFill>
@@ -4533,7 +4533,7 @@
             </a:ln>
             <a:extLst>
               <a:ext uri="{91240B29-F687-4f45-9708-019B960494DF}">
-                <a14:hiddenLine xmlns="" xmlns:a14="http://schemas.microsoft.com/office/drawing/2010/main" w="9525">
+                <a14:hiddenLine xmlns:a14="http://schemas.microsoft.com/office/drawing/2010/main" xmlns="" w="9525">
                   <a:solidFill>
                     <a:srgbClr val="000000"/>
                   </a:solidFill>
@@ -4623,7 +4623,7 @@
             </a:ln>
             <a:extLst>
               <a:ext uri="{91240B29-F687-4f45-9708-019B960494DF}">
-                <a14:hiddenLine xmlns="" xmlns:a14="http://schemas.microsoft.com/office/drawing/2010/main" w="9525">
+                <a14:hiddenLine xmlns:a14="http://schemas.microsoft.com/office/drawing/2010/main" xmlns="" w="9525">
                   <a:solidFill>
                     <a:srgbClr val="000000"/>
                   </a:solidFill>
@@ -4763,7 +4763,7 @@
           <a:p>
             <a:fld id="{2E6956D0-FF82-46DA-9F38-706DC86F0D56}" type="datetime1">
               <a:rPr lang="en-US" smtClean="0"/>
-              <a:t>3/12/2025</a:t>
+              <a:t>3/14/2025</a:t>
             </a:fld>
             <a:endParaRPr lang="en-US" dirty="0"/>
           </a:p>
@@ -5058,7 +5058,7 @@
           <a:p>
             <a:fld id="{B29A0609-7FEE-4DC0-9780-D623E024975E}" type="datetime1">
               <a:rPr lang="en-US" smtClean="0"/>
-              <a:t>3/12/2025</a:t>
+              <a:t>3/14/2025</a:t>
             </a:fld>
             <a:endParaRPr lang="en-US" dirty="0"/>
           </a:p>
@@ -5252,7 +5252,7 @@
           <a:p>
             <a:fld id="{D8595C36-295C-44A6-AB85-859B320446F8}" type="datetime1">
               <a:rPr lang="en-US" smtClean="0"/>
-              <a:t>3/12/2025</a:t>
+              <a:t>3/14/2025</a:t>
             </a:fld>
             <a:endParaRPr lang="en-US" dirty="0"/>
           </a:p>
@@ -5513,7 +5513,7 @@
           <a:p>
             <a:fld id="{99F217E4-37B9-4791-A38E-D8BC4AED1ACB}" type="datetime1">
               <a:rPr lang="en-US" smtClean="0"/>
-              <a:t>3/12/2025</a:t>
+              <a:t>3/14/2025</a:t>
             </a:fld>
             <a:endParaRPr lang="en-US" dirty="0"/>
           </a:p>
@@ -5946,7 +5946,7 @@
           <a:p>
             <a:fld id="{7326BBBD-F342-45E3-84E1-84BE66868B86}" type="datetime1">
               <a:rPr lang="en-US" smtClean="0"/>
-              <a:t>3/12/2025</a:t>
+              <a:t>3/14/2025</a:t>
             </a:fld>
             <a:endParaRPr lang="en-US" dirty="0"/>
           </a:p>
@@ -6491,7 +6491,7 @@
           <a:p>
             <a:fld id="{BF8B92E3-5D56-4D9D-A69E-DE111053FD9E}" type="datetime1">
               <a:rPr lang="en-US" smtClean="0"/>
-              <a:t>3/12/2025</a:t>
+              <a:t>3/14/2025</a:t>
             </a:fld>
             <a:endParaRPr lang="en-US" dirty="0"/>
           </a:p>
@@ -7209,7 +7209,7 @@
           <a:p>
             <a:fld id="{5530DBAB-C152-4B13-894C-B845E59C3017}" type="datetime1">
               <a:rPr lang="en-US" smtClean="0"/>
-              <a:t>3/12/2025</a:t>
+              <a:t>3/14/2025</a:t>
             </a:fld>
             <a:endParaRPr lang="en-US" dirty="0"/>
           </a:p>
@@ -7377,7 +7377,7 @@
           <a:p>
             <a:fld id="{5A1A901B-AC15-4CE2-B187-E1906D80C40A}" type="datetime1">
               <a:rPr lang="en-US" smtClean="0"/>
-              <a:t>3/12/2025</a:t>
+              <a:t>3/14/2025</a:t>
             </a:fld>
             <a:endParaRPr lang="en-US" dirty="0"/>
           </a:p>
@@ -7555,7 +7555,7 @@
           <a:p>
             <a:fld id="{173BF05D-F707-4D33-BC3D-A422F7F8BD2C}" type="datetime1">
               <a:rPr lang="en-US" smtClean="0"/>
-              <a:t>3/12/2025</a:t>
+              <a:t>3/14/2025</a:t>
             </a:fld>
             <a:endParaRPr lang="en-US" dirty="0"/>
           </a:p>
@@ -7723,7 +7723,7 @@
           <a:p>
             <a:fld id="{8EE2707C-063E-46D3-BE25-A9A8D80E43A6}" type="datetime1">
               <a:rPr lang="en-US" smtClean="0"/>
-              <a:t>3/12/2025</a:t>
+              <a:t>3/14/2025</a:t>
             </a:fld>
             <a:endParaRPr lang="en-US" dirty="0"/>
           </a:p>
@@ -7976,7 +7976,7 @@
           <a:p>
             <a:fld id="{DE2BBCB1-03A1-4E25-BBBE-484FF07E9034}" type="datetime1">
               <a:rPr lang="en-US" smtClean="0"/>
-              <a:t>3/12/2025</a:t>
+              <a:t>3/14/2025</a:t>
             </a:fld>
             <a:endParaRPr lang="en-US" dirty="0"/>
           </a:p>
@@ -8206,7 +8206,7 @@
           <a:p>
             <a:fld id="{32AE1E5B-2754-4F28-8433-77BB8DA5C10A}" type="datetime1">
               <a:rPr lang="en-US" smtClean="0"/>
-              <a:t>3/12/2025</a:t>
+              <a:t>3/14/2025</a:t>
             </a:fld>
             <a:endParaRPr lang="en-US" dirty="0"/>
           </a:p>
@@ -8585,7 +8585,7 @@
           <a:p>
             <a:fld id="{A949E13A-A720-4FA7-B4C3-D48667EC44AE}" type="datetime1">
               <a:rPr lang="en-US" smtClean="0"/>
-              <a:t>3/12/2025</a:t>
+              <a:t>3/14/2025</a:t>
             </a:fld>
             <a:endParaRPr lang="en-US" dirty="0"/>
           </a:p>
@@ -8701,7 +8701,7 @@
           <a:p>
             <a:fld id="{8907D086-5A12-4193-995F-F84EC02B1AD8}" type="datetime1">
               <a:rPr lang="en-US" smtClean="0"/>
-              <a:t>3/12/2025</a:t>
+              <a:t>3/14/2025</a:t>
             </a:fld>
             <a:endParaRPr lang="en-US" dirty="0"/>
           </a:p>
@@ -8794,7 +8794,7 @@
           <a:p>
             <a:fld id="{AE68C3A2-0540-4972-9AF7-3C65A04AEEB6}" type="datetime1">
               <a:rPr lang="en-US" smtClean="0"/>
-              <a:t>3/12/2025</a:t>
+              <a:t>3/14/2025</a:t>
             </a:fld>
             <a:endParaRPr lang="en-US" dirty="0"/>
           </a:p>
@@ -9041,7 +9041,7 @@
           <a:p>
             <a:fld id="{E1972B15-44AC-4DC1-B1E2-4E855788D9BC}" type="datetime1">
               <a:rPr lang="en-US" smtClean="0"/>
-              <a:t>3/12/2025</a:t>
+              <a:t>3/14/2025</a:t>
             </a:fld>
             <a:endParaRPr lang="en-US" dirty="0"/>
           </a:p>
@@ -9319,7 +9319,7 @@
           <a:p>
             <a:fld id="{35586A4F-619C-4F02-A396-839181AC6BB4}" type="datetime1">
               <a:rPr lang="en-US" smtClean="0"/>
-              <a:t>3/12/2025</a:t>
+              <a:t>3/14/2025</a:t>
             </a:fld>
             <a:endParaRPr lang="en-US" dirty="0"/>
           </a:p>
@@ -9433,7 +9433,7 @@
           <a:noFill/>
           <a:extLst>
             <a:ext uri="{909E8E84-426E-40dd-AFC4-6F175D3DCCD1}">
-              <a14:hiddenFill xmlns="" xmlns:a14="http://schemas.microsoft.com/office/drawing/2010/main">
+              <a14:hiddenFill xmlns:a14="http://schemas.microsoft.com/office/drawing/2010/main" xmlns="">
                 <a:solidFill>
                   <a:srgbClr val="FFFFFF"/>
                 </a:solidFill>
@@ -9507,7 +9507,7 @@
               </a:ln>
               <a:extLst>
                 <a:ext uri="{91240B29-F687-4f45-9708-019B960494DF}">
-                  <a14:hiddenLine xmlns="" xmlns:a14="http://schemas.microsoft.com/office/drawing/2010/main" w="9525">
+                  <a14:hiddenLine xmlns:a14="http://schemas.microsoft.com/office/drawing/2010/main" xmlns="" w="9525">
                     <a:solidFill>
                       <a:srgbClr val="000000"/>
                     </a:solidFill>
@@ -9597,7 +9597,7 @@
               </a:ln>
               <a:extLst>
                 <a:ext uri="{91240B29-F687-4f45-9708-019B960494DF}">
-                  <a14:hiddenLine xmlns="" xmlns:a14="http://schemas.microsoft.com/office/drawing/2010/main" w="9525">
+                  <a14:hiddenLine xmlns:a14="http://schemas.microsoft.com/office/drawing/2010/main" xmlns="" w="9525">
                     <a:solidFill>
                       <a:srgbClr val="000000"/>
                     </a:solidFill>
@@ -9687,7 +9687,7 @@
               </a:ln>
               <a:extLst>
                 <a:ext uri="{91240B29-F687-4f45-9708-019B960494DF}">
-                  <a14:hiddenLine xmlns="" xmlns:a14="http://schemas.microsoft.com/office/drawing/2010/main" w="9525">
+                  <a14:hiddenLine xmlns:a14="http://schemas.microsoft.com/office/drawing/2010/main" xmlns="" w="9525">
                     <a:solidFill>
                       <a:srgbClr val="000000"/>
                     </a:solidFill>
@@ -9749,7 +9749,7 @@
               </a:ln>
               <a:extLst>
                 <a:ext uri="{91240B29-F687-4f45-9708-019B960494DF}">
-                  <a14:hiddenLine xmlns="" xmlns:a14="http://schemas.microsoft.com/office/drawing/2010/main" w="9525">
+                  <a14:hiddenLine xmlns:a14="http://schemas.microsoft.com/office/drawing/2010/main" xmlns="" w="9525">
                     <a:solidFill>
                       <a:srgbClr val="000000"/>
                     </a:solidFill>
@@ -9839,7 +9839,7 @@
               </a:ln>
               <a:extLst>
                 <a:ext uri="{91240B29-F687-4f45-9708-019B960494DF}">
-                  <a14:hiddenLine xmlns="" xmlns:a14="http://schemas.microsoft.com/office/drawing/2010/main" w="9525">
+                  <a14:hiddenLine xmlns:a14="http://schemas.microsoft.com/office/drawing/2010/main" xmlns="" w="9525">
                     <a:solidFill>
                       <a:srgbClr val="000000"/>
                     </a:solidFill>
@@ -9901,7 +9901,7 @@
               </a:ln>
               <a:extLst>
                 <a:ext uri="{91240B29-F687-4f45-9708-019B960494DF}">
-                  <a14:hiddenLine xmlns="" xmlns:a14="http://schemas.microsoft.com/office/drawing/2010/main" w="9525">
+                  <a14:hiddenLine xmlns:a14="http://schemas.microsoft.com/office/drawing/2010/main" xmlns="" w="9525">
                     <a:solidFill>
                       <a:srgbClr val="000000"/>
                     </a:solidFill>
@@ -9963,7 +9963,7 @@
               </a:ln>
               <a:extLst>
                 <a:ext uri="{91240B29-F687-4f45-9708-019B960494DF}">
-                  <a14:hiddenLine xmlns="" xmlns:a14="http://schemas.microsoft.com/office/drawing/2010/main" w="9525">
+                  <a14:hiddenLine xmlns:a14="http://schemas.microsoft.com/office/drawing/2010/main" xmlns="" w="9525">
                     <a:solidFill>
                       <a:srgbClr val="000000"/>
                     </a:solidFill>
@@ -10053,7 +10053,7 @@
               </a:ln>
               <a:extLst>
                 <a:ext uri="{91240B29-F687-4f45-9708-019B960494DF}">
-                  <a14:hiddenLine xmlns="" xmlns:a14="http://schemas.microsoft.com/office/drawing/2010/main" w="9525">
+                  <a14:hiddenLine xmlns:a14="http://schemas.microsoft.com/office/drawing/2010/main" xmlns="" w="9525">
                     <a:solidFill>
                       <a:srgbClr val="000000"/>
                     </a:solidFill>
@@ -10143,7 +10143,7 @@
               </a:ln>
               <a:extLst>
                 <a:ext uri="{91240B29-F687-4f45-9708-019B960494DF}">
-                  <a14:hiddenLine xmlns="" xmlns:a14="http://schemas.microsoft.com/office/drawing/2010/main" w="9525">
+                  <a14:hiddenLine xmlns:a14="http://schemas.microsoft.com/office/drawing/2010/main" xmlns="" w="9525">
                     <a:solidFill>
                       <a:srgbClr val="000000"/>
                     </a:solidFill>
@@ -10205,7 +10205,7 @@
               </a:ln>
               <a:extLst>
                 <a:ext uri="{91240B29-F687-4f45-9708-019B960494DF}">
-                  <a14:hiddenLine xmlns="" xmlns:a14="http://schemas.microsoft.com/office/drawing/2010/main" w="9525">
+                  <a14:hiddenLine xmlns:a14="http://schemas.microsoft.com/office/drawing/2010/main" xmlns="" w="9525">
                     <a:solidFill>
                       <a:srgbClr val="000000"/>
                     </a:solidFill>
@@ -10315,7 +10315,7 @@
               </a:ln>
               <a:extLst>
                 <a:ext uri="{91240B29-F687-4f45-9708-019B960494DF}">
-                  <a14:hiddenLine xmlns="" xmlns:a14="http://schemas.microsoft.com/office/drawing/2010/main" w="9525">
+                  <a14:hiddenLine xmlns:a14="http://schemas.microsoft.com/office/drawing/2010/main" xmlns="" w="9525">
                     <a:solidFill>
                       <a:srgbClr val="000000"/>
                     </a:solidFill>
@@ -10399,7 +10399,7 @@
               </a:ln>
               <a:extLst>
                 <a:ext uri="{91240B29-F687-4f45-9708-019B960494DF}">
-                  <a14:hiddenLine xmlns="" xmlns:a14="http://schemas.microsoft.com/office/drawing/2010/main" w="9525">
+                  <a14:hiddenLine xmlns:a14="http://schemas.microsoft.com/office/drawing/2010/main" xmlns="" w="9525">
                     <a:solidFill>
                       <a:srgbClr val="000000"/>
                     </a:solidFill>
@@ -10461,7 +10461,7 @@
               </a:ln>
               <a:extLst>
                 <a:ext uri="{91240B29-F687-4f45-9708-019B960494DF}">
-                  <a14:hiddenLine xmlns="" xmlns:a14="http://schemas.microsoft.com/office/drawing/2010/main" w="9525">
+                  <a14:hiddenLine xmlns:a14="http://schemas.microsoft.com/office/drawing/2010/main" xmlns="" w="9525">
                     <a:solidFill>
                       <a:srgbClr val="000000"/>
                     </a:solidFill>
@@ -10523,7 +10523,7 @@
               </a:ln>
               <a:extLst>
                 <a:ext uri="{91240B29-F687-4f45-9708-019B960494DF}">
-                  <a14:hiddenLine xmlns="" xmlns:a14="http://schemas.microsoft.com/office/drawing/2010/main" w="9525">
+                  <a14:hiddenLine xmlns:a14="http://schemas.microsoft.com/office/drawing/2010/main" xmlns="" w="9525">
                     <a:solidFill>
                       <a:srgbClr val="000000"/>
                     </a:solidFill>
@@ -10613,7 +10613,7 @@
               </a:ln>
               <a:extLst>
                 <a:ext uri="{91240B29-F687-4f45-9708-019B960494DF}">
-                  <a14:hiddenLine xmlns="" xmlns:a14="http://schemas.microsoft.com/office/drawing/2010/main" w="9525">
+                  <a14:hiddenLine xmlns:a14="http://schemas.microsoft.com/office/drawing/2010/main" xmlns="" w="9525">
                     <a:solidFill>
                       <a:srgbClr val="000000"/>
                     </a:solidFill>
@@ -10647,7 +10647,7 @@
               </a:ln>
               <a:extLst>
                 <a:ext uri="{91240B29-F687-4f45-9708-019B960494DF}">
-                  <a14:hiddenLine xmlns="" xmlns:a14="http://schemas.microsoft.com/office/drawing/2010/main" w="9525">
+                  <a14:hiddenLine xmlns:a14="http://schemas.microsoft.com/office/drawing/2010/main" xmlns="" w="9525">
                     <a:solidFill>
                       <a:srgbClr val="000000"/>
                     </a:solidFill>
@@ -10712,7 +10712,7 @@
               </a:ln>
               <a:extLst>
                 <a:ext uri="{91240B29-F687-4f45-9708-019B960494DF}">
-                  <a14:hiddenLine xmlns="" xmlns:a14="http://schemas.microsoft.com/office/drawing/2010/main" w="9525">
+                  <a14:hiddenLine xmlns:a14="http://schemas.microsoft.com/office/drawing/2010/main" xmlns="" w="9525">
                     <a:solidFill>
                       <a:srgbClr val="000000"/>
                     </a:solidFill>
@@ -10802,7 +10802,7 @@
               </a:ln>
               <a:extLst>
                 <a:ext uri="{91240B29-F687-4f45-9708-019B960494DF}">
-                  <a14:hiddenLine xmlns="" xmlns:a14="http://schemas.microsoft.com/office/drawing/2010/main" w="9525">
+                  <a14:hiddenLine xmlns:a14="http://schemas.microsoft.com/office/drawing/2010/main" xmlns="" w="9525">
                     <a:solidFill>
                       <a:srgbClr val="000000"/>
                     </a:solidFill>
@@ -10864,7 +10864,7 @@
               </a:ln>
               <a:extLst>
                 <a:ext uri="{91240B29-F687-4f45-9708-019B960494DF}">
-                  <a14:hiddenLine xmlns="" xmlns:a14="http://schemas.microsoft.com/office/drawing/2010/main" w="9525">
+                  <a14:hiddenLine xmlns:a14="http://schemas.microsoft.com/office/drawing/2010/main" xmlns="" w="9525">
                     <a:solidFill>
                       <a:srgbClr val="000000"/>
                     </a:solidFill>
@@ -10954,7 +10954,7 @@
               </a:ln>
               <a:extLst>
                 <a:ext uri="{91240B29-F687-4f45-9708-019B960494DF}">
-                  <a14:hiddenLine xmlns="" xmlns:a14="http://schemas.microsoft.com/office/drawing/2010/main" w="9525">
+                  <a14:hiddenLine xmlns:a14="http://schemas.microsoft.com/office/drawing/2010/main" xmlns="" w="9525">
                     <a:solidFill>
                       <a:srgbClr val="000000"/>
                     </a:solidFill>
@@ -11019,7 +11019,7 @@
               </a:ln>
               <a:extLst>
                 <a:ext uri="{91240B29-F687-4f45-9708-019B960494DF}">
-                  <a14:hiddenLine xmlns="" xmlns:a14="http://schemas.microsoft.com/office/drawing/2010/main" w="9525">
+                  <a14:hiddenLine xmlns:a14="http://schemas.microsoft.com/office/drawing/2010/main" xmlns="" w="9525">
                     <a:solidFill>
                       <a:srgbClr val="000000"/>
                     </a:solidFill>
@@ -11081,7 +11081,7 @@
               </a:ln>
               <a:extLst>
                 <a:ext uri="{91240B29-F687-4f45-9708-019B960494DF}">
-                  <a14:hiddenLine xmlns="" xmlns:a14="http://schemas.microsoft.com/office/drawing/2010/main" w="9525">
+                  <a14:hiddenLine xmlns:a14="http://schemas.microsoft.com/office/drawing/2010/main" xmlns="" w="9525">
                     <a:solidFill>
                       <a:srgbClr val="000000"/>
                     </a:solidFill>
@@ -11171,7 +11171,7 @@
               </a:ln>
               <a:extLst>
                 <a:ext uri="{91240B29-F687-4f45-9708-019B960494DF}">
-                  <a14:hiddenLine xmlns="" xmlns:a14="http://schemas.microsoft.com/office/drawing/2010/main" w="9525">
+                  <a14:hiddenLine xmlns:a14="http://schemas.microsoft.com/office/drawing/2010/main" xmlns="" w="9525">
                     <a:solidFill>
                       <a:srgbClr val="000000"/>
                     </a:solidFill>
@@ -11261,7 +11261,7 @@
               </a:ln>
               <a:extLst>
                 <a:ext uri="{91240B29-F687-4f45-9708-019B960494DF}">
-                  <a14:hiddenLine xmlns="" xmlns:a14="http://schemas.microsoft.com/office/drawing/2010/main" w="9525">
+                  <a14:hiddenLine xmlns:a14="http://schemas.microsoft.com/office/drawing/2010/main" xmlns="" w="9525">
                     <a:solidFill>
                       <a:srgbClr val="000000"/>
                     </a:solidFill>
@@ -11326,7 +11326,7 @@
               </a:ln>
               <a:extLst>
                 <a:ext uri="{91240B29-F687-4f45-9708-019B960494DF}">
-                  <a14:hiddenLine xmlns="" xmlns:a14="http://schemas.microsoft.com/office/drawing/2010/main" w="9525">
+                  <a14:hiddenLine xmlns:a14="http://schemas.microsoft.com/office/drawing/2010/main" xmlns="" w="9525">
                     <a:solidFill>
                       <a:srgbClr val="000000"/>
                     </a:solidFill>
@@ -11446,7 +11446,7 @@
               </a:ln>
               <a:extLst>
                 <a:ext uri="{91240B29-F687-4f45-9708-019B960494DF}">
-                  <a14:hiddenLine xmlns="" xmlns:a14="http://schemas.microsoft.com/office/drawing/2010/main" w="9525">
+                  <a14:hiddenLine xmlns:a14="http://schemas.microsoft.com/office/drawing/2010/main" xmlns="" w="9525">
                     <a:solidFill>
                       <a:srgbClr val="000000"/>
                     </a:solidFill>
@@ -11544,7 +11544,7 @@
               </a:ln>
               <a:extLst>
                 <a:ext uri="{91240B29-F687-4f45-9708-019B960494DF}">
-                  <a14:hiddenLine xmlns="" xmlns:a14="http://schemas.microsoft.com/office/drawing/2010/main" w="9525">
+                  <a14:hiddenLine xmlns:a14="http://schemas.microsoft.com/office/drawing/2010/main" xmlns="" w="9525">
                     <a:solidFill>
                       <a:srgbClr val="000000"/>
                     </a:solidFill>
@@ -11659,7 +11659,7 @@
               </a:ln>
               <a:extLst>
                 <a:ext uri="{91240B29-F687-4f45-9708-019B960494DF}">
-                  <a14:hiddenLine xmlns="" xmlns:a14="http://schemas.microsoft.com/office/drawing/2010/main" w="9525">
+                  <a14:hiddenLine xmlns:a14="http://schemas.microsoft.com/office/drawing/2010/main" xmlns="" w="9525">
                     <a:solidFill>
                       <a:srgbClr val="000000"/>
                     </a:solidFill>
@@ -11749,7 +11749,7 @@
               </a:ln>
               <a:extLst>
                 <a:ext uri="{91240B29-F687-4f45-9708-019B960494DF}">
-                  <a14:hiddenLine xmlns="" xmlns:a14="http://schemas.microsoft.com/office/drawing/2010/main" w="9525">
+                  <a14:hiddenLine xmlns:a14="http://schemas.microsoft.com/office/drawing/2010/main" xmlns="" w="9525">
                     <a:solidFill>
                       <a:srgbClr val="000000"/>
                     </a:solidFill>
@@ -11814,7 +11814,7 @@
               </a:ln>
               <a:extLst>
                 <a:ext uri="{91240B29-F687-4f45-9708-019B960494DF}">
-                  <a14:hiddenLine xmlns="" xmlns:a14="http://schemas.microsoft.com/office/drawing/2010/main" w="9525">
+                  <a14:hiddenLine xmlns:a14="http://schemas.microsoft.com/office/drawing/2010/main" xmlns="" w="9525">
                     <a:solidFill>
                       <a:srgbClr val="000000"/>
                     </a:solidFill>
@@ -11904,7 +11904,7 @@
               </a:ln>
               <a:extLst>
                 <a:ext uri="{91240B29-F687-4f45-9708-019B960494DF}">
-                  <a14:hiddenLine xmlns="" xmlns:a14="http://schemas.microsoft.com/office/drawing/2010/main" w="9525">
+                  <a14:hiddenLine xmlns:a14="http://schemas.microsoft.com/office/drawing/2010/main" xmlns="" w="9525">
                     <a:solidFill>
                       <a:srgbClr val="000000"/>
                     </a:solidFill>
@@ -11972,7 +11972,7 @@
               </a:ln>
               <a:extLst>
                 <a:ext uri="{91240B29-F687-4f45-9708-019B960494DF}">
-                  <a14:hiddenLine xmlns="" xmlns:a14="http://schemas.microsoft.com/office/drawing/2010/main" w="9525">
+                  <a14:hiddenLine xmlns:a14="http://schemas.microsoft.com/office/drawing/2010/main" xmlns="" w="9525">
                     <a:solidFill>
                       <a:srgbClr val="000000"/>
                     </a:solidFill>
@@ -12062,7 +12062,7 @@
               </a:ln>
               <a:extLst>
                 <a:ext uri="{91240B29-F687-4f45-9708-019B960494DF}">
-                  <a14:hiddenLine xmlns="" xmlns:a14="http://schemas.microsoft.com/office/drawing/2010/main" w="9525">
+                  <a14:hiddenLine xmlns:a14="http://schemas.microsoft.com/office/drawing/2010/main" xmlns="" w="9525">
                     <a:solidFill>
                       <a:srgbClr val="000000"/>
                     </a:solidFill>
@@ -12130,7 +12130,7 @@
               </a:ln>
               <a:extLst>
                 <a:ext uri="{91240B29-F687-4f45-9708-019B960494DF}">
-                  <a14:hiddenLine xmlns="" xmlns:a14="http://schemas.microsoft.com/office/drawing/2010/main" w="9525">
+                  <a14:hiddenLine xmlns:a14="http://schemas.microsoft.com/office/drawing/2010/main" xmlns="" w="9525">
                     <a:solidFill>
                       <a:srgbClr val="000000"/>
                     </a:solidFill>
@@ -12220,7 +12220,7 @@
               </a:ln>
               <a:extLst>
                 <a:ext uri="{91240B29-F687-4f45-9708-019B960494DF}">
-                  <a14:hiddenLine xmlns="" xmlns:a14="http://schemas.microsoft.com/office/drawing/2010/main" w="9525">
+                  <a14:hiddenLine xmlns:a14="http://schemas.microsoft.com/office/drawing/2010/main" xmlns="" w="9525">
                     <a:solidFill>
                       <a:srgbClr val="000000"/>
                     </a:solidFill>
@@ -12254,7 +12254,7 @@
               </a:ln>
               <a:extLst>
                 <a:ext uri="{91240B29-F687-4f45-9708-019B960494DF}">
-                  <a14:hiddenLine xmlns="" xmlns:a14="http://schemas.microsoft.com/office/drawing/2010/main" w="9525">
+                  <a14:hiddenLine xmlns:a14="http://schemas.microsoft.com/office/drawing/2010/main" xmlns="" w="9525">
                     <a:solidFill>
                       <a:srgbClr val="000000"/>
                     </a:solidFill>
@@ -12394,7 +12394,7 @@
           <a:p>
             <a:fld id="{9C2E08F3-6ADB-4031-89E6-89707F5CDBB1}" type="datetime1">
               <a:rPr lang="en-US" smtClean="0"/>
-              <a:t>3/12/2025</a:t>
+              <a:t>3/14/2025</a:t>
             </a:fld>
             <a:endParaRPr lang="en-US" dirty="0"/>
           </a:p>
@@ -12947,7 +12947,7 @@
           <a:p>
             <a:fld id="{DEAE2368-4D5B-4100-AD00-D730DAA20AC8}" type="datetime1">
               <a:rPr lang="en-US" smtClean="0"/>
-              <a:t>3/12/2025</a:t>
+              <a:t>3/14/2025</a:t>
             </a:fld>
             <a:endParaRPr lang="en-US" dirty="0"/>
           </a:p>
@@ -13040,7 +13040,7 @@
           <a:p>
             <a:fld id="{8EE2707C-063E-46D3-BE25-A9A8D80E43A6}" type="datetime1">
               <a:rPr lang="en-US" smtClean="0"/>
-              <a:t>3/12/2025</a:t>
+              <a:t>3/14/2025</a:t>
             </a:fld>
             <a:endParaRPr lang="en-US" dirty="0"/>
           </a:p>
@@ -13195,7 +13195,7 @@
           <a:p>
             <a:fld id="{8EE2707C-063E-46D3-BE25-A9A8D80E43A6}" type="datetime1">
               <a:rPr lang="en-US" smtClean="0"/>
-              <a:t>3/12/2025</a:t>
+              <a:t>3/14/2025</a:t>
             </a:fld>
             <a:endParaRPr lang="en-US" dirty="0"/>
           </a:p>
@@ -13607,7 +13607,7 @@
                   <a:schemeClr val="bg1"/>
                 </a:solidFill>
               </a:rPr>
-              <a:t>3/12/2025</a:t>
+              <a:t>3/14/2025</a:t>
             </a:fld>
             <a:endParaRPr lang="en-US" dirty="0">
               <a:solidFill>
@@ -13639,18 +13639,13 @@
           <a:lstStyle/>
           <a:p>
             <a:r>
-              <a:rPr lang="en-US">
+              <a:rPr lang="en-US" dirty="0">
                 <a:solidFill>
                   <a:schemeClr val="bg1"/>
                 </a:solidFill>
               </a:rPr>
               <a:t>Copyright Business Cyber Guardian™ (BCG) 2018-2025</a:t>
             </a:r>
-            <a:endParaRPr lang="en-US" dirty="0">
-              <a:solidFill>
-                <a:schemeClr val="bg1"/>
-              </a:solidFill>
-            </a:endParaRPr>
           </a:p>
         </p:txBody>
       </p:sp>
@@ -13707,7 +13702,7 @@
           <a:p>
             <a:fld id="{8EE2707C-063E-46D3-BE25-A9A8D80E43A6}" type="datetime1">
               <a:rPr lang="en-US" smtClean="0"/>
-              <a:t>3/12/2025</a:t>
+              <a:t>3/14/2025</a:t>
             </a:fld>
             <a:endParaRPr lang="en-US" dirty="0"/>
           </a:p>
@@ -14033,7 +14028,7 @@
                   <a:schemeClr val="bg1"/>
                 </a:solidFill>
               </a:rPr>
-              <a:t>3/12/2025</a:t>
+              <a:t>3/14/2025</a:t>
             </a:fld>
             <a:endParaRPr lang="en-US" dirty="0">
               <a:solidFill>
@@ -14188,7 +14183,7 @@
         </p:spPr>
         <p:txBody>
           <a:bodyPr>
-            <a:normAutofit/>
+            <a:normAutofit fontScale="92500" lnSpcReduction="20000"/>
           </a:bodyPr>
           <a:lstStyle/>
           <a:p>
@@ -14218,7 +14213,7 @@
                   <a:schemeClr val="bg1"/>
                 </a:solidFill>
               </a:rPr>
-              <a:t>Produced by an authorized signatory, see </a:t>
+              <a:t>Produced by an authorized signatory (Issuer), see </a:t>
             </a:r>
             <a:r>
               <a:rPr lang="en-US" dirty="0">
@@ -14262,6 +14257,16 @@
                 </a:solidFill>
               </a:rPr>
               <a:t>A high Integrity registration policy process prevents unauthorized parties from placing Software Product “Trust Declarations” in the Trust Registry</a:t>
+            </a:r>
+          </a:p>
+          <a:p>
+            <a:r>
+              <a:rPr lang="en-US" dirty="0">
+                <a:solidFill>
+                  <a:schemeClr val="bg1"/>
+                </a:solidFill>
+              </a:rPr>
+              <a:t>Trust Registry “Registration Policies” are implemented and enforced by the Trust Registry “Gatekeeper” within the Transparency Service Provider</a:t>
             </a:r>
           </a:p>
           <a:p>
@@ -14333,7 +14338,7 @@
                   <a:schemeClr val="bg1"/>
                 </a:solidFill>
               </a:rPr>
-              <a:t>3/12/2025</a:t>
+              <a:t>3/14/2025</a:t>
             </a:fld>
             <a:endParaRPr lang="en-US" dirty="0">
               <a:solidFill>
@@ -14402,7 +14407,7 @@
         </p:blipFill>
         <p:spPr>
           <a:xfrm>
-            <a:off x="9090734" y="4693332"/>
+            <a:off x="8531440" y="4808746"/>
             <a:ext cx="943257" cy="461636"/>
           </a:xfrm>
           <a:prstGeom prst="rect">
@@ -14554,7 +14559,7 @@
                   <a:schemeClr val="bg1"/>
                 </a:solidFill>
               </a:rPr>
-              <a:t>Statistically calculated using 62 factors across 7 risk categories</a:t>
+              <a:t>Statistically calculated using 62 risk factors across 7 risk categories</a:t>
             </a:r>
           </a:p>
           <a:p>
@@ -14698,7 +14703,7 @@
                   <a:schemeClr val="bg1"/>
                 </a:solidFill>
               </a:rPr>
-              <a:t>3/12/2025</a:t>
+              <a:t>3/14/2025</a:t>
             </a:fld>
             <a:endParaRPr lang="en-US" dirty="0">
               <a:solidFill>
@@ -14798,7 +14803,7 @@
           <a:p>
             <a:fld id="{8EE2707C-063E-46D3-BE25-A9A8D80E43A6}" type="datetime1">
               <a:rPr lang="en-US" smtClean="0"/>
-              <a:t>3/12/2025</a:t>
+              <a:t>3/14/2025</a:t>
             </a:fld>
             <a:endParaRPr lang="en-US" dirty="0"/>
           </a:p>
@@ -15034,7 +15039,7 @@
             <a:fld id="{8F422B43-45D4-4608-9F03-122930498C43}" type="datetime1">
               <a:rPr lang="en-US" smtClean="0"/>
               <a:pPr/>
-              <a:t>3/12/2025</a:t>
+              <a:t>3/14/2025</a:t>
             </a:fld>
             <a:endParaRPr lang="en-US" dirty="0"/>
           </a:p>
@@ -15254,7 +15259,7 @@
                   <a:schemeClr val="tx1"/>
                 </a:solidFill>
               </a:rPr>
-              <a:t>Save evidence data in a tamper-proof form in SAG-CTR ™ and submit “Trust Declaration”</a:t>
+              <a:t>Save evidence data in a tamper-proof form in SAG-CTR ™ and submit “Trust Declaration” (Statement) to “Trust Registry”, SAG-CTR™</a:t>
             </a:r>
           </a:p>
         </p:txBody>
@@ -15600,7 +15605,7 @@
                   <a:schemeClr val="bg1"/>
                 </a:solidFill>
               </a:rPr>
-              <a:t>3/12/2025</a:t>
+              <a:t>3/14/2025</a:t>
             </a:fld>
             <a:endParaRPr lang="en-US" dirty="0">
               <a:solidFill>
@@ -15723,7 +15728,7 @@
           <a:p>
             <a:fld id="{8EE2707C-063E-46D3-BE25-A9A8D80E43A6}" type="datetime1">
               <a:rPr lang="en-US" smtClean="0"/>
-              <a:t>3/12/2025</a:t>
+              <a:t>3/14/2025</a:t>
             </a:fld>
             <a:endParaRPr lang="en-US" dirty="0"/>
           </a:p>
@@ -15946,7 +15951,7 @@
           <a:p>
             <a:fld id="{8EE2707C-063E-46D3-BE25-A9A8D80E43A6}" type="datetime1">
               <a:rPr lang="en-US" smtClean="0"/>
-              <a:t>3/12/2025</a:t>
+              <a:t>3/14/2025</a:t>
             </a:fld>
             <a:endParaRPr lang="en-US" dirty="0"/>
           </a:p>
@@ -16207,7 +16212,7 @@
           <a:p>
             <a:fld id="{8EE2707C-063E-46D3-BE25-A9A8D80E43A6}" type="datetime1">
               <a:rPr lang="en-US" smtClean="0"/>
-              <a:t>3/12/2025</a:t>
+              <a:t>3/14/2025</a:t>
             </a:fld>
             <a:endParaRPr lang="en-US" dirty="0"/>
           </a:p>

</xml_diff>

<commit_message>
Align more with CISA SAG SCRM requirements
</commit_message>
<xml_diff>
--- a/20250321-SAG-CTR.pptx
+++ b/20250321-SAG-CTR.pptx
@@ -220,7 +220,7 @@
           <a:p>
             <a:fld id="{332E4851-9EEE-4C44-B0F3-632DB06B8768}" type="datetimeFigureOut">
               <a:rPr lang="en-US" smtClean="0"/>
-              <a:t>3/14/2025</a:t>
+              <a:t>3/15/2025</a:t>
             </a:fld>
             <a:endParaRPr lang="en-US"/>
           </a:p>
@@ -537,7 +537,7 @@
           <a:noFill/>
           <a:extLst>
             <a:ext uri="{909E8E84-426E-40dd-AFC4-6F175D3DCCD1}">
-              <a14:hiddenFill xmlns:a14="http://schemas.microsoft.com/office/drawing/2010/main" xmlns="">
+              <a14:hiddenFill xmlns="" xmlns:a14="http://schemas.microsoft.com/office/drawing/2010/main">
                 <a:solidFill>
                   <a:srgbClr val="FFFFFF"/>
                 </a:solidFill>
@@ -597,7 +597,7 @@
             </a:ln>
             <a:extLst>
               <a:ext uri="{91240B29-F687-4f45-9708-019B960494DF}">
-                <a14:hiddenLine xmlns:a14="http://schemas.microsoft.com/office/drawing/2010/main" xmlns="" w="9525">
+                <a14:hiddenLine xmlns="" xmlns:a14="http://schemas.microsoft.com/office/drawing/2010/main" w="9525">
                   <a:solidFill>
                     <a:srgbClr val="000000"/>
                   </a:solidFill>
@@ -687,7 +687,7 @@
             </a:ln>
             <a:extLst>
               <a:ext uri="{91240B29-F687-4f45-9708-019B960494DF}">
-                <a14:hiddenLine xmlns:a14="http://schemas.microsoft.com/office/drawing/2010/main" xmlns="" w="9525">
+                <a14:hiddenLine xmlns="" xmlns:a14="http://schemas.microsoft.com/office/drawing/2010/main" w="9525">
                   <a:solidFill>
                     <a:srgbClr val="000000"/>
                   </a:solidFill>
@@ -777,7 +777,7 @@
             </a:ln>
             <a:extLst>
               <a:ext uri="{91240B29-F687-4f45-9708-019B960494DF}">
-                <a14:hiddenLine xmlns:a14="http://schemas.microsoft.com/office/drawing/2010/main" xmlns="" w="9525">
+                <a14:hiddenLine xmlns="" xmlns:a14="http://schemas.microsoft.com/office/drawing/2010/main" w="9525">
                   <a:solidFill>
                     <a:srgbClr val="000000"/>
                   </a:solidFill>
@@ -811,7 +811,7 @@
             </a:ln>
             <a:extLst>
               <a:ext uri="{91240B29-F687-4f45-9708-019B960494DF}">
-                <a14:hiddenLine xmlns:a14="http://schemas.microsoft.com/office/drawing/2010/main" xmlns="" w="9525">
+                <a14:hiddenLine xmlns="" xmlns:a14="http://schemas.microsoft.com/office/drawing/2010/main" w="9525">
                   <a:solidFill>
                     <a:srgbClr val="000000"/>
                   </a:solidFill>
@@ -901,7 +901,7 @@
             </a:ln>
             <a:extLst>
               <a:ext uri="{91240B29-F687-4f45-9708-019B960494DF}">
-                <a14:hiddenLine xmlns:a14="http://schemas.microsoft.com/office/drawing/2010/main" xmlns="" w="9525">
+                <a14:hiddenLine xmlns="" xmlns:a14="http://schemas.microsoft.com/office/drawing/2010/main" w="9525">
                   <a:solidFill>
                     <a:srgbClr val="000000"/>
                   </a:solidFill>
@@ -963,7 +963,7 @@
             </a:ln>
             <a:extLst>
               <a:ext uri="{91240B29-F687-4f45-9708-019B960494DF}">
-                <a14:hiddenLine xmlns:a14="http://schemas.microsoft.com/office/drawing/2010/main" xmlns="" w="9525">
+                <a14:hiddenLine xmlns="" xmlns:a14="http://schemas.microsoft.com/office/drawing/2010/main" w="9525">
                   <a:solidFill>
                     <a:srgbClr val="000000"/>
                   </a:solidFill>
@@ -1025,7 +1025,7 @@
             </a:ln>
             <a:extLst>
               <a:ext uri="{91240B29-F687-4f45-9708-019B960494DF}">
-                <a14:hiddenLine xmlns:a14="http://schemas.microsoft.com/office/drawing/2010/main" xmlns="" w="9525">
+                <a14:hiddenLine xmlns="" xmlns:a14="http://schemas.microsoft.com/office/drawing/2010/main" w="9525">
                   <a:solidFill>
                     <a:srgbClr val="000000"/>
                   </a:solidFill>
@@ -1115,7 +1115,7 @@
             </a:ln>
             <a:extLst>
               <a:ext uri="{91240B29-F687-4f45-9708-019B960494DF}">
-                <a14:hiddenLine xmlns:a14="http://schemas.microsoft.com/office/drawing/2010/main" xmlns="" w="9525">
+                <a14:hiddenLine xmlns="" xmlns:a14="http://schemas.microsoft.com/office/drawing/2010/main" w="9525">
                   <a:solidFill>
                     <a:srgbClr val="000000"/>
                   </a:solidFill>
@@ -1177,7 +1177,7 @@
             </a:ln>
             <a:extLst>
               <a:ext uri="{91240B29-F687-4f45-9708-019B960494DF}">
-                <a14:hiddenLine xmlns:a14="http://schemas.microsoft.com/office/drawing/2010/main" xmlns="" w="9525">
+                <a14:hiddenLine xmlns="" xmlns:a14="http://schemas.microsoft.com/office/drawing/2010/main" w="9525">
                   <a:solidFill>
                     <a:srgbClr val="000000"/>
                   </a:solidFill>
@@ -1239,7 +1239,7 @@
             </a:ln>
             <a:extLst>
               <a:ext uri="{91240B29-F687-4f45-9708-019B960494DF}">
-                <a14:hiddenLine xmlns:a14="http://schemas.microsoft.com/office/drawing/2010/main" xmlns="" w="9525">
+                <a14:hiddenLine xmlns="" xmlns:a14="http://schemas.microsoft.com/office/drawing/2010/main" w="9525">
                   <a:solidFill>
                     <a:srgbClr val="000000"/>
                   </a:solidFill>
@@ -1329,7 +1329,7 @@
             </a:ln>
             <a:extLst>
               <a:ext uri="{91240B29-F687-4f45-9708-019B960494DF}">
-                <a14:hiddenLine xmlns:a14="http://schemas.microsoft.com/office/drawing/2010/main" xmlns="" w="9525">
+                <a14:hiddenLine xmlns="" xmlns:a14="http://schemas.microsoft.com/office/drawing/2010/main" w="9525">
                   <a:solidFill>
                     <a:srgbClr val="000000"/>
                   </a:solidFill>
@@ -1419,7 +1419,7 @@
             </a:ln>
             <a:extLst>
               <a:ext uri="{91240B29-F687-4f45-9708-019B960494DF}">
-                <a14:hiddenLine xmlns:a14="http://schemas.microsoft.com/office/drawing/2010/main" xmlns="" w="9525">
+                <a14:hiddenLine xmlns="" xmlns:a14="http://schemas.microsoft.com/office/drawing/2010/main" w="9525">
                   <a:solidFill>
                     <a:srgbClr val="000000"/>
                   </a:solidFill>
@@ -1481,7 +1481,7 @@
             </a:ln>
             <a:extLst>
               <a:ext uri="{91240B29-F687-4f45-9708-019B960494DF}">
-                <a14:hiddenLine xmlns:a14="http://schemas.microsoft.com/office/drawing/2010/main" xmlns="" w="9525">
+                <a14:hiddenLine xmlns="" xmlns:a14="http://schemas.microsoft.com/office/drawing/2010/main" w="9525">
                   <a:solidFill>
                     <a:srgbClr val="000000"/>
                   </a:solidFill>
@@ -1591,7 +1591,7 @@
             </a:ln>
             <a:extLst>
               <a:ext uri="{91240B29-F687-4f45-9708-019B960494DF}">
-                <a14:hiddenLine xmlns:a14="http://schemas.microsoft.com/office/drawing/2010/main" xmlns="" w="9525">
+                <a14:hiddenLine xmlns="" xmlns:a14="http://schemas.microsoft.com/office/drawing/2010/main" w="9525">
                   <a:solidFill>
                     <a:srgbClr val="000000"/>
                   </a:solidFill>
@@ -1653,7 +1653,7 @@
             </a:ln>
             <a:extLst>
               <a:ext uri="{91240B29-F687-4f45-9708-019B960494DF}">
-                <a14:hiddenLine xmlns:a14="http://schemas.microsoft.com/office/drawing/2010/main" xmlns="" w="9525">
+                <a14:hiddenLine xmlns="" xmlns:a14="http://schemas.microsoft.com/office/drawing/2010/main" w="9525">
                   <a:solidFill>
                     <a:srgbClr val="000000"/>
                   </a:solidFill>
@@ -1743,7 +1743,7 @@
             </a:ln>
             <a:extLst>
               <a:ext uri="{91240B29-F687-4f45-9708-019B960494DF}">
-                <a14:hiddenLine xmlns:a14="http://schemas.microsoft.com/office/drawing/2010/main" xmlns="" w="9525">
+                <a14:hiddenLine xmlns="" xmlns:a14="http://schemas.microsoft.com/office/drawing/2010/main" w="9525">
                   <a:solidFill>
                     <a:srgbClr val="000000"/>
                   </a:solidFill>
@@ -1833,7 +1833,7 @@
             </a:ln>
             <a:extLst>
               <a:ext uri="{91240B29-F687-4f45-9708-019B960494DF}">
-                <a14:hiddenLine xmlns:a14="http://schemas.microsoft.com/office/drawing/2010/main" xmlns="" w="9525">
+                <a14:hiddenLine xmlns="" xmlns:a14="http://schemas.microsoft.com/office/drawing/2010/main" w="9525">
                   <a:solidFill>
                     <a:srgbClr val="000000"/>
                   </a:solidFill>
@@ -1895,7 +1895,7 @@
             </a:ln>
             <a:extLst>
               <a:ext uri="{91240B29-F687-4f45-9708-019B960494DF}">
-                <a14:hiddenLine xmlns:a14="http://schemas.microsoft.com/office/drawing/2010/main" xmlns="" w="9525">
+                <a14:hiddenLine xmlns="" xmlns:a14="http://schemas.microsoft.com/office/drawing/2010/main" w="9525">
                   <a:solidFill>
                     <a:srgbClr val="000000"/>
                   </a:solidFill>
@@ -1985,7 +1985,7 @@
             </a:ln>
             <a:extLst>
               <a:ext uri="{91240B29-F687-4f45-9708-019B960494DF}">
-                <a14:hiddenLine xmlns:a14="http://schemas.microsoft.com/office/drawing/2010/main" xmlns="" w="9525">
+                <a14:hiddenLine xmlns="" xmlns:a14="http://schemas.microsoft.com/office/drawing/2010/main" w="9525">
                   <a:solidFill>
                     <a:srgbClr val="000000"/>
                   </a:solidFill>
@@ -2075,7 +2075,7 @@
             </a:ln>
             <a:extLst>
               <a:ext uri="{91240B29-F687-4f45-9708-019B960494DF}">
-                <a14:hiddenLine xmlns:a14="http://schemas.microsoft.com/office/drawing/2010/main" xmlns="" w="9525">
+                <a14:hiddenLine xmlns="" xmlns:a14="http://schemas.microsoft.com/office/drawing/2010/main" w="9525">
                   <a:solidFill>
                     <a:srgbClr val="000000"/>
                   </a:solidFill>
@@ -2131,7 +2131,7 @@
             </a:ln>
             <a:extLst>
               <a:ext uri="{91240B29-F687-4f45-9708-019B960494DF}">
-                <a14:hiddenLine xmlns:a14="http://schemas.microsoft.com/office/drawing/2010/main" xmlns="" w="9525">
+                <a14:hiddenLine xmlns="" xmlns:a14="http://schemas.microsoft.com/office/drawing/2010/main" w="9525">
                   <a:solidFill>
                     <a:srgbClr val="000000"/>
                   </a:solidFill>
@@ -2221,7 +2221,7 @@
             </a:ln>
             <a:extLst>
               <a:ext uri="{91240B29-F687-4f45-9708-019B960494DF}">
-                <a14:hiddenLine xmlns:a14="http://schemas.microsoft.com/office/drawing/2010/main" xmlns="" w="9525">
+                <a14:hiddenLine xmlns="" xmlns:a14="http://schemas.microsoft.com/office/drawing/2010/main" w="9525">
                   <a:solidFill>
                     <a:srgbClr val="000000"/>
                   </a:solidFill>
@@ -2277,7 +2277,7 @@
             </a:ln>
             <a:extLst>
               <a:ext uri="{91240B29-F687-4f45-9708-019B960494DF}">
-                <a14:hiddenLine xmlns:a14="http://schemas.microsoft.com/office/drawing/2010/main" xmlns="" w="9525">
+                <a14:hiddenLine xmlns="" xmlns:a14="http://schemas.microsoft.com/office/drawing/2010/main" w="9525">
                   <a:solidFill>
                     <a:srgbClr val="000000"/>
                   </a:solidFill>
@@ -2367,7 +2367,7 @@
             </a:ln>
             <a:extLst>
               <a:ext uri="{91240B29-F687-4f45-9708-019B960494DF}">
-                <a14:hiddenLine xmlns:a14="http://schemas.microsoft.com/office/drawing/2010/main" xmlns="" w="9525">
+                <a14:hiddenLine xmlns="" xmlns:a14="http://schemas.microsoft.com/office/drawing/2010/main" w="9525">
                   <a:solidFill>
                     <a:srgbClr val="000000"/>
                   </a:solidFill>
@@ -2435,7 +2435,7 @@
             </a:ln>
             <a:extLst>
               <a:ext uri="{91240B29-F687-4f45-9708-019B960494DF}">
-                <a14:hiddenLine xmlns:a14="http://schemas.microsoft.com/office/drawing/2010/main" xmlns="" w="9525">
+                <a14:hiddenLine xmlns="" xmlns:a14="http://schemas.microsoft.com/office/drawing/2010/main" w="9525">
                   <a:solidFill>
                     <a:srgbClr val="000000"/>
                   </a:solidFill>
@@ -2525,7 +2525,7 @@
             </a:ln>
             <a:extLst>
               <a:ext uri="{91240B29-F687-4f45-9708-019B960494DF}">
-                <a14:hiddenLine xmlns:a14="http://schemas.microsoft.com/office/drawing/2010/main" xmlns="" w="9525">
+                <a14:hiddenLine xmlns="" xmlns:a14="http://schemas.microsoft.com/office/drawing/2010/main" w="9525">
                   <a:solidFill>
                     <a:srgbClr val="000000"/>
                   </a:solidFill>
@@ -2593,7 +2593,7 @@
             </a:ln>
             <a:extLst>
               <a:ext uri="{91240B29-F687-4f45-9708-019B960494DF}">
-                <a14:hiddenLine xmlns:a14="http://schemas.microsoft.com/office/drawing/2010/main" xmlns="" w="9525">
+                <a14:hiddenLine xmlns="" xmlns:a14="http://schemas.microsoft.com/office/drawing/2010/main" w="9525">
                   <a:solidFill>
                     <a:srgbClr val="000000"/>
                   </a:solidFill>
@@ -2683,7 +2683,7 @@
             </a:ln>
             <a:extLst>
               <a:ext uri="{91240B29-F687-4f45-9708-019B960494DF}">
-                <a14:hiddenLine xmlns:a14="http://schemas.microsoft.com/office/drawing/2010/main" xmlns="" w="9525">
+                <a14:hiddenLine xmlns="" xmlns:a14="http://schemas.microsoft.com/office/drawing/2010/main" w="9525">
                   <a:solidFill>
                     <a:srgbClr val="000000"/>
                   </a:solidFill>
@@ -2717,7 +2717,7 @@
             </a:ln>
             <a:extLst>
               <a:ext uri="{91240B29-F687-4f45-9708-019B960494DF}">
-                <a14:hiddenLine xmlns:a14="http://schemas.microsoft.com/office/drawing/2010/main" xmlns="" w="9525">
+                <a14:hiddenLine xmlns="" xmlns:a14="http://schemas.microsoft.com/office/drawing/2010/main" w="9525">
                   <a:solidFill>
                     <a:srgbClr val="000000"/>
                   </a:solidFill>
@@ -2807,7 +2807,7 @@
             </a:ln>
             <a:extLst>
               <a:ext uri="{91240B29-F687-4f45-9708-019B960494DF}">
-                <a14:hiddenLine xmlns:a14="http://schemas.microsoft.com/office/drawing/2010/main" xmlns="" w="9525">
+                <a14:hiddenLine xmlns="" xmlns:a14="http://schemas.microsoft.com/office/drawing/2010/main" w="9525">
                   <a:solidFill>
                     <a:srgbClr val="000000"/>
                   </a:solidFill>
@@ -2869,7 +2869,7 @@
             </a:ln>
             <a:extLst>
               <a:ext uri="{91240B29-F687-4f45-9708-019B960494DF}">
-                <a14:hiddenLine xmlns:a14="http://schemas.microsoft.com/office/drawing/2010/main" xmlns="" w="9525">
+                <a14:hiddenLine xmlns="" xmlns:a14="http://schemas.microsoft.com/office/drawing/2010/main" w="9525">
                   <a:solidFill>
                     <a:srgbClr val="000000"/>
                   </a:solidFill>
@@ -2931,7 +2931,7 @@
             </a:ln>
             <a:extLst>
               <a:ext uri="{91240B29-F687-4f45-9708-019B960494DF}">
-                <a14:hiddenLine xmlns:a14="http://schemas.microsoft.com/office/drawing/2010/main" xmlns="" w="9525">
+                <a14:hiddenLine xmlns="" xmlns:a14="http://schemas.microsoft.com/office/drawing/2010/main" w="9525">
                   <a:solidFill>
                     <a:srgbClr val="000000"/>
                   </a:solidFill>
@@ -3021,7 +3021,7 @@
             </a:ln>
             <a:extLst>
               <a:ext uri="{91240B29-F687-4f45-9708-019B960494DF}">
-                <a14:hiddenLine xmlns:a14="http://schemas.microsoft.com/office/drawing/2010/main" xmlns="" w="9525">
+                <a14:hiddenLine xmlns="" xmlns:a14="http://schemas.microsoft.com/office/drawing/2010/main" w="9525">
                   <a:solidFill>
                     <a:srgbClr val="000000"/>
                   </a:solidFill>
@@ -3089,7 +3089,7 @@
             </a:ln>
             <a:extLst>
               <a:ext uri="{91240B29-F687-4f45-9708-019B960494DF}">
-                <a14:hiddenLine xmlns:a14="http://schemas.microsoft.com/office/drawing/2010/main" xmlns="" w="9525">
+                <a14:hiddenLine xmlns="" xmlns:a14="http://schemas.microsoft.com/office/drawing/2010/main" w="9525">
                   <a:solidFill>
                     <a:srgbClr val="000000"/>
                   </a:solidFill>
@@ -3151,7 +3151,7 @@
             </a:ln>
             <a:extLst>
               <a:ext uri="{91240B29-F687-4f45-9708-019B960494DF}">
-                <a14:hiddenLine xmlns:a14="http://schemas.microsoft.com/office/drawing/2010/main" xmlns="" w="9525">
+                <a14:hiddenLine xmlns="" xmlns:a14="http://schemas.microsoft.com/office/drawing/2010/main" w="9525">
                   <a:solidFill>
                     <a:srgbClr val="000000"/>
                   </a:solidFill>
@@ -3241,7 +3241,7 @@
             </a:ln>
             <a:extLst>
               <a:ext uri="{91240B29-F687-4f45-9708-019B960494DF}">
-                <a14:hiddenLine xmlns:a14="http://schemas.microsoft.com/office/drawing/2010/main" xmlns="" w="9525">
+                <a14:hiddenLine xmlns="" xmlns:a14="http://schemas.microsoft.com/office/drawing/2010/main" w="9525">
                   <a:solidFill>
                     <a:srgbClr val="000000"/>
                   </a:solidFill>
@@ -3303,7 +3303,7 @@
             </a:ln>
             <a:extLst>
               <a:ext uri="{91240B29-F687-4f45-9708-019B960494DF}">
-                <a14:hiddenLine xmlns:a14="http://schemas.microsoft.com/office/drawing/2010/main" xmlns="" w="9525">
+                <a14:hiddenLine xmlns="" xmlns:a14="http://schemas.microsoft.com/office/drawing/2010/main" w="9525">
                   <a:solidFill>
                     <a:srgbClr val="000000"/>
                   </a:solidFill>
@@ -3393,7 +3393,7 @@
             </a:ln>
             <a:extLst>
               <a:ext uri="{91240B29-F687-4f45-9708-019B960494DF}">
-                <a14:hiddenLine xmlns:a14="http://schemas.microsoft.com/office/drawing/2010/main" xmlns="" w="9525">
+                <a14:hiddenLine xmlns="" xmlns:a14="http://schemas.microsoft.com/office/drawing/2010/main" w="9525">
                   <a:solidFill>
                     <a:srgbClr val="000000"/>
                   </a:solidFill>
@@ -3455,7 +3455,7 @@
             </a:ln>
             <a:extLst>
               <a:ext uri="{91240B29-F687-4f45-9708-019B960494DF}">
-                <a14:hiddenLine xmlns:a14="http://schemas.microsoft.com/office/drawing/2010/main" xmlns="" w="9525">
+                <a14:hiddenLine xmlns="" xmlns:a14="http://schemas.microsoft.com/office/drawing/2010/main" w="9525">
                   <a:solidFill>
                     <a:srgbClr val="000000"/>
                   </a:solidFill>
@@ -3545,7 +3545,7 @@
             </a:ln>
             <a:extLst>
               <a:ext uri="{91240B29-F687-4f45-9708-019B960494DF}">
-                <a14:hiddenLine xmlns:a14="http://schemas.microsoft.com/office/drawing/2010/main" xmlns="" w="9525">
+                <a14:hiddenLine xmlns="" xmlns:a14="http://schemas.microsoft.com/office/drawing/2010/main" w="9525">
                   <a:solidFill>
                     <a:srgbClr val="000000"/>
                   </a:solidFill>
@@ -3579,7 +3579,7 @@
             </a:ln>
             <a:extLst>
               <a:ext uri="{91240B29-F687-4f45-9708-019B960494DF}">
-                <a14:hiddenLine xmlns:a14="http://schemas.microsoft.com/office/drawing/2010/main" xmlns="" w="9525">
+                <a14:hiddenLine xmlns="" xmlns:a14="http://schemas.microsoft.com/office/drawing/2010/main" w="9525">
                   <a:solidFill>
                     <a:srgbClr val="000000"/>
                   </a:solidFill>
@@ -3644,7 +3644,7 @@
             </a:ln>
             <a:extLst>
               <a:ext uri="{91240B29-F687-4f45-9708-019B960494DF}">
-                <a14:hiddenLine xmlns:a14="http://schemas.microsoft.com/office/drawing/2010/main" xmlns="" w="9525">
+                <a14:hiddenLine xmlns="" xmlns:a14="http://schemas.microsoft.com/office/drawing/2010/main" w="9525">
                   <a:solidFill>
                     <a:srgbClr val="000000"/>
                   </a:solidFill>
@@ -3734,7 +3734,7 @@
             </a:ln>
             <a:extLst>
               <a:ext uri="{91240B29-F687-4f45-9708-019B960494DF}">
-                <a14:hiddenLine xmlns:a14="http://schemas.microsoft.com/office/drawing/2010/main" xmlns="" w="9525">
+                <a14:hiddenLine xmlns="" xmlns:a14="http://schemas.microsoft.com/office/drawing/2010/main" w="9525">
                   <a:solidFill>
                     <a:srgbClr val="000000"/>
                   </a:solidFill>
@@ -3796,7 +3796,7 @@
             </a:ln>
             <a:extLst>
               <a:ext uri="{91240B29-F687-4f45-9708-019B960494DF}">
-                <a14:hiddenLine xmlns:a14="http://schemas.microsoft.com/office/drawing/2010/main" xmlns="" w="9525">
+                <a14:hiddenLine xmlns="" xmlns:a14="http://schemas.microsoft.com/office/drawing/2010/main" w="9525">
                   <a:solidFill>
                     <a:srgbClr val="000000"/>
                   </a:solidFill>
@@ -3886,7 +3886,7 @@
             </a:ln>
             <a:extLst>
               <a:ext uri="{91240B29-F687-4f45-9708-019B960494DF}">
-                <a14:hiddenLine xmlns:a14="http://schemas.microsoft.com/office/drawing/2010/main" xmlns="" w="9525">
+                <a14:hiddenLine xmlns="" xmlns:a14="http://schemas.microsoft.com/office/drawing/2010/main" w="9525">
                   <a:solidFill>
                     <a:srgbClr val="000000"/>
                   </a:solidFill>
@@ -3976,7 +3976,7 @@
             </a:ln>
             <a:extLst>
               <a:ext uri="{91240B29-F687-4f45-9708-019B960494DF}">
-                <a14:hiddenLine xmlns:a14="http://schemas.microsoft.com/office/drawing/2010/main" xmlns="" w="9525">
+                <a14:hiddenLine xmlns="" xmlns:a14="http://schemas.microsoft.com/office/drawing/2010/main" w="9525">
                   <a:solidFill>
                     <a:srgbClr val="000000"/>
                   </a:solidFill>
@@ -4041,7 +4041,7 @@
             </a:ln>
             <a:extLst>
               <a:ext uri="{91240B29-F687-4f45-9708-019B960494DF}">
-                <a14:hiddenLine xmlns:a14="http://schemas.microsoft.com/office/drawing/2010/main" xmlns="" w="9525">
+                <a14:hiddenLine xmlns="" xmlns:a14="http://schemas.microsoft.com/office/drawing/2010/main" w="9525">
                   <a:solidFill>
                     <a:srgbClr val="000000"/>
                   </a:solidFill>
@@ -4103,7 +4103,7 @@
             </a:ln>
             <a:extLst>
               <a:ext uri="{91240B29-F687-4f45-9708-019B960494DF}">
-                <a14:hiddenLine xmlns:a14="http://schemas.microsoft.com/office/drawing/2010/main" xmlns="" w="9525">
+                <a14:hiddenLine xmlns="" xmlns:a14="http://schemas.microsoft.com/office/drawing/2010/main" w="9525">
                   <a:solidFill>
                     <a:srgbClr val="000000"/>
                   </a:solidFill>
@@ -4193,7 +4193,7 @@
             </a:ln>
             <a:extLst>
               <a:ext uri="{91240B29-F687-4f45-9708-019B960494DF}">
-                <a14:hiddenLine xmlns:a14="http://schemas.microsoft.com/office/drawing/2010/main" xmlns="" w="9525">
+                <a14:hiddenLine xmlns="" xmlns:a14="http://schemas.microsoft.com/office/drawing/2010/main" w="9525">
                   <a:solidFill>
                     <a:srgbClr val="000000"/>
                   </a:solidFill>
@@ -4283,7 +4283,7 @@
             </a:ln>
             <a:extLst>
               <a:ext uri="{91240B29-F687-4f45-9708-019B960494DF}">
-                <a14:hiddenLine xmlns:a14="http://schemas.microsoft.com/office/drawing/2010/main" xmlns="" w="9525">
+                <a14:hiddenLine xmlns="" xmlns:a14="http://schemas.microsoft.com/office/drawing/2010/main" w="9525">
                   <a:solidFill>
                     <a:srgbClr val="000000"/>
                   </a:solidFill>
@@ -4345,7 +4345,7 @@
             </a:ln>
             <a:extLst>
               <a:ext uri="{91240B29-F687-4f45-9708-019B960494DF}">
-                <a14:hiddenLine xmlns:a14="http://schemas.microsoft.com/office/drawing/2010/main" xmlns="" w="9525">
+                <a14:hiddenLine xmlns="" xmlns:a14="http://schemas.microsoft.com/office/drawing/2010/main" w="9525">
                   <a:solidFill>
                     <a:srgbClr val="000000"/>
                   </a:solidFill>
@@ -4465,7 +4465,7 @@
             </a:ln>
             <a:extLst>
               <a:ext uri="{91240B29-F687-4f45-9708-019B960494DF}">
-                <a14:hiddenLine xmlns:a14="http://schemas.microsoft.com/office/drawing/2010/main" xmlns="" w="9525">
+                <a14:hiddenLine xmlns="" xmlns:a14="http://schemas.microsoft.com/office/drawing/2010/main" w="9525">
                   <a:solidFill>
                     <a:srgbClr val="000000"/>
                   </a:solidFill>
@@ -4533,7 +4533,7 @@
             </a:ln>
             <a:extLst>
               <a:ext uri="{91240B29-F687-4f45-9708-019B960494DF}">
-                <a14:hiddenLine xmlns:a14="http://schemas.microsoft.com/office/drawing/2010/main" xmlns="" w="9525">
+                <a14:hiddenLine xmlns="" xmlns:a14="http://schemas.microsoft.com/office/drawing/2010/main" w="9525">
                   <a:solidFill>
                     <a:srgbClr val="000000"/>
                   </a:solidFill>
@@ -4623,7 +4623,7 @@
             </a:ln>
             <a:extLst>
               <a:ext uri="{91240B29-F687-4f45-9708-019B960494DF}">
-                <a14:hiddenLine xmlns:a14="http://schemas.microsoft.com/office/drawing/2010/main" xmlns="" w="9525">
+                <a14:hiddenLine xmlns="" xmlns:a14="http://schemas.microsoft.com/office/drawing/2010/main" w="9525">
                   <a:solidFill>
                     <a:srgbClr val="000000"/>
                   </a:solidFill>
@@ -4763,7 +4763,7 @@
           <a:p>
             <a:fld id="{2E6956D0-FF82-46DA-9F38-706DC86F0D56}" type="datetime1">
               <a:rPr lang="en-US" smtClean="0"/>
-              <a:t>3/14/2025</a:t>
+              <a:t>3/15/2025</a:t>
             </a:fld>
             <a:endParaRPr lang="en-US" dirty="0"/>
           </a:p>
@@ -5058,7 +5058,7 @@
           <a:p>
             <a:fld id="{B29A0609-7FEE-4DC0-9780-D623E024975E}" type="datetime1">
               <a:rPr lang="en-US" smtClean="0"/>
-              <a:t>3/14/2025</a:t>
+              <a:t>3/15/2025</a:t>
             </a:fld>
             <a:endParaRPr lang="en-US" dirty="0"/>
           </a:p>
@@ -5252,7 +5252,7 @@
           <a:p>
             <a:fld id="{D8595C36-295C-44A6-AB85-859B320446F8}" type="datetime1">
               <a:rPr lang="en-US" smtClean="0"/>
-              <a:t>3/14/2025</a:t>
+              <a:t>3/15/2025</a:t>
             </a:fld>
             <a:endParaRPr lang="en-US" dirty="0"/>
           </a:p>
@@ -5513,7 +5513,7 @@
           <a:p>
             <a:fld id="{99F217E4-37B9-4791-A38E-D8BC4AED1ACB}" type="datetime1">
               <a:rPr lang="en-US" smtClean="0"/>
-              <a:t>3/14/2025</a:t>
+              <a:t>3/15/2025</a:t>
             </a:fld>
             <a:endParaRPr lang="en-US" dirty="0"/>
           </a:p>
@@ -5946,7 +5946,7 @@
           <a:p>
             <a:fld id="{7326BBBD-F342-45E3-84E1-84BE66868B86}" type="datetime1">
               <a:rPr lang="en-US" smtClean="0"/>
-              <a:t>3/14/2025</a:t>
+              <a:t>3/15/2025</a:t>
             </a:fld>
             <a:endParaRPr lang="en-US" dirty="0"/>
           </a:p>
@@ -6491,7 +6491,7 @@
           <a:p>
             <a:fld id="{BF8B92E3-5D56-4D9D-A69E-DE111053FD9E}" type="datetime1">
               <a:rPr lang="en-US" smtClean="0"/>
-              <a:t>3/14/2025</a:t>
+              <a:t>3/15/2025</a:t>
             </a:fld>
             <a:endParaRPr lang="en-US" dirty="0"/>
           </a:p>
@@ -7209,7 +7209,7 @@
           <a:p>
             <a:fld id="{5530DBAB-C152-4B13-894C-B845E59C3017}" type="datetime1">
               <a:rPr lang="en-US" smtClean="0"/>
-              <a:t>3/14/2025</a:t>
+              <a:t>3/15/2025</a:t>
             </a:fld>
             <a:endParaRPr lang="en-US" dirty="0"/>
           </a:p>
@@ -7377,7 +7377,7 @@
           <a:p>
             <a:fld id="{5A1A901B-AC15-4CE2-B187-E1906D80C40A}" type="datetime1">
               <a:rPr lang="en-US" smtClean="0"/>
-              <a:t>3/14/2025</a:t>
+              <a:t>3/15/2025</a:t>
             </a:fld>
             <a:endParaRPr lang="en-US" dirty="0"/>
           </a:p>
@@ -7555,7 +7555,7 @@
           <a:p>
             <a:fld id="{173BF05D-F707-4D33-BC3D-A422F7F8BD2C}" type="datetime1">
               <a:rPr lang="en-US" smtClean="0"/>
-              <a:t>3/14/2025</a:t>
+              <a:t>3/15/2025</a:t>
             </a:fld>
             <a:endParaRPr lang="en-US" dirty="0"/>
           </a:p>
@@ -7723,7 +7723,7 @@
           <a:p>
             <a:fld id="{8EE2707C-063E-46D3-BE25-A9A8D80E43A6}" type="datetime1">
               <a:rPr lang="en-US" smtClean="0"/>
-              <a:t>3/14/2025</a:t>
+              <a:t>3/15/2025</a:t>
             </a:fld>
             <a:endParaRPr lang="en-US" dirty="0"/>
           </a:p>
@@ -7976,7 +7976,7 @@
           <a:p>
             <a:fld id="{DE2BBCB1-03A1-4E25-BBBE-484FF07E9034}" type="datetime1">
               <a:rPr lang="en-US" smtClean="0"/>
-              <a:t>3/14/2025</a:t>
+              <a:t>3/15/2025</a:t>
             </a:fld>
             <a:endParaRPr lang="en-US" dirty="0"/>
           </a:p>
@@ -8206,7 +8206,7 @@
           <a:p>
             <a:fld id="{32AE1E5B-2754-4F28-8433-77BB8DA5C10A}" type="datetime1">
               <a:rPr lang="en-US" smtClean="0"/>
-              <a:t>3/14/2025</a:t>
+              <a:t>3/15/2025</a:t>
             </a:fld>
             <a:endParaRPr lang="en-US" dirty="0"/>
           </a:p>
@@ -8585,7 +8585,7 @@
           <a:p>
             <a:fld id="{A949E13A-A720-4FA7-B4C3-D48667EC44AE}" type="datetime1">
               <a:rPr lang="en-US" smtClean="0"/>
-              <a:t>3/14/2025</a:t>
+              <a:t>3/15/2025</a:t>
             </a:fld>
             <a:endParaRPr lang="en-US" dirty="0"/>
           </a:p>
@@ -8701,7 +8701,7 @@
           <a:p>
             <a:fld id="{8907D086-5A12-4193-995F-F84EC02B1AD8}" type="datetime1">
               <a:rPr lang="en-US" smtClean="0"/>
-              <a:t>3/14/2025</a:t>
+              <a:t>3/15/2025</a:t>
             </a:fld>
             <a:endParaRPr lang="en-US" dirty="0"/>
           </a:p>
@@ -8794,7 +8794,7 @@
           <a:p>
             <a:fld id="{AE68C3A2-0540-4972-9AF7-3C65A04AEEB6}" type="datetime1">
               <a:rPr lang="en-US" smtClean="0"/>
-              <a:t>3/14/2025</a:t>
+              <a:t>3/15/2025</a:t>
             </a:fld>
             <a:endParaRPr lang="en-US" dirty="0"/>
           </a:p>
@@ -9041,7 +9041,7 @@
           <a:p>
             <a:fld id="{E1972B15-44AC-4DC1-B1E2-4E855788D9BC}" type="datetime1">
               <a:rPr lang="en-US" smtClean="0"/>
-              <a:t>3/14/2025</a:t>
+              <a:t>3/15/2025</a:t>
             </a:fld>
             <a:endParaRPr lang="en-US" dirty="0"/>
           </a:p>
@@ -9319,7 +9319,7 @@
           <a:p>
             <a:fld id="{35586A4F-619C-4F02-A396-839181AC6BB4}" type="datetime1">
               <a:rPr lang="en-US" smtClean="0"/>
-              <a:t>3/14/2025</a:t>
+              <a:t>3/15/2025</a:t>
             </a:fld>
             <a:endParaRPr lang="en-US" dirty="0"/>
           </a:p>
@@ -9433,7 +9433,7 @@
           <a:noFill/>
           <a:extLst>
             <a:ext uri="{909E8E84-426E-40dd-AFC4-6F175D3DCCD1}">
-              <a14:hiddenFill xmlns:a14="http://schemas.microsoft.com/office/drawing/2010/main" xmlns="">
+              <a14:hiddenFill xmlns="" xmlns:a14="http://schemas.microsoft.com/office/drawing/2010/main">
                 <a:solidFill>
                   <a:srgbClr val="FFFFFF"/>
                 </a:solidFill>
@@ -9507,7 +9507,7 @@
               </a:ln>
               <a:extLst>
                 <a:ext uri="{91240B29-F687-4f45-9708-019B960494DF}">
-                  <a14:hiddenLine xmlns:a14="http://schemas.microsoft.com/office/drawing/2010/main" xmlns="" w="9525">
+                  <a14:hiddenLine xmlns="" xmlns:a14="http://schemas.microsoft.com/office/drawing/2010/main" w="9525">
                     <a:solidFill>
                       <a:srgbClr val="000000"/>
                     </a:solidFill>
@@ -9597,7 +9597,7 @@
               </a:ln>
               <a:extLst>
                 <a:ext uri="{91240B29-F687-4f45-9708-019B960494DF}">
-                  <a14:hiddenLine xmlns:a14="http://schemas.microsoft.com/office/drawing/2010/main" xmlns="" w="9525">
+                  <a14:hiddenLine xmlns="" xmlns:a14="http://schemas.microsoft.com/office/drawing/2010/main" w="9525">
                     <a:solidFill>
                       <a:srgbClr val="000000"/>
                     </a:solidFill>
@@ -9687,7 +9687,7 @@
               </a:ln>
               <a:extLst>
                 <a:ext uri="{91240B29-F687-4f45-9708-019B960494DF}">
-                  <a14:hiddenLine xmlns:a14="http://schemas.microsoft.com/office/drawing/2010/main" xmlns="" w="9525">
+                  <a14:hiddenLine xmlns="" xmlns:a14="http://schemas.microsoft.com/office/drawing/2010/main" w="9525">
                     <a:solidFill>
                       <a:srgbClr val="000000"/>
                     </a:solidFill>
@@ -9749,7 +9749,7 @@
               </a:ln>
               <a:extLst>
                 <a:ext uri="{91240B29-F687-4f45-9708-019B960494DF}">
-                  <a14:hiddenLine xmlns:a14="http://schemas.microsoft.com/office/drawing/2010/main" xmlns="" w="9525">
+                  <a14:hiddenLine xmlns="" xmlns:a14="http://schemas.microsoft.com/office/drawing/2010/main" w="9525">
                     <a:solidFill>
                       <a:srgbClr val="000000"/>
                     </a:solidFill>
@@ -9839,7 +9839,7 @@
               </a:ln>
               <a:extLst>
                 <a:ext uri="{91240B29-F687-4f45-9708-019B960494DF}">
-                  <a14:hiddenLine xmlns:a14="http://schemas.microsoft.com/office/drawing/2010/main" xmlns="" w="9525">
+                  <a14:hiddenLine xmlns="" xmlns:a14="http://schemas.microsoft.com/office/drawing/2010/main" w="9525">
                     <a:solidFill>
                       <a:srgbClr val="000000"/>
                     </a:solidFill>
@@ -9901,7 +9901,7 @@
               </a:ln>
               <a:extLst>
                 <a:ext uri="{91240B29-F687-4f45-9708-019B960494DF}">
-                  <a14:hiddenLine xmlns:a14="http://schemas.microsoft.com/office/drawing/2010/main" xmlns="" w="9525">
+                  <a14:hiddenLine xmlns="" xmlns:a14="http://schemas.microsoft.com/office/drawing/2010/main" w="9525">
                     <a:solidFill>
                       <a:srgbClr val="000000"/>
                     </a:solidFill>
@@ -9963,7 +9963,7 @@
               </a:ln>
               <a:extLst>
                 <a:ext uri="{91240B29-F687-4f45-9708-019B960494DF}">
-                  <a14:hiddenLine xmlns:a14="http://schemas.microsoft.com/office/drawing/2010/main" xmlns="" w="9525">
+                  <a14:hiddenLine xmlns="" xmlns:a14="http://schemas.microsoft.com/office/drawing/2010/main" w="9525">
                     <a:solidFill>
                       <a:srgbClr val="000000"/>
                     </a:solidFill>
@@ -10053,7 +10053,7 @@
               </a:ln>
               <a:extLst>
                 <a:ext uri="{91240B29-F687-4f45-9708-019B960494DF}">
-                  <a14:hiddenLine xmlns:a14="http://schemas.microsoft.com/office/drawing/2010/main" xmlns="" w="9525">
+                  <a14:hiddenLine xmlns="" xmlns:a14="http://schemas.microsoft.com/office/drawing/2010/main" w="9525">
                     <a:solidFill>
                       <a:srgbClr val="000000"/>
                     </a:solidFill>
@@ -10143,7 +10143,7 @@
               </a:ln>
               <a:extLst>
                 <a:ext uri="{91240B29-F687-4f45-9708-019B960494DF}">
-                  <a14:hiddenLine xmlns:a14="http://schemas.microsoft.com/office/drawing/2010/main" xmlns="" w="9525">
+                  <a14:hiddenLine xmlns="" xmlns:a14="http://schemas.microsoft.com/office/drawing/2010/main" w="9525">
                     <a:solidFill>
                       <a:srgbClr val="000000"/>
                     </a:solidFill>
@@ -10205,7 +10205,7 @@
               </a:ln>
               <a:extLst>
                 <a:ext uri="{91240B29-F687-4f45-9708-019B960494DF}">
-                  <a14:hiddenLine xmlns:a14="http://schemas.microsoft.com/office/drawing/2010/main" xmlns="" w="9525">
+                  <a14:hiddenLine xmlns="" xmlns:a14="http://schemas.microsoft.com/office/drawing/2010/main" w="9525">
                     <a:solidFill>
                       <a:srgbClr val="000000"/>
                     </a:solidFill>
@@ -10315,7 +10315,7 @@
               </a:ln>
               <a:extLst>
                 <a:ext uri="{91240B29-F687-4f45-9708-019B960494DF}">
-                  <a14:hiddenLine xmlns:a14="http://schemas.microsoft.com/office/drawing/2010/main" xmlns="" w="9525">
+                  <a14:hiddenLine xmlns="" xmlns:a14="http://schemas.microsoft.com/office/drawing/2010/main" w="9525">
                     <a:solidFill>
                       <a:srgbClr val="000000"/>
                     </a:solidFill>
@@ -10399,7 +10399,7 @@
               </a:ln>
               <a:extLst>
                 <a:ext uri="{91240B29-F687-4f45-9708-019B960494DF}">
-                  <a14:hiddenLine xmlns:a14="http://schemas.microsoft.com/office/drawing/2010/main" xmlns="" w="9525">
+                  <a14:hiddenLine xmlns="" xmlns:a14="http://schemas.microsoft.com/office/drawing/2010/main" w="9525">
                     <a:solidFill>
                       <a:srgbClr val="000000"/>
                     </a:solidFill>
@@ -10461,7 +10461,7 @@
               </a:ln>
               <a:extLst>
                 <a:ext uri="{91240B29-F687-4f45-9708-019B960494DF}">
-                  <a14:hiddenLine xmlns:a14="http://schemas.microsoft.com/office/drawing/2010/main" xmlns="" w="9525">
+                  <a14:hiddenLine xmlns="" xmlns:a14="http://schemas.microsoft.com/office/drawing/2010/main" w="9525">
                     <a:solidFill>
                       <a:srgbClr val="000000"/>
                     </a:solidFill>
@@ -10523,7 +10523,7 @@
               </a:ln>
               <a:extLst>
                 <a:ext uri="{91240B29-F687-4f45-9708-019B960494DF}">
-                  <a14:hiddenLine xmlns:a14="http://schemas.microsoft.com/office/drawing/2010/main" xmlns="" w="9525">
+                  <a14:hiddenLine xmlns="" xmlns:a14="http://schemas.microsoft.com/office/drawing/2010/main" w="9525">
                     <a:solidFill>
                       <a:srgbClr val="000000"/>
                     </a:solidFill>
@@ -10613,7 +10613,7 @@
               </a:ln>
               <a:extLst>
                 <a:ext uri="{91240B29-F687-4f45-9708-019B960494DF}">
-                  <a14:hiddenLine xmlns:a14="http://schemas.microsoft.com/office/drawing/2010/main" xmlns="" w="9525">
+                  <a14:hiddenLine xmlns="" xmlns:a14="http://schemas.microsoft.com/office/drawing/2010/main" w="9525">
                     <a:solidFill>
                       <a:srgbClr val="000000"/>
                     </a:solidFill>
@@ -10647,7 +10647,7 @@
               </a:ln>
               <a:extLst>
                 <a:ext uri="{91240B29-F687-4f45-9708-019B960494DF}">
-                  <a14:hiddenLine xmlns:a14="http://schemas.microsoft.com/office/drawing/2010/main" xmlns="" w="9525">
+                  <a14:hiddenLine xmlns="" xmlns:a14="http://schemas.microsoft.com/office/drawing/2010/main" w="9525">
                     <a:solidFill>
                       <a:srgbClr val="000000"/>
                     </a:solidFill>
@@ -10712,7 +10712,7 @@
               </a:ln>
               <a:extLst>
                 <a:ext uri="{91240B29-F687-4f45-9708-019B960494DF}">
-                  <a14:hiddenLine xmlns:a14="http://schemas.microsoft.com/office/drawing/2010/main" xmlns="" w="9525">
+                  <a14:hiddenLine xmlns="" xmlns:a14="http://schemas.microsoft.com/office/drawing/2010/main" w="9525">
                     <a:solidFill>
                       <a:srgbClr val="000000"/>
                     </a:solidFill>
@@ -10802,7 +10802,7 @@
               </a:ln>
               <a:extLst>
                 <a:ext uri="{91240B29-F687-4f45-9708-019B960494DF}">
-                  <a14:hiddenLine xmlns:a14="http://schemas.microsoft.com/office/drawing/2010/main" xmlns="" w="9525">
+                  <a14:hiddenLine xmlns="" xmlns:a14="http://schemas.microsoft.com/office/drawing/2010/main" w="9525">
                     <a:solidFill>
                       <a:srgbClr val="000000"/>
                     </a:solidFill>
@@ -10864,7 +10864,7 @@
               </a:ln>
               <a:extLst>
                 <a:ext uri="{91240B29-F687-4f45-9708-019B960494DF}">
-                  <a14:hiddenLine xmlns:a14="http://schemas.microsoft.com/office/drawing/2010/main" xmlns="" w="9525">
+                  <a14:hiddenLine xmlns="" xmlns:a14="http://schemas.microsoft.com/office/drawing/2010/main" w="9525">
                     <a:solidFill>
                       <a:srgbClr val="000000"/>
                     </a:solidFill>
@@ -10954,7 +10954,7 @@
               </a:ln>
               <a:extLst>
                 <a:ext uri="{91240B29-F687-4f45-9708-019B960494DF}">
-                  <a14:hiddenLine xmlns:a14="http://schemas.microsoft.com/office/drawing/2010/main" xmlns="" w="9525">
+                  <a14:hiddenLine xmlns="" xmlns:a14="http://schemas.microsoft.com/office/drawing/2010/main" w="9525">
                     <a:solidFill>
                       <a:srgbClr val="000000"/>
                     </a:solidFill>
@@ -11019,7 +11019,7 @@
               </a:ln>
               <a:extLst>
                 <a:ext uri="{91240B29-F687-4f45-9708-019B960494DF}">
-                  <a14:hiddenLine xmlns:a14="http://schemas.microsoft.com/office/drawing/2010/main" xmlns="" w="9525">
+                  <a14:hiddenLine xmlns="" xmlns:a14="http://schemas.microsoft.com/office/drawing/2010/main" w="9525">
                     <a:solidFill>
                       <a:srgbClr val="000000"/>
                     </a:solidFill>
@@ -11081,7 +11081,7 @@
               </a:ln>
               <a:extLst>
                 <a:ext uri="{91240B29-F687-4f45-9708-019B960494DF}">
-                  <a14:hiddenLine xmlns:a14="http://schemas.microsoft.com/office/drawing/2010/main" xmlns="" w="9525">
+                  <a14:hiddenLine xmlns="" xmlns:a14="http://schemas.microsoft.com/office/drawing/2010/main" w="9525">
                     <a:solidFill>
                       <a:srgbClr val="000000"/>
                     </a:solidFill>
@@ -11171,7 +11171,7 @@
               </a:ln>
               <a:extLst>
                 <a:ext uri="{91240B29-F687-4f45-9708-019B960494DF}">
-                  <a14:hiddenLine xmlns:a14="http://schemas.microsoft.com/office/drawing/2010/main" xmlns="" w="9525">
+                  <a14:hiddenLine xmlns="" xmlns:a14="http://schemas.microsoft.com/office/drawing/2010/main" w="9525">
                     <a:solidFill>
                       <a:srgbClr val="000000"/>
                     </a:solidFill>
@@ -11261,7 +11261,7 @@
               </a:ln>
               <a:extLst>
                 <a:ext uri="{91240B29-F687-4f45-9708-019B960494DF}">
-                  <a14:hiddenLine xmlns:a14="http://schemas.microsoft.com/office/drawing/2010/main" xmlns="" w="9525">
+                  <a14:hiddenLine xmlns="" xmlns:a14="http://schemas.microsoft.com/office/drawing/2010/main" w="9525">
                     <a:solidFill>
                       <a:srgbClr val="000000"/>
                     </a:solidFill>
@@ -11326,7 +11326,7 @@
               </a:ln>
               <a:extLst>
                 <a:ext uri="{91240B29-F687-4f45-9708-019B960494DF}">
-                  <a14:hiddenLine xmlns:a14="http://schemas.microsoft.com/office/drawing/2010/main" xmlns="" w="9525">
+                  <a14:hiddenLine xmlns="" xmlns:a14="http://schemas.microsoft.com/office/drawing/2010/main" w="9525">
                     <a:solidFill>
                       <a:srgbClr val="000000"/>
                     </a:solidFill>
@@ -11446,7 +11446,7 @@
               </a:ln>
               <a:extLst>
                 <a:ext uri="{91240B29-F687-4f45-9708-019B960494DF}">
-                  <a14:hiddenLine xmlns:a14="http://schemas.microsoft.com/office/drawing/2010/main" xmlns="" w="9525">
+                  <a14:hiddenLine xmlns="" xmlns:a14="http://schemas.microsoft.com/office/drawing/2010/main" w="9525">
                     <a:solidFill>
                       <a:srgbClr val="000000"/>
                     </a:solidFill>
@@ -11544,7 +11544,7 @@
               </a:ln>
               <a:extLst>
                 <a:ext uri="{91240B29-F687-4f45-9708-019B960494DF}">
-                  <a14:hiddenLine xmlns:a14="http://schemas.microsoft.com/office/drawing/2010/main" xmlns="" w="9525">
+                  <a14:hiddenLine xmlns="" xmlns:a14="http://schemas.microsoft.com/office/drawing/2010/main" w="9525">
                     <a:solidFill>
                       <a:srgbClr val="000000"/>
                     </a:solidFill>
@@ -11659,7 +11659,7 @@
               </a:ln>
               <a:extLst>
                 <a:ext uri="{91240B29-F687-4f45-9708-019B960494DF}">
-                  <a14:hiddenLine xmlns:a14="http://schemas.microsoft.com/office/drawing/2010/main" xmlns="" w="9525">
+                  <a14:hiddenLine xmlns="" xmlns:a14="http://schemas.microsoft.com/office/drawing/2010/main" w="9525">
                     <a:solidFill>
                       <a:srgbClr val="000000"/>
                     </a:solidFill>
@@ -11749,7 +11749,7 @@
               </a:ln>
               <a:extLst>
                 <a:ext uri="{91240B29-F687-4f45-9708-019B960494DF}">
-                  <a14:hiddenLine xmlns:a14="http://schemas.microsoft.com/office/drawing/2010/main" xmlns="" w="9525">
+                  <a14:hiddenLine xmlns="" xmlns:a14="http://schemas.microsoft.com/office/drawing/2010/main" w="9525">
                     <a:solidFill>
                       <a:srgbClr val="000000"/>
                     </a:solidFill>
@@ -11814,7 +11814,7 @@
               </a:ln>
               <a:extLst>
                 <a:ext uri="{91240B29-F687-4f45-9708-019B960494DF}">
-                  <a14:hiddenLine xmlns:a14="http://schemas.microsoft.com/office/drawing/2010/main" xmlns="" w="9525">
+                  <a14:hiddenLine xmlns="" xmlns:a14="http://schemas.microsoft.com/office/drawing/2010/main" w="9525">
                     <a:solidFill>
                       <a:srgbClr val="000000"/>
                     </a:solidFill>
@@ -11904,7 +11904,7 @@
               </a:ln>
               <a:extLst>
                 <a:ext uri="{91240B29-F687-4f45-9708-019B960494DF}">
-                  <a14:hiddenLine xmlns:a14="http://schemas.microsoft.com/office/drawing/2010/main" xmlns="" w="9525">
+                  <a14:hiddenLine xmlns="" xmlns:a14="http://schemas.microsoft.com/office/drawing/2010/main" w="9525">
                     <a:solidFill>
                       <a:srgbClr val="000000"/>
                     </a:solidFill>
@@ -11972,7 +11972,7 @@
               </a:ln>
               <a:extLst>
                 <a:ext uri="{91240B29-F687-4f45-9708-019B960494DF}">
-                  <a14:hiddenLine xmlns:a14="http://schemas.microsoft.com/office/drawing/2010/main" xmlns="" w="9525">
+                  <a14:hiddenLine xmlns="" xmlns:a14="http://schemas.microsoft.com/office/drawing/2010/main" w="9525">
                     <a:solidFill>
                       <a:srgbClr val="000000"/>
                     </a:solidFill>
@@ -12062,7 +12062,7 @@
               </a:ln>
               <a:extLst>
                 <a:ext uri="{91240B29-F687-4f45-9708-019B960494DF}">
-                  <a14:hiddenLine xmlns:a14="http://schemas.microsoft.com/office/drawing/2010/main" xmlns="" w="9525">
+                  <a14:hiddenLine xmlns="" xmlns:a14="http://schemas.microsoft.com/office/drawing/2010/main" w="9525">
                     <a:solidFill>
                       <a:srgbClr val="000000"/>
                     </a:solidFill>
@@ -12130,7 +12130,7 @@
               </a:ln>
               <a:extLst>
                 <a:ext uri="{91240B29-F687-4f45-9708-019B960494DF}">
-                  <a14:hiddenLine xmlns:a14="http://schemas.microsoft.com/office/drawing/2010/main" xmlns="" w="9525">
+                  <a14:hiddenLine xmlns="" xmlns:a14="http://schemas.microsoft.com/office/drawing/2010/main" w="9525">
                     <a:solidFill>
                       <a:srgbClr val="000000"/>
                     </a:solidFill>
@@ -12220,7 +12220,7 @@
               </a:ln>
               <a:extLst>
                 <a:ext uri="{91240B29-F687-4f45-9708-019B960494DF}">
-                  <a14:hiddenLine xmlns:a14="http://schemas.microsoft.com/office/drawing/2010/main" xmlns="" w="9525">
+                  <a14:hiddenLine xmlns="" xmlns:a14="http://schemas.microsoft.com/office/drawing/2010/main" w="9525">
                     <a:solidFill>
                       <a:srgbClr val="000000"/>
                     </a:solidFill>
@@ -12254,7 +12254,7 @@
               </a:ln>
               <a:extLst>
                 <a:ext uri="{91240B29-F687-4f45-9708-019B960494DF}">
-                  <a14:hiddenLine xmlns:a14="http://schemas.microsoft.com/office/drawing/2010/main" xmlns="" w="9525">
+                  <a14:hiddenLine xmlns="" xmlns:a14="http://schemas.microsoft.com/office/drawing/2010/main" w="9525">
                     <a:solidFill>
                       <a:srgbClr val="000000"/>
                     </a:solidFill>
@@ -12394,7 +12394,7 @@
           <a:p>
             <a:fld id="{9C2E08F3-6ADB-4031-89E6-89707F5CDBB1}" type="datetime1">
               <a:rPr lang="en-US" smtClean="0"/>
-              <a:t>3/14/2025</a:t>
+              <a:t>3/15/2025</a:t>
             </a:fld>
             <a:endParaRPr lang="en-US" dirty="0"/>
           </a:p>
@@ -12947,7 +12947,7 @@
           <a:p>
             <a:fld id="{DEAE2368-4D5B-4100-AD00-D730DAA20AC8}" type="datetime1">
               <a:rPr lang="en-US" smtClean="0"/>
-              <a:t>3/14/2025</a:t>
+              <a:t>3/15/2025</a:t>
             </a:fld>
             <a:endParaRPr lang="en-US" dirty="0"/>
           </a:p>
@@ -13040,7 +13040,7 @@
           <a:p>
             <a:fld id="{8EE2707C-063E-46D3-BE25-A9A8D80E43A6}" type="datetime1">
               <a:rPr lang="en-US" smtClean="0"/>
-              <a:t>3/14/2025</a:t>
+              <a:t>3/15/2025</a:t>
             </a:fld>
             <a:endParaRPr lang="en-US" dirty="0"/>
           </a:p>
@@ -13195,7 +13195,7 @@
           <a:p>
             <a:fld id="{8EE2707C-063E-46D3-BE25-A9A8D80E43A6}" type="datetime1">
               <a:rPr lang="en-US" smtClean="0"/>
-              <a:t>3/14/2025</a:t>
+              <a:t>3/15/2025</a:t>
             </a:fld>
             <a:endParaRPr lang="en-US" dirty="0"/>
           </a:p>
@@ -13607,7 +13607,7 @@
                   <a:schemeClr val="bg1"/>
                 </a:solidFill>
               </a:rPr>
-              <a:t>3/14/2025</a:t>
+              <a:t>3/15/2025</a:t>
             </a:fld>
             <a:endParaRPr lang="en-US" dirty="0">
               <a:solidFill>
@@ -13702,7 +13702,7 @@
           <a:p>
             <a:fld id="{8EE2707C-063E-46D3-BE25-A9A8D80E43A6}" type="datetime1">
               <a:rPr lang="en-US" smtClean="0"/>
-              <a:t>3/14/2025</a:t>
+              <a:t>3/15/2025</a:t>
             </a:fld>
             <a:endParaRPr lang="en-US" dirty="0"/>
           </a:p>
@@ -14028,7 +14028,7 @@
                   <a:schemeClr val="bg1"/>
                 </a:solidFill>
               </a:rPr>
-              <a:t>3/14/2025</a:t>
+              <a:t>3/15/2025</a:t>
             </a:fld>
             <a:endParaRPr lang="en-US" dirty="0">
               <a:solidFill>
@@ -14338,7 +14338,7 @@
                   <a:schemeClr val="bg1"/>
                 </a:solidFill>
               </a:rPr>
-              <a:t>3/14/2025</a:t>
+              <a:t>3/15/2025</a:t>
             </a:fld>
             <a:endParaRPr lang="en-US" dirty="0">
               <a:solidFill>
@@ -14703,7 +14703,7 @@
                   <a:schemeClr val="bg1"/>
                 </a:solidFill>
               </a:rPr>
-              <a:t>3/14/2025</a:t>
+              <a:t>3/15/2025</a:t>
             </a:fld>
             <a:endParaRPr lang="en-US" dirty="0">
               <a:solidFill>
@@ -14803,7 +14803,7 @@
           <a:p>
             <a:fld id="{8EE2707C-063E-46D3-BE25-A9A8D80E43A6}" type="datetime1">
               <a:rPr lang="en-US" smtClean="0"/>
-              <a:t>3/14/2025</a:t>
+              <a:t>3/15/2025</a:t>
             </a:fld>
             <a:endParaRPr lang="en-US" dirty="0"/>
           </a:p>
@@ -14889,7 +14889,7 @@
           </a:lstStyle>
           <a:p>
             <a:r>
-              <a:rPr lang="en-US">
+              <a:rPr lang="en-US" dirty="0">
                 <a:solidFill>
                   <a:schemeClr val="bg1"/>
                 </a:solidFill>
@@ -14898,18 +14898,13 @@
               <a:t>Software Supply Chain Risk Detection Process</a:t>
             </a:r>
             <a:r>
-              <a:rPr lang="en-US">
+              <a:rPr lang="en-US" dirty="0">
                 <a:solidFill>
                   <a:schemeClr val="bg1"/>
                 </a:solidFill>
               </a:rPr>
-              <a:t> Following NIST Guidance and SEC Regulations</a:t>
-            </a:r>
-            <a:endParaRPr lang="en-US" dirty="0">
-              <a:solidFill>
-                <a:schemeClr val="bg1"/>
-              </a:solidFill>
-            </a:endParaRPr>
+              <a:t> Following NIST Guidance and CISA BEST PRACTICES</a:t>
+            </a:r>
           </a:p>
         </p:txBody>
       </p:sp>
@@ -15039,7 +15034,7 @@
             <a:fld id="{8F422B43-45D4-4608-9F03-122930498C43}" type="datetime1">
               <a:rPr lang="en-US" smtClean="0"/>
               <a:pPr/>
-              <a:t>3/14/2025</a:t>
+              <a:t>3/15/2025</a:t>
             </a:fld>
             <a:endParaRPr lang="en-US" dirty="0"/>
           </a:p>
@@ -15203,8 +15198,22 @@
                   <a:schemeClr val="tx1"/>
                 </a:solidFill>
               </a:rPr>
-              <a:t>Perform Vendor Verification using Attestation data</a:t>
-            </a:r>
+              <a:t>Perform </a:t>
+            </a:r>
+            <a:r>
+              <a:rPr lang="en-US" dirty="0">
+                <a:solidFill>
+                  <a:schemeClr val="tx1"/>
+                </a:solidFill>
+                <a:hlinkClick r:id="rId3"/>
+              </a:rPr>
+              <a:t>Vendor Verification using Attestation data</a:t>
+            </a:r>
+            <a:endParaRPr lang="en-US" dirty="0">
+              <a:solidFill>
+                <a:schemeClr val="tx1"/>
+              </a:solidFill>
+            </a:endParaRPr>
           </a:p>
           <a:p>
             <a:pPr marL="342900" indent="-342900">
@@ -15605,7 +15614,7 @@
                   <a:schemeClr val="bg1"/>
                 </a:solidFill>
               </a:rPr>
-              <a:t>3/14/2025</a:t>
+              <a:t>3/15/2025</a:t>
             </a:fld>
             <a:endParaRPr lang="en-US" dirty="0">
               <a:solidFill>
@@ -15728,7 +15737,7 @@
           <a:p>
             <a:fld id="{8EE2707C-063E-46D3-BE25-A9A8D80E43A6}" type="datetime1">
               <a:rPr lang="en-US" smtClean="0"/>
-              <a:t>3/14/2025</a:t>
+              <a:t>3/15/2025</a:t>
             </a:fld>
             <a:endParaRPr lang="en-US" dirty="0"/>
           </a:p>
@@ -15951,7 +15960,7 @@
           <a:p>
             <a:fld id="{8EE2707C-063E-46D3-BE25-A9A8D80E43A6}" type="datetime1">
               <a:rPr lang="en-US" smtClean="0"/>
-              <a:t>3/14/2025</a:t>
+              <a:t>3/15/2025</a:t>
             </a:fld>
             <a:endParaRPr lang="en-US" dirty="0"/>
           </a:p>
@@ -16212,7 +16221,7 @@
           <a:p>
             <a:fld id="{8EE2707C-063E-46D3-BE25-A9A8D80E43A6}" type="datetime1">
               <a:rPr lang="en-US" smtClean="0"/>
-              <a:t>3/14/2025</a:t>
+              <a:t>3/15/2025</a:t>
             </a:fld>
             <a:endParaRPr lang="en-US" dirty="0"/>
           </a:p>

</xml_diff>

<commit_message>
Added DOD Trust Score slide
</commit_message>
<xml_diff>
--- a/20250321-SAG-CTR.pptx
+++ b/20250321-SAG-CTR.pptx
@@ -5,22 +5,23 @@
     <p:sldMasterId id="2147483648" r:id="rId1"/>
   </p:sldMasterIdLst>
   <p:notesMasterIdLst>
-    <p:notesMasterId r:id="rId15"/>
+    <p:notesMasterId r:id="rId16"/>
   </p:notesMasterIdLst>
   <p:sldIdLst>
     <p:sldId id="256" r:id="rId2"/>
     <p:sldId id="257" r:id="rId3"/>
     <p:sldId id="258" r:id="rId4"/>
     <p:sldId id="259" r:id="rId5"/>
-    <p:sldId id="268" r:id="rId6"/>
-    <p:sldId id="260" r:id="rId7"/>
-    <p:sldId id="264" r:id="rId8"/>
-    <p:sldId id="265" r:id="rId9"/>
-    <p:sldId id="261" r:id="rId10"/>
-    <p:sldId id="267" r:id="rId11"/>
-    <p:sldId id="266" r:id="rId12"/>
-    <p:sldId id="262" r:id="rId13"/>
-    <p:sldId id="263" r:id="rId14"/>
+    <p:sldId id="269" r:id="rId6"/>
+    <p:sldId id="268" r:id="rId7"/>
+    <p:sldId id="260" r:id="rId8"/>
+    <p:sldId id="264" r:id="rId9"/>
+    <p:sldId id="265" r:id="rId10"/>
+    <p:sldId id="261" r:id="rId11"/>
+    <p:sldId id="267" r:id="rId12"/>
+    <p:sldId id="266" r:id="rId13"/>
+    <p:sldId id="262" r:id="rId14"/>
+    <p:sldId id="263" r:id="rId15"/>
   </p:sldIdLst>
   <p:sldSz cx="12192000" cy="6858000"/>
   <p:notesSz cx="6858000" cy="9144000"/>
@@ -220,7 +221,7 @@
           <a:p>
             <a:fld id="{332E4851-9EEE-4C44-B0F3-632DB06B8768}" type="datetimeFigureOut">
               <a:rPr lang="en-US" smtClean="0"/>
-              <a:t>3/15/2025</a:t>
+              <a:t>3/20/2025</a:t>
             </a:fld>
             <a:endParaRPr lang="en-US"/>
           </a:p>
@@ -537,7 +538,7 @@
           <a:noFill/>
           <a:extLst>
             <a:ext uri="{909E8E84-426E-40dd-AFC4-6F175D3DCCD1}">
-              <a14:hiddenFill xmlns="" xmlns:a14="http://schemas.microsoft.com/office/drawing/2010/main">
+              <a14:hiddenFill xmlns:a14="http://schemas.microsoft.com/office/drawing/2010/main" xmlns="">
                 <a:solidFill>
                   <a:srgbClr val="FFFFFF"/>
                 </a:solidFill>
@@ -597,7 +598,7 @@
             </a:ln>
             <a:extLst>
               <a:ext uri="{91240B29-F687-4f45-9708-019B960494DF}">
-                <a14:hiddenLine xmlns="" xmlns:a14="http://schemas.microsoft.com/office/drawing/2010/main" w="9525">
+                <a14:hiddenLine xmlns:a14="http://schemas.microsoft.com/office/drawing/2010/main" xmlns="" w="9525">
                   <a:solidFill>
                     <a:srgbClr val="000000"/>
                   </a:solidFill>
@@ -687,7 +688,7 @@
             </a:ln>
             <a:extLst>
               <a:ext uri="{91240B29-F687-4f45-9708-019B960494DF}">
-                <a14:hiddenLine xmlns="" xmlns:a14="http://schemas.microsoft.com/office/drawing/2010/main" w="9525">
+                <a14:hiddenLine xmlns:a14="http://schemas.microsoft.com/office/drawing/2010/main" xmlns="" w="9525">
                   <a:solidFill>
                     <a:srgbClr val="000000"/>
                   </a:solidFill>
@@ -777,7 +778,7 @@
             </a:ln>
             <a:extLst>
               <a:ext uri="{91240B29-F687-4f45-9708-019B960494DF}">
-                <a14:hiddenLine xmlns="" xmlns:a14="http://schemas.microsoft.com/office/drawing/2010/main" w="9525">
+                <a14:hiddenLine xmlns:a14="http://schemas.microsoft.com/office/drawing/2010/main" xmlns="" w="9525">
                   <a:solidFill>
                     <a:srgbClr val="000000"/>
                   </a:solidFill>
@@ -811,7 +812,7 @@
             </a:ln>
             <a:extLst>
               <a:ext uri="{91240B29-F687-4f45-9708-019B960494DF}">
-                <a14:hiddenLine xmlns="" xmlns:a14="http://schemas.microsoft.com/office/drawing/2010/main" w="9525">
+                <a14:hiddenLine xmlns:a14="http://schemas.microsoft.com/office/drawing/2010/main" xmlns="" w="9525">
                   <a:solidFill>
                     <a:srgbClr val="000000"/>
                   </a:solidFill>
@@ -901,7 +902,7 @@
             </a:ln>
             <a:extLst>
               <a:ext uri="{91240B29-F687-4f45-9708-019B960494DF}">
-                <a14:hiddenLine xmlns="" xmlns:a14="http://schemas.microsoft.com/office/drawing/2010/main" w="9525">
+                <a14:hiddenLine xmlns:a14="http://schemas.microsoft.com/office/drawing/2010/main" xmlns="" w="9525">
                   <a:solidFill>
                     <a:srgbClr val="000000"/>
                   </a:solidFill>
@@ -963,7 +964,7 @@
             </a:ln>
             <a:extLst>
               <a:ext uri="{91240B29-F687-4f45-9708-019B960494DF}">
-                <a14:hiddenLine xmlns="" xmlns:a14="http://schemas.microsoft.com/office/drawing/2010/main" w="9525">
+                <a14:hiddenLine xmlns:a14="http://schemas.microsoft.com/office/drawing/2010/main" xmlns="" w="9525">
                   <a:solidFill>
                     <a:srgbClr val="000000"/>
                   </a:solidFill>
@@ -1025,7 +1026,7 @@
             </a:ln>
             <a:extLst>
               <a:ext uri="{91240B29-F687-4f45-9708-019B960494DF}">
-                <a14:hiddenLine xmlns="" xmlns:a14="http://schemas.microsoft.com/office/drawing/2010/main" w="9525">
+                <a14:hiddenLine xmlns:a14="http://schemas.microsoft.com/office/drawing/2010/main" xmlns="" w="9525">
                   <a:solidFill>
                     <a:srgbClr val="000000"/>
                   </a:solidFill>
@@ -1115,7 +1116,7 @@
             </a:ln>
             <a:extLst>
               <a:ext uri="{91240B29-F687-4f45-9708-019B960494DF}">
-                <a14:hiddenLine xmlns="" xmlns:a14="http://schemas.microsoft.com/office/drawing/2010/main" w="9525">
+                <a14:hiddenLine xmlns:a14="http://schemas.microsoft.com/office/drawing/2010/main" xmlns="" w="9525">
                   <a:solidFill>
                     <a:srgbClr val="000000"/>
                   </a:solidFill>
@@ -1177,7 +1178,7 @@
             </a:ln>
             <a:extLst>
               <a:ext uri="{91240B29-F687-4f45-9708-019B960494DF}">
-                <a14:hiddenLine xmlns="" xmlns:a14="http://schemas.microsoft.com/office/drawing/2010/main" w="9525">
+                <a14:hiddenLine xmlns:a14="http://schemas.microsoft.com/office/drawing/2010/main" xmlns="" w="9525">
                   <a:solidFill>
                     <a:srgbClr val="000000"/>
                   </a:solidFill>
@@ -1239,7 +1240,7 @@
             </a:ln>
             <a:extLst>
               <a:ext uri="{91240B29-F687-4f45-9708-019B960494DF}">
-                <a14:hiddenLine xmlns="" xmlns:a14="http://schemas.microsoft.com/office/drawing/2010/main" w="9525">
+                <a14:hiddenLine xmlns:a14="http://schemas.microsoft.com/office/drawing/2010/main" xmlns="" w="9525">
                   <a:solidFill>
                     <a:srgbClr val="000000"/>
                   </a:solidFill>
@@ -1329,7 +1330,7 @@
             </a:ln>
             <a:extLst>
               <a:ext uri="{91240B29-F687-4f45-9708-019B960494DF}">
-                <a14:hiddenLine xmlns="" xmlns:a14="http://schemas.microsoft.com/office/drawing/2010/main" w="9525">
+                <a14:hiddenLine xmlns:a14="http://schemas.microsoft.com/office/drawing/2010/main" xmlns="" w="9525">
                   <a:solidFill>
                     <a:srgbClr val="000000"/>
                   </a:solidFill>
@@ -1419,7 +1420,7 @@
             </a:ln>
             <a:extLst>
               <a:ext uri="{91240B29-F687-4f45-9708-019B960494DF}">
-                <a14:hiddenLine xmlns="" xmlns:a14="http://schemas.microsoft.com/office/drawing/2010/main" w="9525">
+                <a14:hiddenLine xmlns:a14="http://schemas.microsoft.com/office/drawing/2010/main" xmlns="" w="9525">
                   <a:solidFill>
                     <a:srgbClr val="000000"/>
                   </a:solidFill>
@@ -1481,7 +1482,7 @@
             </a:ln>
             <a:extLst>
               <a:ext uri="{91240B29-F687-4f45-9708-019B960494DF}">
-                <a14:hiddenLine xmlns="" xmlns:a14="http://schemas.microsoft.com/office/drawing/2010/main" w="9525">
+                <a14:hiddenLine xmlns:a14="http://schemas.microsoft.com/office/drawing/2010/main" xmlns="" w="9525">
                   <a:solidFill>
                     <a:srgbClr val="000000"/>
                   </a:solidFill>
@@ -1591,7 +1592,7 @@
             </a:ln>
             <a:extLst>
               <a:ext uri="{91240B29-F687-4f45-9708-019B960494DF}">
-                <a14:hiddenLine xmlns="" xmlns:a14="http://schemas.microsoft.com/office/drawing/2010/main" w="9525">
+                <a14:hiddenLine xmlns:a14="http://schemas.microsoft.com/office/drawing/2010/main" xmlns="" w="9525">
                   <a:solidFill>
                     <a:srgbClr val="000000"/>
                   </a:solidFill>
@@ -1653,7 +1654,7 @@
             </a:ln>
             <a:extLst>
               <a:ext uri="{91240B29-F687-4f45-9708-019B960494DF}">
-                <a14:hiddenLine xmlns="" xmlns:a14="http://schemas.microsoft.com/office/drawing/2010/main" w="9525">
+                <a14:hiddenLine xmlns:a14="http://schemas.microsoft.com/office/drawing/2010/main" xmlns="" w="9525">
                   <a:solidFill>
                     <a:srgbClr val="000000"/>
                   </a:solidFill>
@@ -1743,7 +1744,7 @@
             </a:ln>
             <a:extLst>
               <a:ext uri="{91240B29-F687-4f45-9708-019B960494DF}">
-                <a14:hiddenLine xmlns="" xmlns:a14="http://schemas.microsoft.com/office/drawing/2010/main" w="9525">
+                <a14:hiddenLine xmlns:a14="http://schemas.microsoft.com/office/drawing/2010/main" xmlns="" w="9525">
                   <a:solidFill>
                     <a:srgbClr val="000000"/>
                   </a:solidFill>
@@ -1833,7 +1834,7 @@
             </a:ln>
             <a:extLst>
               <a:ext uri="{91240B29-F687-4f45-9708-019B960494DF}">
-                <a14:hiddenLine xmlns="" xmlns:a14="http://schemas.microsoft.com/office/drawing/2010/main" w="9525">
+                <a14:hiddenLine xmlns:a14="http://schemas.microsoft.com/office/drawing/2010/main" xmlns="" w="9525">
                   <a:solidFill>
                     <a:srgbClr val="000000"/>
                   </a:solidFill>
@@ -1895,7 +1896,7 @@
             </a:ln>
             <a:extLst>
               <a:ext uri="{91240B29-F687-4f45-9708-019B960494DF}">
-                <a14:hiddenLine xmlns="" xmlns:a14="http://schemas.microsoft.com/office/drawing/2010/main" w="9525">
+                <a14:hiddenLine xmlns:a14="http://schemas.microsoft.com/office/drawing/2010/main" xmlns="" w="9525">
                   <a:solidFill>
                     <a:srgbClr val="000000"/>
                   </a:solidFill>
@@ -1985,7 +1986,7 @@
             </a:ln>
             <a:extLst>
               <a:ext uri="{91240B29-F687-4f45-9708-019B960494DF}">
-                <a14:hiddenLine xmlns="" xmlns:a14="http://schemas.microsoft.com/office/drawing/2010/main" w="9525">
+                <a14:hiddenLine xmlns:a14="http://schemas.microsoft.com/office/drawing/2010/main" xmlns="" w="9525">
                   <a:solidFill>
                     <a:srgbClr val="000000"/>
                   </a:solidFill>
@@ -2075,7 +2076,7 @@
             </a:ln>
             <a:extLst>
               <a:ext uri="{91240B29-F687-4f45-9708-019B960494DF}">
-                <a14:hiddenLine xmlns="" xmlns:a14="http://schemas.microsoft.com/office/drawing/2010/main" w="9525">
+                <a14:hiddenLine xmlns:a14="http://schemas.microsoft.com/office/drawing/2010/main" xmlns="" w="9525">
                   <a:solidFill>
                     <a:srgbClr val="000000"/>
                   </a:solidFill>
@@ -2131,7 +2132,7 @@
             </a:ln>
             <a:extLst>
               <a:ext uri="{91240B29-F687-4f45-9708-019B960494DF}">
-                <a14:hiddenLine xmlns="" xmlns:a14="http://schemas.microsoft.com/office/drawing/2010/main" w="9525">
+                <a14:hiddenLine xmlns:a14="http://schemas.microsoft.com/office/drawing/2010/main" xmlns="" w="9525">
                   <a:solidFill>
                     <a:srgbClr val="000000"/>
                   </a:solidFill>
@@ -2221,7 +2222,7 @@
             </a:ln>
             <a:extLst>
               <a:ext uri="{91240B29-F687-4f45-9708-019B960494DF}">
-                <a14:hiddenLine xmlns="" xmlns:a14="http://schemas.microsoft.com/office/drawing/2010/main" w="9525">
+                <a14:hiddenLine xmlns:a14="http://schemas.microsoft.com/office/drawing/2010/main" xmlns="" w="9525">
                   <a:solidFill>
                     <a:srgbClr val="000000"/>
                   </a:solidFill>
@@ -2277,7 +2278,7 @@
             </a:ln>
             <a:extLst>
               <a:ext uri="{91240B29-F687-4f45-9708-019B960494DF}">
-                <a14:hiddenLine xmlns="" xmlns:a14="http://schemas.microsoft.com/office/drawing/2010/main" w="9525">
+                <a14:hiddenLine xmlns:a14="http://schemas.microsoft.com/office/drawing/2010/main" xmlns="" w="9525">
                   <a:solidFill>
                     <a:srgbClr val="000000"/>
                   </a:solidFill>
@@ -2367,7 +2368,7 @@
             </a:ln>
             <a:extLst>
               <a:ext uri="{91240B29-F687-4f45-9708-019B960494DF}">
-                <a14:hiddenLine xmlns="" xmlns:a14="http://schemas.microsoft.com/office/drawing/2010/main" w="9525">
+                <a14:hiddenLine xmlns:a14="http://schemas.microsoft.com/office/drawing/2010/main" xmlns="" w="9525">
                   <a:solidFill>
                     <a:srgbClr val="000000"/>
                   </a:solidFill>
@@ -2435,7 +2436,7 @@
             </a:ln>
             <a:extLst>
               <a:ext uri="{91240B29-F687-4f45-9708-019B960494DF}">
-                <a14:hiddenLine xmlns="" xmlns:a14="http://schemas.microsoft.com/office/drawing/2010/main" w="9525">
+                <a14:hiddenLine xmlns:a14="http://schemas.microsoft.com/office/drawing/2010/main" xmlns="" w="9525">
                   <a:solidFill>
                     <a:srgbClr val="000000"/>
                   </a:solidFill>
@@ -2525,7 +2526,7 @@
             </a:ln>
             <a:extLst>
               <a:ext uri="{91240B29-F687-4f45-9708-019B960494DF}">
-                <a14:hiddenLine xmlns="" xmlns:a14="http://schemas.microsoft.com/office/drawing/2010/main" w="9525">
+                <a14:hiddenLine xmlns:a14="http://schemas.microsoft.com/office/drawing/2010/main" xmlns="" w="9525">
                   <a:solidFill>
                     <a:srgbClr val="000000"/>
                   </a:solidFill>
@@ -2593,7 +2594,7 @@
             </a:ln>
             <a:extLst>
               <a:ext uri="{91240B29-F687-4f45-9708-019B960494DF}">
-                <a14:hiddenLine xmlns="" xmlns:a14="http://schemas.microsoft.com/office/drawing/2010/main" w="9525">
+                <a14:hiddenLine xmlns:a14="http://schemas.microsoft.com/office/drawing/2010/main" xmlns="" w="9525">
                   <a:solidFill>
                     <a:srgbClr val="000000"/>
                   </a:solidFill>
@@ -2683,7 +2684,7 @@
             </a:ln>
             <a:extLst>
               <a:ext uri="{91240B29-F687-4f45-9708-019B960494DF}">
-                <a14:hiddenLine xmlns="" xmlns:a14="http://schemas.microsoft.com/office/drawing/2010/main" w="9525">
+                <a14:hiddenLine xmlns:a14="http://schemas.microsoft.com/office/drawing/2010/main" xmlns="" w="9525">
                   <a:solidFill>
                     <a:srgbClr val="000000"/>
                   </a:solidFill>
@@ -2717,7 +2718,7 @@
             </a:ln>
             <a:extLst>
               <a:ext uri="{91240B29-F687-4f45-9708-019B960494DF}">
-                <a14:hiddenLine xmlns="" xmlns:a14="http://schemas.microsoft.com/office/drawing/2010/main" w="9525">
+                <a14:hiddenLine xmlns:a14="http://schemas.microsoft.com/office/drawing/2010/main" xmlns="" w="9525">
                   <a:solidFill>
                     <a:srgbClr val="000000"/>
                   </a:solidFill>
@@ -2807,7 +2808,7 @@
             </a:ln>
             <a:extLst>
               <a:ext uri="{91240B29-F687-4f45-9708-019B960494DF}">
-                <a14:hiddenLine xmlns="" xmlns:a14="http://schemas.microsoft.com/office/drawing/2010/main" w="9525">
+                <a14:hiddenLine xmlns:a14="http://schemas.microsoft.com/office/drawing/2010/main" xmlns="" w="9525">
                   <a:solidFill>
                     <a:srgbClr val="000000"/>
                   </a:solidFill>
@@ -2869,7 +2870,7 @@
             </a:ln>
             <a:extLst>
               <a:ext uri="{91240B29-F687-4f45-9708-019B960494DF}">
-                <a14:hiddenLine xmlns="" xmlns:a14="http://schemas.microsoft.com/office/drawing/2010/main" w="9525">
+                <a14:hiddenLine xmlns:a14="http://schemas.microsoft.com/office/drawing/2010/main" xmlns="" w="9525">
                   <a:solidFill>
                     <a:srgbClr val="000000"/>
                   </a:solidFill>
@@ -2931,7 +2932,7 @@
             </a:ln>
             <a:extLst>
               <a:ext uri="{91240B29-F687-4f45-9708-019B960494DF}">
-                <a14:hiddenLine xmlns="" xmlns:a14="http://schemas.microsoft.com/office/drawing/2010/main" w="9525">
+                <a14:hiddenLine xmlns:a14="http://schemas.microsoft.com/office/drawing/2010/main" xmlns="" w="9525">
                   <a:solidFill>
                     <a:srgbClr val="000000"/>
                   </a:solidFill>
@@ -3021,7 +3022,7 @@
             </a:ln>
             <a:extLst>
               <a:ext uri="{91240B29-F687-4f45-9708-019B960494DF}">
-                <a14:hiddenLine xmlns="" xmlns:a14="http://schemas.microsoft.com/office/drawing/2010/main" w="9525">
+                <a14:hiddenLine xmlns:a14="http://schemas.microsoft.com/office/drawing/2010/main" xmlns="" w="9525">
                   <a:solidFill>
                     <a:srgbClr val="000000"/>
                   </a:solidFill>
@@ -3089,7 +3090,7 @@
             </a:ln>
             <a:extLst>
               <a:ext uri="{91240B29-F687-4f45-9708-019B960494DF}">
-                <a14:hiddenLine xmlns="" xmlns:a14="http://schemas.microsoft.com/office/drawing/2010/main" w="9525">
+                <a14:hiddenLine xmlns:a14="http://schemas.microsoft.com/office/drawing/2010/main" xmlns="" w="9525">
                   <a:solidFill>
                     <a:srgbClr val="000000"/>
                   </a:solidFill>
@@ -3151,7 +3152,7 @@
             </a:ln>
             <a:extLst>
               <a:ext uri="{91240B29-F687-4f45-9708-019B960494DF}">
-                <a14:hiddenLine xmlns="" xmlns:a14="http://schemas.microsoft.com/office/drawing/2010/main" w="9525">
+                <a14:hiddenLine xmlns:a14="http://schemas.microsoft.com/office/drawing/2010/main" xmlns="" w="9525">
                   <a:solidFill>
                     <a:srgbClr val="000000"/>
                   </a:solidFill>
@@ -3241,7 +3242,7 @@
             </a:ln>
             <a:extLst>
               <a:ext uri="{91240B29-F687-4f45-9708-019B960494DF}">
-                <a14:hiddenLine xmlns="" xmlns:a14="http://schemas.microsoft.com/office/drawing/2010/main" w="9525">
+                <a14:hiddenLine xmlns:a14="http://schemas.microsoft.com/office/drawing/2010/main" xmlns="" w="9525">
                   <a:solidFill>
                     <a:srgbClr val="000000"/>
                   </a:solidFill>
@@ -3303,7 +3304,7 @@
             </a:ln>
             <a:extLst>
               <a:ext uri="{91240B29-F687-4f45-9708-019B960494DF}">
-                <a14:hiddenLine xmlns="" xmlns:a14="http://schemas.microsoft.com/office/drawing/2010/main" w="9525">
+                <a14:hiddenLine xmlns:a14="http://schemas.microsoft.com/office/drawing/2010/main" xmlns="" w="9525">
                   <a:solidFill>
                     <a:srgbClr val="000000"/>
                   </a:solidFill>
@@ -3393,7 +3394,7 @@
             </a:ln>
             <a:extLst>
               <a:ext uri="{91240B29-F687-4f45-9708-019B960494DF}">
-                <a14:hiddenLine xmlns="" xmlns:a14="http://schemas.microsoft.com/office/drawing/2010/main" w="9525">
+                <a14:hiddenLine xmlns:a14="http://schemas.microsoft.com/office/drawing/2010/main" xmlns="" w="9525">
                   <a:solidFill>
                     <a:srgbClr val="000000"/>
                   </a:solidFill>
@@ -3455,7 +3456,7 @@
             </a:ln>
             <a:extLst>
               <a:ext uri="{91240B29-F687-4f45-9708-019B960494DF}">
-                <a14:hiddenLine xmlns="" xmlns:a14="http://schemas.microsoft.com/office/drawing/2010/main" w="9525">
+                <a14:hiddenLine xmlns:a14="http://schemas.microsoft.com/office/drawing/2010/main" xmlns="" w="9525">
                   <a:solidFill>
                     <a:srgbClr val="000000"/>
                   </a:solidFill>
@@ -3545,7 +3546,7 @@
             </a:ln>
             <a:extLst>
               <a:ext uri="{91240B29-F687-4f45-9708-019B960494DF}">
-                <a14:hiddenLine xmlns="" xmlns:a14="http://schemas.microsoft.com/office/drawing/2010/main" w="9525">
+                <a14:hiddenLine xmlns:a14="http://schemas.microsoft.com/office/drawing/2010/main" xmlns="" w="9525">
                   <a:solidFill>
                     <a:srgbClr val="000000"/>
                   </a:solidFill>
@@ -3579,7 +3580,7 @@
             </a:ln>
             <a:extLst>
               <a:ext uri="{91240B29-F687-4f45-9708-019B960494DF}">
-                <a14:hiddenLine xmlns="" xmlns:a14="http://schemas.microsoft.com/office/drawing/2010/main" w="9525">
+                <a14:hiddenLine xmlns:a14="http://schemas.microsoft.com/office/drawing/2010/main" xmlns="" w="9525">
                   <a:solidFill>
                     <a:srgbClr val="000000"/>
                   </a:solidFill>
@@ -3644,7 +3645,7 @@
             </a:ln>
             <a:extLst>
               <a:ext uri="{91240B29-F687-4f45-9708-019B960494DF}">
-                <a14:hiddenLine xmlns="" xmlns:a14="http://schemas.microsoft.com/office/drawing/2010/main" w="9525">
+                <a14:hiddenLine xmlns:a14="http://schemas.microsoft.com/office/drawing/2010/main" xmlns="" w="9525">
                   <a:solidFill>
                     <a:srgbClr val="000000"/>
                   </a:solidFill>
@@ -3734,7 +3735,7 @@
             </a:ln>
             <a:extLst>
               <a:ext uri="{91240B29-F687-4f45-9708-019B960494DF}">
-                <a14:hiddenLine xmlns="" xmlns:a14="http://schemas.microsoft.com/office/drawing/2010/main" w="9525">
+                <a14:hiddenLine xmlns:a14="http://schemas.microsoft.com/office/drawing/2010/main" xmlns="" w="9525">
                   <a:solidFill>
                     <a:srgbClr val="000000"/>
                   </a:solidFill>
@@ -3796,7 +3797,7 @@
             </a:ln>
             <a:extLst>
               <a:ext uri="{91240B29-F687-4f45-9708-019B960494DF}">
-                <a14:hiddenLine xmlns="" xmlns:a14="http://schemas.microsoft.com/office/drawing/2010/main" w="9525">
+                <a14:hiddenLine xmlns:a14="http://schemas.microsoft.com/office/drawing/2010/main" xmlns="" w="9525">
                   <a:solidFill>
                     <a:srgbClr val="000000"/>
                   </a:solidFill>
@@ -3886,7 +3887,7 @@
             </a:ln>
             <a:extLst>
               <a:ext uri="{91240B29-F687-4f45-9708-019B960494DF}">
-                <a14:hiddenLine xmlns="" xmlns:a14="http://schemas.microsoft.com/office/drawing/2010/main" w="9525">
+                <a14:hiddenLine xmlns:a14="http://schemas.microsoft.com/office/drawing/2010/main" xmlns="" w="9525">
                   <a:solidFill>
                     <a:srgbClr val="000000"/>
                   </a:solidFill>
@@ -3976,7 +3977,7 @@
             </a:ln>
             <a:extLst>
               <a:ext uri="{91240B29-F687-4f45-9708-019B960494DF}">
-                <a14:hiddenLine xmlns="" xmlns:a14="http://schemas.microsoft.com/office/drawing/2010/main" w="9525">
+                <a14:hiddenLine xmlns:a14="http://schemas.microsoft.com/office/drawing/2010/main" xmlns="" w="9525">
                   <a:solidFill>
                     <a:srgbClr val="000000"/>
                   </a:solidFill>
@@ -4041,7 +4042,7 @@
             </a:ln>
             <a:extLst>
               <a:ext uri="{91240B29-F687-4f45-9708-019B960494DF}">
-                <a14:hiddenLine xmlns="" xmlns:a14="http://schemas.microsoft.com/office/drawing/2010/main" w="9525">
+                <a14:hiddenLine xmlns:a14="http://schemas.microsoft.com/office/drawing/2010/main" xmlns="" w="9525">
                   <a:solidFill>
                     <a:srgbClr val="000000"/>
                   </a:solidFill>
@@ -4103,7 +4104,7 @@
             </a:ln>
             <a:extLst>
               <a:ext uri="{91240B29-F687-4f45-9708-019B960494DF}">
-                <a14:hiddenLine xmlns="" xmlns:a14="http://schemas.microsoft.com/office/drawing/2010/main" w="9525">
+                <a14:hiddenLine xmlns:a14="http://schemas.microsoft.com/office/drawing/2010/main" xmlns="" w="9525">
                   <a:solidFill>
                     <a:srgbClr val="000000"/>
                   </a:solidFill>
@@ -4193,7 +4194,7 @@
             </a:ln>
             <a:extLst>
               <a:ext uri="{91240B29-F687-4f45-9708-019B960494DF}">
-                <a14:hiddenLine xmlns="" xmlns:a14="http://schemas.microsoft.com/office/drawing/2010/main" w="9525">
+                <a14:hiddenLine xmlns:a14="http://schemas.microsoft.com/office/drawing/2010/main" xmlns="" w="9525">
                   <a:solidFill>
                     <a:srgbClr val="000000"/>
                   </a:solidFill>
@@ -4283,7 +4284,7 @@
             </a:ln>
             <a:extLst>
               <a:ext uri="{91240B29-F687-4f45-9708-019B960494DF}">
-                <a14:hiddenLine xmlns="" xmlns:a14="http://schemas.microsoft.com/office/drawing/2010/main" w="9525">
+                <a14:hiddenLine xmlns:a14="http://schemas.microsoft.com/office/drawing/2010/main" xmlns="" w="9525">
                   <a:solidFill>
                     <a:srgbClr val="000000"/>
                   </a:solidFill>
@@ -4345,7 +4346,7 @@
             </a:ln>
             <a:extLst>
               <a:ext uri="{91240B29-F687-4f45-9708-019B960494DF}">
-                <a14:hiddenLine xmlns="" xmlns:a14="http://schemas.microsoft.com/office/drawing/2010/main" w="9525">
+                <a14:hiddenLine xmlns:a14="http://schemas.microsoft.com/office/drawing/2010/main" xmlns="" w="9525">
                   <a:solidFill>
                     <a:srgbClr val="000000"/>
                   </a:solidFill>
@@ -4465,7 +4466,7 @@
             </a:ln>
             <a:extLst>
               <a:ext uri="{91240B29-F687-4f45-9708-019B960494DF}">
-                <a14:hiddenLine xmlns="" xmlns:a14="http://schemas.microsoft.com/office/drawing/2010/main" w="9525">
+                <a14:hiddenLine xmlns:a14="http://schemas.microsoft.com/office/drawing/2010/main" xmlns="" w="9525">
                   <a:solidFill>
                     <a:srgbClr val="000000"/>
                   </a:solidFill>
@@ -4533,7 +4534,7 @@
             </a:ln>
             <a:extLst>
               <a:ext uri="{91240B29-F687-4f45-9708-019B960494DF}">
-                <a14:hiddenLine xmlns="" xmlns:a14="http://schemas.microsoft.com/office/drawing/2010/main" w="9525">
+                <a14:hiddenLine xmlns:a14="http://schemas.microsoft.com/office/drawing/2010/main" xmlns="" w="9525">
                   <a:solidFill>
                     <a:srgbClr val="000000"/>
                   </a:solidFill>
@@ -4623,7 +4624,7 @@
             </a:ln>
             <a:extLst>
               <a:ext uri="{91240B29-F687-4f45-9708-019B960494DF}">
-                <a14:hiddenLine xmlns="" xmlns:a14="http://schemas.microsoft.com/office/drawing/2010/main" w="9525">
+                <a14:hiddenLine xmlns:a14="http://schemas.microsoft.com/office/drawing/2010/main" xmlns="" w="9525">
                   <a:solidFill>
                     <a:srgbClr val="000000"/>
                   </a:solidFill>
@@ -4763,7 +4764,7 @@
           <a:p>
             <a:fld id="{2E6956D0-FF82-46DA-9F38-706DC86F0D56}" type="datetime1">
               <a:rPr lang="en-US" smtClean="0"/>
-              <a:t>3/15/2025</a:t>
+              <a:t>3/20/2025</a:t>
             </a:fld>
             <a:endParaRPr lang="en-US" dirty="0"/>
           </a:p>
@@ -5058,7 +5059,7 @@
           <a:p>
             <a:fld id="{B29A0609-7FEE-4DC0-9780-D623E024975E}" type="datetime1">
               <a:rPr lang="en-US" smtClean="0"/>
-              <a:t>3/15/2025</a:t>
+              <a:t>3/20/2025</a:t>
             </a:fld>
             <a:endParaRPr lang="en-US" dirty="0"/>
           </a:p>
@@ -5252,7 +5253,7 @@
           <a:p>
             <a:fld id="{D8595C36-295C-44A6-AB85-859B320446F8}" type="datetime1">
               <a:rPr lang="en-US" smtClean="0"/>
-              <a:t>3/15/2025</a:t>
+              <a:t>3/20/2025</a:t>
             </a:fld>
             <a:endParaRPr lang="en-US" dirty="0"/>
           </a:p>
@@ -5513,7 +5514,7 @@
           <a:p>
             <a:fld id="{99F217E4-37B9-4791-A38E-D8BC4AED1ACB}" type="datetime1">
               <a:rPr lang="en-US" smtClean="0"/>
-              <a:t>3/15/2025</a:t>
+              <a:t>3/20/2025</a:t>
             </a:fld>
             <a:endParaRPr lang="en-US" dirty="0"/>
           </a:p>
@@ -5946,7 +5947,7 @@
           <a:p>
             <a:fld id="{7326BBBD-F342-45E3-84E1-84BE66868B86}" type="datetime1">
               <a:rPr lang="en-US" smtClean="0"/>
-              <a:t>3/15/2025</a:t>
+              <a:t>3/20/2025</a:t>
             </a:fld>
             <a:endParaRPr lang="en-US" dirty="0"/>
           </a:p>
@@ -6491,7 +6492,7 @@
           <a:p>
             <a:fld id="{BF8B92E3-5D56-4D9D-A69E-DE111053FD9E}" type="datetime1">
               <a:rPr lang="en-US" smtClean="0"/>
-              <a:t>3/15/2025</a:t>
+              <a:t>3/20/2025</a:t>
             </a:fld>
             <a:endParaRPr lang="en-US" dirty="0"/>
           </a:p>
@@ -7209,7 +7210,7 @@
           <a:p>
             <a:fld id="{5530DBAB-C152-4B13-894C-B845E59C3017}" type="datetime1">
               <a:rPr lang="en-US" smtClean="0"/>
-              <a:t>3/15/2025</a:t>
+              <a:t>3/20/2025</a:t>
             </a:fld>
             <a:endParaRPr lang="en-US" dirty="0"/>
           </a:p>
@@ -7377,7 +7378,7 @@
           <a:p>
             <a:fld id="{5A1A901B-AC15-4CE2-B187-E1906D80C40A}" type="datetime1">
               <a:rPr lang="en-US" smtClean="0"/>
-              <a:t>3/15/2025</a:t>
+              <a:t>3/20/2025</a:t>
             </a:fld>
             <a:endParaRPr lang="en-US" dirty="0"/>
           </a:p>
@@ -7555,7 +7556,7 @@
           <a:p>
             <a:fld id="{173BF05D-F707-4D33-BC3D-A422F7F8BD2C}" type="datetime1">
               <a:rPr lang="en-US" smtClean="0"/>
-              <a:t>3/15/2025</a:t>
+              <a:t>3/20/2025</a:t>
             </a:fld>
             <a:endParaRPr lang="en-US" dirty="0"/>
           </a:p>
@@ -7723,7 +7724,7 @@
           <a:p>
             <a:fld id="{8EE2707C-063E-46D3-BE25-A9A8D80E43A6}" type="datetime1">
               <a:rPr lang="en-US" smtClean="0"/>
-              <a:t>3/15/2025</a:t>
+              <a:t>3/20/2025</a:t>
             </a:fld>
             <a:endParaRPr lang="en-US" dirty="0"/>
           </a:p>
@@ -7976,7 +7977,7 @@
           <a:p>
             <a:fld id="{DE2BBCB1-03A1-4E25-BBBE-484FF07E9034}" type="datetime1">
               <a:rPr lang="en-US" smtClean="0"/>
-              <a:t>3/15/2025</a:t>
+              <a:t>3/20/2025</a:t>
             </a:fld>
             <a:endParaRPr lang="en-US" dirty="0"/>
           </a:p>
@@ -8206,7 +8207,7 @@
           <a:p>
             <a:fld id="{32AE1E5B-2754-4F28-8433-77BB8DA5C10A}" type="datetime1">
               <a:rPr lang="en-US" smtClean="0"/>
-              <a:t>3/15/2025</a:t>
+              <a:t>3/20/2025</a:t>
             </a:fld>
             <a:endParaRPr lang="en-US" dirty="0"/>
           </a:p>
@@ -8585,7 +8586,7 @@
           <a:p>
             <a:fld id="{A949E13A-A720-4FA7-B4C3-D48667EC44AE}" type="datetime1">
               <a:rPr lang="en-US" smtClean="0"/>
-              <a:t>3/15/2025</a:t>
+              <a:t>3/20/2025</a:t>
             </a:fld>
             <a:endParaRPr lang="en-US" dirty="0"/>
           </a:p>
@@ -8701,7 +8702,7 @@
           <a:p>
             <a:fld id="{8907D086-5A12-4193-995F-F84EC02B1AD8}" type="datetime1">
               <a:rPr lang="en-US" smtClean="0"/>
-              <a:t>3/15/2025</a:t>
+              <a:t>3/20/2025</a:t>
             </a:fld>
             <a:endParaRPr lang="en-US" dirty="0"/>
           </a:p>
@@ -8794,7 +8795,7 @@
           <a:p>
             <a:fld id="{AE68C3A2-0540-4972-9AF7-3C65A04AEEB6}" type="datetime1">
               <a:rPr lang="en-US" smtClean="0"/>
-              <a:t>3/15/2025</a:t>
+              <a:t>3/20/2025</a:t>
             </a:fld>
             <a:endParaRPr lang="en-US" dirty="0"/>
           </a:p>
@@ -9041,7 +9042,7 @@
           <a:p>
             <a:fld id="{E1972B15-44AC-4DC1-B1E2-4E855788D9BC}" type="datetime1">
               <a:rPr lang="en-US" smtClean="0"/>
-              <a:t>3/15/2025</a:t>
+              <a:t>3/20/2025</a:t>
             </a:fld>
             <a:endParaRPr lang="en-US" dirty="0"/>
           </a:p>
@@ -9319,7 +9320,7 @@
           <a:p>
             <a:fld id="{35586A4F-619C-4F02-A396-839181AC6BB4}" type="datetime1">
               <a:rPr lang="en-US" smtClean="0"/>
-              <a:t>3/15/2025</a:t>
+              <a:t>3/20/2025</a:t>
             </a:fld>
             <a:endParaRPr lang="en-US" dirty="0"/>
           </a:p>
@@ -9433,7 +9434,7 @@
           <a:noFill/>
           <a:extLst>
             <a:ext uri="{909E8E84-426E-40dd-AFC4-6F175D3DCCD1}">
-              <a14:hiddenFill xmlns="" xmlns:a14="http://schemas.microsoft.com/office/drawing/2010/main">
+              <a14:hiddenFill xmlns:a14="http://schemas.microsoft.com/office/drawing/2010/main" xmlns="">
                 <a:solidFill>
                   <a:srgbClr val="FFFFFF"/>
                 </a:solidFill>
@@ -9507,7 +9508,7 @@
               </a:ln>
               <a:extLst>
                 <a:ext uri="{91240B29-F687-4f45-9708-019B960494DF}">
-                  <a14:hiddenLine xmlns="" xmlns:a14="http://schemas.microsoft.com/office/drawing/2010/main" w="9525">
+                  <a14:hiddenLine xmlns:a14="http://schemas.microsoft.com/office/drawing/2010/main" xmlns="" w="9525">
                     <a:solidFill>
                       <a:srgbClr val="000000"/>
                     </a:solidFill>
@@ -9597,7 +9598,7 @@
               </a:ln>
               <a:extLst>
                 <a:ext uri="{91240B29-F687-4f45-9708-019B960494DF}">
-                  <a14:hiddenLine xmlns="" xmlns:a14="http://schemas.microsoft.com/office/drawing/2010/main" w="9525">
+                  <a14:hiddenLine xmlns:a14="http://schemas.microsoft.com/office/drawing/2010/main" xmlns="" w="9525">
                     <a:solidFill>
                       <a:srgbClr val="000000"/>
                     </a:solidFill>
@@ -9687,7 +9688,7 @@
               </a:ln>
               <a:extLst>
                 <a:ext uri="{91240B29-F687-4f45-9708-019B960494DF}">
-                  <a14:hiddenLine xmlns="" xmlns:a14="http://schemas.microsoft.com/office/drawing/2010/main" w="9525">
+                  <a14:hiddenLine xmlns:a14="http://schemas.microsoft.com/office/drawing/2010/main" xmlns="" w="9525">
                     <a:solidFill>
                       <a:srgbClr val="000000"/>
                     </a:solidFill>
@@ -9749,7 +9750,7 @@
               </a:ln>
               <a:extLst>
                 <a:ext uri="{91240B29-F687-4f45-9708-019B960494DF}">
-                  <a14:hiddenLine xmlns="" xmlns:a14="http://schemas.microsoft.com/office/drawing/2010/main" w="9525">
+                  <a14:hiddenLine xmlns:a14="http://schemas.microsoft.com/office/drawing/2010/main" xmlns="" w="9525">
                     <a:solidFill>
                       <a:srgbClr val="000000"/>
                     </a:solidFill>
@@ -9839,7 +9840,7 @@
               </a:ln>
               <a:extLst>
                 <a:ext uri="{91240B29-F687-4f45-9708-019B960494DF}">
-                  <a14:hiddenLine xmlns="" xmlns:a14="http://schemas.microsoft.com/office/drawing/2010/main" w="9525">
+                  <a14:hiddenLine xmlns:a14="http://schemas.microsoft.com/office/drawing/2010/main" xmlns="" w="9525">
                     <a:solidFill>
                       <a:srgbClr val="000000"/>
                     </a:solidFill>
@@ -9901,7 +9902,7 @@
               </a:ln>
               <a:extLst>
                 <a:ext uri="{91240B29-F687-4f45-9708-019B960494DF}">
-                  <a14:hiddenLine xmlns="" xmlns:a14="http://schemas.microsoft.com/office/drawing/2010/main" w="9525">
+                  <a14:hiddenLine xmlns:a14="http://schemas.microsoft.com/office/drawing/2010/main" xmlns="" w="9525">
                     <a:solidFill>
                       <a:srgbClr val="000000"/>
                     </a:solidFill>
@@ -9963,7 +9964,7 @@
               </a:ln>
               <a:extLst>
                 <a:ext uri="{91240B29-F687-4f45-9708-019B960494DF}">
-                  <a14:hiddenLine xmlns="" xmlns:a14="http://schemas.microsoft.com/office/drawing/2010/main" w="9525">
+                  <a14:hiddenLine xmlns:a14="http://schemas.microsoft.com/office/drawing/2010/main" xmlns="" w="9525">
                     <a:solidFill>
                       <a:srgbClr val="000000"/>
                     </a:solidFill>
@@ -10053,7 +10054,7 @@
               </a:ln>
               <a:extLst>
                 <a:ext uri="{91240B29-F687-4f45-9708-019B960494DF}">
-                  <a14:hiddenLine xmlns="" xmlns:a14="http://schemas.microsoft.com/office/drawing/2010/main" w="9525">
+                  <a14:hiddenLine xmlns:a14="http://schemas.microsoft.com/office/drawing/2010/main" xmlns="" w="9525">
                     <a:solidFill>
                       <a:srgbClr val="000000"/>
                     </a:solidFill>
@@ -10143,7 +10144,7 @@
               </a:ln>
               <a:extLst>
                 <a:ext uri="{91240B29-F687-4f45-9708-019B960494DF}">
-                  <a14:hiddenLine xmlns="" xmlns:a14="http://schemas.microsoft.com/office/drawing/2010/main" w="9525">
+                  <a14:hiddenLine xmlns:a14="http://schemas.microsoft.com/office/drawing/2010/main" xmlns="" w="9525">
                     <a:solidFill>
                       <a:srgbClr val="000000"/>
                     </a:solidFill>
@@ -10205,7 +10206,7 @@
               </a:ln>
               <a:extLst>
                 <a:ext uri="{91240B29-F687-4f45-9708-019B960494DF}">
-                  <a14:hiddenLine xmlns="" xmlns:a14="http://schemas.microsoft.com/office/drawing/2010/main" w="9525">
+                  <a14:hiddenLine xmlns:a14="http://schemas.microsoft.com/office/drawing/2010/main" xmlns="" w="9525">
                     <a:solidFill>
                       <a:srgbClr val="000000"/>
                     </a:solidFill>
@@ -10315,7 +10316,7 @@
               </a:ln>
               <a:extLst>
                 <a:ext uri="{91240B29-F687-4f45-9708-019B960494DF}">
-                  <a14:hiddenLine xmlns="" xmlns:a14="http://schemas.microsoft.com/office/drawing/2010/main" w="9525">
+                  <a14:hiddenLine xmlns:a14="http://schemas.microsoft.com/office/drawing/2010/main" xmlns="" w="9525">
                     <a:solidFill>
                       <a:srgbClr val="000000"/>
                     </a:solidFill>
@@ -10399,7 +10400,7 @@
               </a:ln>
               <a:extLst>
                 <a:ext uri="{91240B29-F687-4f45-9708-019B960494DF}">
-                  <a14:hiddenLine xmlns="" xmlns:a14="http://schemas.microsoft.com/office/drawing/2010/main" w="9525">
+                  <a14:hiddenLine xmlns:a14="http://schemas.microsoft.com/office/drawing/2010/main" xmlns="" w="9525">
                     <a:solidFill>
                       <a:srgbClr val="000000"/>
                     </a:solidFill>
@@ -10461,7 +10462,7 @@
               </a:ln>
               <a:extLst>
                 <a:ext uri="{91240B29-F687-4f45-9708-019B960494DF}">
-                  <a14:hiddenLine xmlns="" xmlns:a14="http://schemas.microsoft.com/office/drawing/2010/main" w="9525">
+                  <a14:hiddenLine xmlns:a14="http://schemas.microsoft.com/office/drawing/2010/main" xmlns="" w="9525">
                     <a:solidFill>
                       <a:srgbClr val="000000"/>
                     </a:solidFill>
@@ -10523,7 +10524,7 @@
               </a:ln>
               <a:extLst>
                 <a:ext uri="{91240B29-F687-4f45-9708-019B960494DF}">
-                  <a14:hiddenLine xmlns="" xmlns:a14="http://schemas.microsoft.com/office/drawing/2010/main" w="9525">
+                  <a14:hiddenLine xmlns:a14="http://schemas.microsoft.com/office/drawing/2010/main" xmlns="" w="9525">
                     <a:solidFill>
                       <a:srgbClr val="000000"/>
                     </a:solidFill>
@@ -10613,7 +10614,7 @@
               </a:ln>
               <a:extLst>
                 <a:ext uri="{91240B29-F687-4f45-9708-019B960494DF}">
-                  <a14:hiddenLine xmlns="" xmlns:a14="http://schemas.microsoft.com/office/drawing/2010/main" w="9525">
+                  <a14:hiddenLine xmlns:a14="http://schemas.microsoft.com/office/drawing/2010/main" xmlns="" w="9525">
                     <a:solidFill>
                       <a:srgbClr val="000000"/>
                     </a:solidFill>
@@ -10647,7 +10648,7 @@
               </a:ln>
               <a:extLst>
                 <a:ext uri="{91240B29-F687-4f45-9708-019B960494DF}">
-                  <a14:hiddenLine xmlns="" xmlns:a14="http://schemas.microsoft.com/office/drawing/2010/main" w="9525">
+                  <a14:hiddenLine xmlns:a14="http://schemas.microsoft.com/office/drawing/2010/main" xmlns="" w="9525">
                     <a:solidFill>
                       <a:srgbClr val="000000"/>
                     </a:solidFill>
@@ -10712,7 +10713,7 @@
               </a:ln>
               <a:extLst>
                 <a:ext uri="{91240B29-F687-4f45-9708-019B960494DF}">
-                  <a14:hiddenLine xmlns="" xmlns:a14="http://schemas.microsoft.com/office/drawing/2010/main" w="9525">
+                  <a14:hiddenLine xmlns:a14="http://schemas.microsoft.com/office/drawing/2010/main" xmlns="" w="9525">
                     <a:solidFill>
                       <a:srgbClr val="000000"/>
                     </a:solidFill>
@@ -10802,7 +10803,7 @@
               </a:ln>
               <a:extLst>
                 <a:ext uri="{91240B29-F687-4f45-9708-019B960494DF}">
-                  <a14:hiddenLine xmlns="" xmlns:a14="http://schemas.microsoft.com/office/drawing/2010/main" w="9525">
+                  <a14:hiddenLine xmlns:a14="http://schemas.microsoft.com/office/drawing/2010/main" xmlns="" w="9525">
                     <a:solidFill>
                       <a:srgbClr val="000000"/>
                     </a:solidFill>
@@ -10864,7 +10865,7 @@
               </a:ln>
               <a:extLst>
                 <a:ext uri="{91240B29-F687-4f45-9708-019B960494DF}">
-                  <a14:hiddenLine xmlns="" xmlns:a14="http://schemas.microsoft.com/office/drawing/2010/main" w="9525">
+                  <a14:hiddenLine xmlns:a14="http://schemas.microsoft.com/office/drawing/2010/main" xmlns="" w="9525">
                     <a:solidFill>
                       <a:srgbClr val="000000"/>
                     </a:solidFill>
@@ -10954,7 +10955,7 @@
               </a:ln>
               <a:extLst>
                 <a:ext uri="{91240B29-F687-4f45-9708-019B960494DF}">
-                  <a14:hiddenLine xmlns="" xmlns:a14="http://schemas.microsoft.com/office/drawing/2010/main" w="9525">
+                  <a14:hiddenLine xmlns:a14="http://schemas.microsoft.com/office/drawing/2010/main" xmlns="" w="9525">
                     <a:solidFill>
                       <a:srgbClr val="000000"/>
                     </a:solidFill>
@@ -11019,7 +11020,7 @@
               </a:ln>
               <a:extLst>
                 <a:ext uri="{91240B29-F687-4f45-9708-019B960494DF}">
-                  <a14:hiddenLine xmlns="" xmlns:a14="http://schemas.microsoft.com/office/drawing/2010/main" w="9525">
+                  <a14:hiddenLine xmlns:a14="http://schemas.microsoft.com/office/drawing/2010/main" xmlns="" w="9525">
                     <a:solidFill>
                       <a:srgbClr val="000000"/>
                     </a:solidFill>
@@ -11081,7 +11082,7 @@
               </a:ln>
               <a:extLst>
                 <a:ext uri="{91240B29-F687-4f45-9708-019B960494DF}">
-                  <a14:hiddenLine xmlns="" xmlns:a14="http://schemas.microsoft.com/office/drawing/2010/main" w="9525">
+                  <a14:hiddenLine xmlns:a14="http://schemas.microsoft.com/office/drawing/2010/main" xmlns="" w="9525">
                     <a:solidFill>
                       <a:srgbClr val="000000"/>
                     </a:solidFill>
@@ -11171,7 +11172,7 @@
               </a:ln>
               <a:extLst>
                 <a:ext uri="{91240B29-F687-4f45-9708-019B960494DF}">
-                  <a14:hiddenLine xmlns="" xmlns:a14="http://schemas.microsoft.com/office/drawing/2010/main" w="9525">
+                  <a14:hiddenLine xmlns:a14="http://schemas.microsoft.com/office/drawing/2010/main" xmlns="" w="9525">
                     <a:solidFill>
                       <a:srgbClr val="000000"/>
                     </a:solidFill>
@@ -11261,7 +11262,7 @@
               </a:ln>
               <a:extLst>
                 <a:ext uri="{91240B29-F687-4f45-9708-019B960494DF}">
-                  <a14:hiddenLine xmlns="" xmlns:a14="http://schemas.microsoft.com/office/drawing/2010/main" w="9525">
+                  <a14:hiddenLine xmlns:a14="http://schemas.microsoft.com/office/drawing/2010/main" xmlns="" w="9525">
                     <a:solidFill>
                       <a:srgbClr val="000000"/>
                     </a:solidFill>
@@ -11326,7 +11327,7 @@
               </a:ln>
               <a:extLst>
                 <a:ext uri="{91240B29-F687-4f45-9708-019B960494DF}">
-                  <a14:hiddenLine xmlns="" xmlns:a14="http://schemas.microsoft.com/office/drawing/2010/main" w="9525">
+                  <a14:hiddenLine xmlns:a14="http://schemas.microsoft.com/office/drawing/2010/main" xmlns="" w="9525">
                     <a:solidFill>
                       <a:srgbClr val="000000"/>
                     </a:solidFill>
@@ -11446,7 +11447,7 @@
               </a:ln>
               <a:extLst>
                 <a:ext uri="{91240B29-F687-4f45-9708-019B960494DF}">
-                  <a14:hiddenLine xmlns="" xmlns:a14="http://schemas.microsoft.com/office/drawing/2010/main" w="9525">
+                  <a14:hiddenLine xmlns:a14="http://schemas.microsoft.com/office/drawing/2010/main" xmlns="" w="9525">
                     <a:solidFill>
                       <a:srgbClr val="000000"/>
                     </a:solidFill>
@@ -11544,7 +11545,7 @@
               </a:ln>
               <a:extLst>
                 <a:ext uri="{91240B29-F687-4f45-9708-019B960494DF}">
-                  <a14:hiddenLine xmlns="" xmlns:a14="http://schemas.microsoft.com/office/drawing/2010/main" w="9525">
+                  <a14:hiddenLine xmlns:a14="http://schemas.microsoft.com/office/drawing/2010/main" xmlns="" w="9525">
                     <a:solidFill>
                       <a:srgbClr val="000000"/>
                     </a:solidFill>
@@ -11659,7 +11660,7 @@
               </a:ln>
               <a:extLst>
                 <a:ext uri="{91240B29-F687-4f45-9708-019B960494DF}">
-                  <a14:hiddenLine xmlns="" xmlns:a14="http://schemas.microsoft.com/office/drawing/2010/main" w="9525">
+                  <a14:hiddenLine xmlns:a14="http://schemas.microsoft.com/office/drawing/2010/main" xmlns="" w="9525">
                     <a:solidFill>
                       <a:srgbClr val="000000"/>
                     </a:solidFill>
@@ -11749,7 +11750,7 @@
               </a:ln>
               <a:extLst>
                 <a:ext uri="{91240B29-F687-4f45-9708-019B960494DF}">
-                  <a14:hiddenLine xmlns="" xmlns:a14="http://schemas.microsoft.com/office/drawing/2010/main" w="9525">
+                  <a14:hiddenLine xmlns:a14="http://schemas.microsoft.com/office/drawing/2010/main" xmlns="" w="9525">
                     <a:solidFill>
                       <a:srgbClr val="000000"/>
                     </a:solidFill>
@@ -11814,7 +11815,7 @@
               </a:ln>
               <a:extLst>
                 <a:ext uri="{91240B29-F687-4f45-9708-019B960494DF}">
-                  <a14:hiddenLine xmlns="" xmlns:a14="http://schemas.microsoft.com/office/drawing/2010/main" w="9525">
+                  <a14:hiddenLine xmlns:a14="http://schemas.microsoft.com/office/drawing/2010/main" xmlns="" w="9525">
                     <a:solidFill>
                       <a:srgbClr val="000000"/>
                     </a:solidFill>
@@ -11904,7 +11905,7 @@
               </a:ln>
               <a:extLst>
                 <a:ext uri="{91240B29-F687-4f45-9708-019B960494DF}">
-                  <a14:hiddenLine xmlns="" xmlns:a14="http://schemas.microsoft.com/office/drawing/2010/main" w="9525">
+                  <a14:hiddenLine xmlns:a14="http://schemas.microsoft.com/office/drawing/2010/main" xmlns="" w="9525">
                     <a:solidFill>
                       <a:srgbClr val="000000"/>
                     </a:solidFill>
@@ -11972,7 +11973,7 @@
               </a:ln>
               <a:extLst>
                 <a:ext uri="{91240B29-F687-4f45-9708-019B960494DF}">
-                  <a14:hiddenLine xmlns="" xmlns:a14="http://schemas.microsoft.com/office/drawing/2010/main" w="9525">
+                  <a14:hiddenLine xmlns:a14="http://schemas.microsoft.com/office/drawing/2010/main" xmlns="" w="9525">
                     <a:solidFill>
                       <a:srgbClr val="000000"/>
                     </a:solidFill>
@@ -12062,7 +12063,7 @@
               </a:ln>
               <a:extLst>
                 <a:ext uri="{91240B29-F687-4f45-9708-019B960494DF}">
-                  <a14:hiddenLine xmlns="" xmlns:a14="http://schemas.microsoft.com/office/drawing/2010/main" w="9525">
+                  <a14:hiddenLine xmlns:a14="http://schemas.microsoft.com/office/drawing/2010/main" xmlns="" w="9525">
                     <a:solidFill>
                       <a:srgbClr val="000000"/>
                     </a:solidFill>
@@ -12130,7 +12131,7 @@
               </a:ln>
               <a:extLst>
                 <a:ext uri="{91240B29-F687-4f45-9708-019B960494DF}">
-                  <a14:hiddenLine xmlns="" xmlns:a14="http://schemas.microsoft.com/office/drawing/2010/main" w="9525">
+                  <a14:hiddenLine xmlns:a14="http://schemas.microsoft.com/office/drawing/2010/main" xmlns="" w="9525">
                     <a:solidFill>
                       <a:srgbClr val="000000"/>
                     </a:solidFill>
@@ -12220,7 +12221,7 @@
               </a:ln>
               <a:extLst>
                 <a:ext uri="{91240B29-F687-4f45-9708-019B960494DF}">
-                  <a14:hiddenLine xmlns="" xmlns:a14="http://schemas.microsoft.com/office/drawing/2010/main" w="9525">
+                  <a14:hiddenLine xmlns:a14="http://schemas.microsoft.com/office/drawing/2010/main" xmlns="" w="9525">
                     <a:solidFill>
                       <a:srgbClr val="000000"/>
                     </a:solidFill>
@@ -12254,7 +12255,7 @@
               </a:ln>
               <a:extLst>
                 <a:ext uri="{91240B29-F687-4f45-9708-019B960494DF}">
-                  <a14:hiddenLine xmlns="" xmlns:a14="http://schemas.microsoft.com/office/drawing/2010/main" w="9525">
+                  <a14:hiddenLine xmlns:a14="http://schemas.microsoft.com/office/drawing/2010/main" xmlns="" w="9525">
                     <a:solidFill>
                       <a:srgbClr val="000000"/>
                     </a:solidFill>
@@ -12394,7 +12395,7 @@
           <a:p>
             <a:fld id="{9C2E08F3-6ADB-4031-89E6-89707F5CDBB1}" type="datetime1">
               <a:rPr lang="en-US" smtClean="0"/>
-              <a:t>3/15/2025</a:t>
+              <a:t>3/20/2025</a:t>
             </a:fld>
             <a:endParaRPr lang="en-US" dirty="0"/>
           </a:p>
@@ -12947,7 +12948,7 @@
           <a:p>
             <a:fld id="{DEAE2368-4D5B-4100-AD00-D730DAA20AC8}" type="datetime1">
               <a:rPr lang="en-US" smtClean="0"/>
-              <a:t>3/15/2025</a:t>
+              <a:t>3/20/2025</a:t>
             </a:fld>
             <a:endParaRPr lang="en-US" dirty="0"/>
           </a:p>
@@ -13001,6 +13002,177 @@
 </file>
 
 <file path=ppt/slides/slide10.xml><?xml version="1.0" encoding="utf-8"?>
+<p:sld xmlns:a="http://schemas.openxmlformats.org/drawingml/2006/main" xmlns:r="http://schemas.openxmlformats.org/officeDocument/2006/relationships" xmlns:p="http://schemas.openxmlformats.org/presentationml/2006/main">
+  <p:cSld>
+    <p:spTree>
+      <p:nvGrpSpPr>
+        <p:cNvPr id="1" name=""/>
+        <p:cNvGrpSpPr/>
+        <p:nvPr/>
+      </p:nvGrpSpPr>
+      <p:grpSpPr>
+        <a:xfrm>
+          <a:off x="0" y="0"/>
+          <a:ext cx="0" cy="0"/>
+          <a:chOff x="0" y="0"/>
+          <a:chExt cx="0" cy="0"/>
+        </a:xfrm>
+      </p:grpSpPr>
+      <p:sp>
+        <p:nvSpPr>
+          <p:cNvPr id="2" name="Title 1">
+            <a:extLst>
+              <a:ext uri="{FF2B5EF4-FFF2-40B4-BE49-F238E27FC236}">
+                <a16:creationId xmlns:a16="http://schemas.microsoft.com/office/drawing/2014/main" id="{3FC37284-D37A-C4A9-2B33-07849096E2B7}"/>
+              </a:ext>
+            </a:extLst>
+          </p:cNvPr>
+          <p:cNvSpPr>
+            <a:spLocks noGrp="1"/>
+          </p:cNvSpPr>
+          <p:nvPr>
+            <p:ph type="title"/>
+          </p:nvPr>
+        </p:nvSpPr>
+        <p:spPr/>
+        <p:txBody>
+          <a:bodyPr>
+            <a:normAutofit fontScale="90000"/>
+          </a:bodyPr>
+          <a:lstStyle/>
+          <a:p>
+            <a:r>
+              <a:rPr lang="en-US" dirty="0">
+                <a:solidFill>
+                  <a:schemeClr val="bg1"/>
+                </a:solidFill>
+              </a:rPr>
+              <a:t>Demonstration SAG-CTR Dashboard </a:t>
+            </a:r>
+            <a:br>
+              <a:rPr lang="en-US" dirty="0">
+                <a:solidFill>
+                  <a:schemeClr val="bg1"/>
+                </a:solidFill>
+              </a:rPr>
+            </a:br>
+            <a:r>
+              <a:rPr lang="en-US" dirty="0">
+                <a:solidFill>
+                  <a:schemeClr val="bg1"/>
+                </a:solidFill>
+              </a:rPr>
+              <a:t>(Sharing Risk Assessments For Trusted Products)</a:t>
+            </a:r>
+          </a:p>
+        </p:txBody>
+      </p:sp>
+      <p:sp>
+        <p:nvSpPr>
+          <p:cNvPr id="3" name="Content Placeholder 2">
+            <a:extLst>
+              <a:ext uri="{FF2B5EF4-FFF2-40B4-BE49-F238E27FC236}">
+                <a16:creationId xmlns:a16="http://schemas.microsoft.com/office/drawing/2014/main" id="{B13470FE-8AD9-5012-B494-6CD66EA623C5}"/>
+              </a:ext>
+            </a:extLst>
+          </p:cNvPr>
+          <p:cNvSpPr>
+            <a:spLocks noGrp="1"/>
+          </p:cNvSpPr>
+          <p:nvPr>
+            <p:ph idx="1"/>
+          </p:nvPr>
+        </p:nvSpPr>
+        <p:spPr/>
+        <p:txBody>
+          <a:bodyPr/>
+          <a:lstStyle/>
+          <a:p>
+            <a:r>
+              <a:rPr lang="en-US" dirty="0">
+                <a:hlinkClick r:id="rId2"/>
+              </a:rPr>
+              <a:t>https://softwareassuranceguardian.com/SAGCTR/</a:t>
+            </a:r>
+            <a:r>
+              <a:rPr lang="en-US" dirty="0"/>
+              <a:t> </a:t>
+            </a:r>
+          </a:p>
+        </p:txBody>
+      </p:sp>
+      <p:sp>
+        <p:nvSpPr>
+          <p:cNvPr id="4" name="Date Placeholder 3">
+            <a:extLst>
+              <a:ext uri="{FF2B5EF4-FFF2-40B4-BE49-F238E27FC236}">
+                <a16:creationId xmlns:a16="http://schemas.microsoft.com/office/drawing/2014/main" id="{A81BAD4F-BA89-B4E6-16A6-09C0EE129055}"/>
+              </a:ext>
+            </a:extLst>
+          </p:cNvPr>
+          <p:cNvSpPr>
+            <a:spLocks noGrp="1"/>
+          </p:cNvSpPr>
+          <p:nvPr>
+            <p:ph type="dt" sz="half" idx="10"/>
+          </p:nvPr>
+        </p:nvSpPr>
+        <p:spPr/>
+        <p:txBody>
+          <a:bodyPr/>
+          <a:lstStyle/>
+          <a:p>
+            <a:fld id="{8EE2707C-063E-46D3-BE25-A9A8D80E43A6}" type="datetime1">
+              <a:rPr lang="en-US" smtClean="0"/>
+              <a:t>3/20/2025</a:t>
+            </a:fld>
+            <a:endParaRPr lang="en-US" dirty="0"/>
+          </a:p>
+        </p:txBody>
+      </p:sp>
+      <p:sp>
+        <p:nvSpPr>
+          <p:cNvPr id="5" name="Footer Placeholder 4">
+            <a:extLst>
+              <a:ext uri="{FF2B5EF4-FFF2-40B4-BE49-F238E27FC236}">
+                <a16:creationId xmlns:a16="http://schemas.microsoft.com/office/drawing/2014/main" id="{A6B07A7A-7099-6585-24DA-54895F6E24C6}"/>
+              </a:ext>
+            </a:extLst>
+          </p:cNvPr>
+          <p:cNvSpPr>
+            <a:spLocks noGrp="1"/>
+          </p:cNvSpPr>
+          <p:nvPr>
+            <p:ph type="ftr" sz="quarter" idx="11"/>
+          </p:nvPr>
+        </p:nvSpPr>
+        <p:spPr/>
+        <p:txBody>
+          <a:bodyPr/>
+          <a:lstStyle/>
+          <a:p>
+            <a:r>
+              <a:rPr lang="en-US"/>
+              <a:t>Copyright Business Cyber Guardian™ (BCG) 2018-2025</a:t>
+            </a:r>
+            <a:endParaRPr lang="en-US" dirty="0"/>
+          </a:p>
+        </p:txBody>
+      </p:sp>
+    </p:spTree>
+    <p:extLst>
+      <p:ext uri="{BB962C8B-B14F-4D97-AF65-F5344CB8AC3E}">
+        <p14:creationId xmlns:p14="http://schemas.microsoft.com/office/powerpoint/2010/main" val="2942809789"/>
+      </p:ext>
+    </p:extLst>
+  </p:cSld>
+  <p:clrMapOvr>
+    <a:masterClrMapping/>
+  </p:clrMapOvr>
+</p:sld>
+</file>
+
+<file path=ppt/slides/slide11.xml><?xml version="1.0" encoding="utf-8"?>
 <p:sld xmlns:a="http://schemas.openxmlformats.org/drawingml/2006/main" xmlns:r="http://schemas.openxmlformats.org/officeDocument/2006/relationships" xmlns:p="http://schemas.openxmlformats.org/presentationml/2006/main">
   <p:cSld>
     <p:spTree>
@@ -13040,7 +13212,7 @@
           <a:p>
             <a:fld id="{8EE2707C-063E-46D3-BE25-A9A8D80E43A6}" type="datetime1">
               <a:rPr lang="en-US" smtClean="0"/>
-              <a:t>3/15/2025</a:t>
+              <a:t>3/20/2025</a:t>
             </a:fld>
             <a:endParaRPr lang="en-US" dirty="0"/>
           </a:p>
@@ -13118,7 +13290,7 @@
 </p:sld>
 </file>
 
-<file path=ppt/slides/slide11.xml><?xml version="1.0" encoding="utf-8"?>
+<file path=ppt/slides/slide12.xml><?xml version="1.0" encoding="utf-8"?>
 <p:sld xmlns:a="http://schemas.openxmlformats.org/drawingml/2006/main" xmlns:r="http://schemas.openxmlformats.org/officeDocument/2006/relationships" xmlns:p="http://schemas.openxmlformats.org/presentationml/2006/main">
   <p:cSld>
     <p:spTree>
@@ -13195,7 +13367,7 @@
           <a:p>
             <a:fld id="{8EE2707C-063E-46D3-BE25-A9A8D80E43A6}" type="datetime1">
               <a:rPr lang="en-US" smtClean="0"/>
-              <a:t>3/15/2025</a:t>
+              <a:t>3/20/2025</a:t>
             </a:fld>
             <a:endParaRPr lang="en-US" dirty="0"/>
           </a:p>
@@ -13273,7 +13445,7 @@
 </p:sld>
 </file>
 
-<file path=ppt/slides/slide12.xml><?xml version="1.0" encoding="utf-8"?>
+<file path=ppt/slides/slide13.xml><?xml version="1.0" encoding="utf-8"?>
 <p:sld xmlns:a="http://schemas.openxmlformats.org/drawingml/2006/main" xmlns:r="http://schemas.openxmlformats.org/officeDocument/2006/relationships" xmlns:p="http://schemas.openxmlformats.org/presentationml/2006/main">
   <p:cSld>
     <p:spTree>
@@ -13607,7 +13779,7 @@
                   <a:schemeClr val="bg1"/>
                 </a:solidFill>
               </a:rPr>
-              <a:t>3/15/2025</a:t>
+              <a:t>3/20/2025</a:t>
             </a:fld>
             <a:endParaRPr lang="en-US" dirty="0">
               <a:solidFill>
@@ -13662,7 +13834,7 @@
 </p:sld>
 </file>
 
-<file path=ppt/slides/slide13.xml><?xml version="1.0" encoding="utf-8"?>
+<file path=ppt/slides/slide14.xml><?xml version="1.0" encoding="utf-8"?>
 <p:sld xmlns:a="http://schemas.openxmlformats.org/drawingml/2006/main" xmlns:r="http://schemas.openxmlformats.org/officeDocument/2006/relationships" xmlns:p="http://schemas.openxmlformats.org/presentationml/2006/main">
   <p:cSld>
     <p:spTree>
@@ -13702,7 +13874,7 @@
           <a:p>
             <a:fld id="{8EE2707C-063E-46D3-BE25-A9A8D80E43A6}" type="datetime1">
               <a:rPr lang="en-US" smtClean="0"/>
-              <a:t>3/15/2025</a:t>
+              <a:t>3/20/2025</a:t>
             </a:fld>
             <a:endParaRPr lang="en-US" dirty="0"/>
           </a:p>
@@ -14028,7 +14200,7 @@
                   <a:schemeClr val="bg1"/>
                 </a:solidFill>
               </a:rPr>
-              <a:t>3/15/2025</a:t>
+              <a:t>3/20/2025</a:t>
             </a:fld>
             <a:endParaRPr lang="en-US" dirty="0">
               <a:solidFill>
@@ -14338,7 +14510,7 @@
                   <a:schemeClr val="bg1"/>
                 </a:solidFill>
               </a:rPr>
-              <a:t>3/15/2025</a:t>
+              <a:t>3/20/2025</a:t>
             </a:fld>
             <a:endParaRPr lang="en-US" dirty="0">
               <a:solidFill>
@@ -14703,7 +14875,7 @@
                   <a:schemeClr val="bg1"/>
                 </a:solidFill>
               </a:rPr>
-              <a:t>3/15/2025</a:t>
+              <a:t>3/20/2025</a:t>
             </a:fld>
             <a:endParaRPr lang="en-US" dirty="0">
               <a:solidFill>
@@ -14764,6 +14936,228 @@
 </file>
 
 <file path=ppt/slides/slide5.xml><?xml version="1.0" encoding="utf-8"?>
+<p:sld xmlns:a="http://schemas.openxmlformats.org/drawingml/2006/main" xmlns:r="http://schemas.openxmlformats.org/officeDocument/2006/relationships" xmlns:p="http://schemas.openxmlformats.org/presentationml/2006/main">
+  <p:cSld>
+    <p:spTree>
+      <p:nvGrpSpPr>
+        <p:cNvPr id="1" name=""/>
+        <p:cNvGrpSpPr/>
+        <p:nvPr/>
+      </p:nvGrpSpPr>
+      <p:grpSpPr>
+        <a:xfrm>
+          <a:off x="0" y="0"/>
+          <a:ext cx="0" cy="0"/>
+          <a:chOff x="0" y="0"/>
+          <a:chExt cx="0" cy="0"/>
+        </a:xfrm>
+      </p:grpSpPr>
+      <p:sp>
+        <p:nvSpPr>
+          <p:cNvPr id="2" name="Title 1">
+            <a:extLst>
+              <a:ext uri="{FF2B5EF4-FFF2-40B4-BE49-F238E27FC236}">
+                <a16:creationId xmlns:a16="http://schemas.microsoft.com/office/drawing/2014/main" id="{A6E2C9BA-C71B-F0F6-74BC-2C35110CBC6C}"/>
+              </a:ext>
+            </a:extLst>
+          </p:cNvPr>
+          <p:cNvSpPr>
+            <a:spLocks noGrp="1"/>
+          </p:cNvSpPr>
+          <p:nvPr>
+            <p:ph type="title"/>
+          </p:nvPr>
+        </p:nvSpPr>
+        <p:spPr>
+          <a:xfrm>
+            <a:off x="1141413" y="115410"/>
+            <a:ext cx="9905998" cy="807868"/>
+          </a:xfrm>
+        </p:spPr>
+        <p:txBody>
+          <a:bodyPr/>
+          <a:lstStyle/>
+          <a:p>
+            <a:r>
+              <a:rPr lang="en-US" dirty="0">
+                <a:solidFill>
+                  <a:schemeClr val="bg1"/>
+                </a:solidFill>
+              </a:rPr>
+              <a:t>DOD Also </a:t>
+            </a:r>
+            <a:r>
+              <a:rPr lang="en-US" dirty="0" err="1">
+                <a:solidFill>
+                  <a:schemeClr val="bg1"/>
+                </a:solidFill>
+              </a:rPr>
+              <a:t>uSing</a:t>
+            </a:r>
+            <a:r>
+              <a:rPr lang="en-US" dirty="0">
+                <a:solidFill>
+                  <a:schemeClr val="bg1"/>
+                </a:solidFill>
+              </a:rPr>
+              <a:t> trust scores in </a:t>
+            </a:r>
+            <a:r>
+              <a:rPr lang="en-US" dirty="0" err="1">
+                <a:solidFill>
+                  <a:schemeClr val="bg1"/>
+                </a:solidFill>
+              </a:rPr>
+              <a:t>cmmc</a:t>
+            </a:r>
+            <a:endParaRPr lang="en-US" dirty="0">
+              <a:solidFill>
+                <a:schemeClr val="bg1"/>
+              </a:solidFill>
+            </a:endParaRPr>
+          </a:p>
+        </p:txBody>
+      </p:sp>
+      <p:sp>
+        <p:nvSpPr>
+          <p:cNvPr id="4" name="Date Placeholder 3">
+            <a:extLst>
+              <a:ext uri="{FF2B5EF4-FFF2-40B4-BE49-F238E27FC236}">
+                <a16:creationId xmlns:a16="http://schemas.microsoft.com/office/drawing/2014/main" id="{0AD31ED8-79B7-BE72-D003-F806EE46CF28}"/>
+              </a:ext>
+            </a:extLst>
+          </p:cNvPr>
+          <p:cNvSpPr>
+            <a:spLocks noGrp="1"/>
+          </p:cNvSpPr>
+          <p:nvPr>
+            <p:ph type="dt" sz="half" idx="10"/>
+          </p:nvPr>
+        </p:nvSpPr>
+        <p:spPr/>
+        <p:txBody>
+          <a:bodyPr/>
+          <a:lstStyle/>
+          <a:p>
+            <a:fld id="{8EE2707C-063E-46D3-BE25-A9A8D80E43A6}" type="datetime1">
+              <a:rPr lang="en-US" smtClean="0"/>
+              <a:t>3/20/2025</a:t>
+            </a:fld>
+            <a:endParaRPr lang="en-US" dirty="0"/>
+          </a:p>
+        </p:txBody>
+      </p:sp>
+      <p:sp>
+        <p:nvSpPr>
+          <p:cNvPr id="5" name="Footer Placeholder 4">
+            <a:extLst>
+              <a:ext uri="{FF2B5EF4-FFF2-40B4-BE49-F238E27FC236}">
+                <a16:creationId xmlns:a16="http://schemas.microsoft.com/office/drawing/2014/main" id="{095AC3FC-997D-12DB-8605-316CE013DBBA}"/>
+              </a:ext>
+            </a:extLst>
+          </p:cNvPr>
+          <p:cNvSpPr>
+            <a:spLocks noGrp="1"/>
+          </p:cNvSpPr>
+          <p:nvPr>
+            <p:ph type="ftr" sz="quarter" idx="11"/>
+          </p:nvPr>
+        </p:nvSpPr>
+        <p:spPr/>
+        <p:txBody>
+          <a:bodyPr/>
+          <a:lstStyle/>
+          <a:p>
+            <a:r>
+              <a:rPr lang="en-US"/>
+              <a:t>Copyright Business Cyber Guardian™ (BCG) 2018-2025</a:t>
+            </a:r>
+            <a:endParaRPr lang="en-US" dirty="0"/>
+          </a:p>
+        </p:txBody>
+      </p:sp>
+      <p:pic>
+        <p:nvPicPr>
+          <p:cNvPr id="7" name="Picture 6">
+            <a:extLst>
+              <a:ext uri="{FF2B5EF4-FFF2-40B4-BE49-F238E27FC236}">
+                <a16:creationId xmlns:a16="http://schemas.microsoft.com/office/drawing/2014/main" id="{01CC82C1-C197-82DD-742E-FCBBD02BDDF6}"/>
+              </a:ext>
+            </a:extLst>
+          </p:cNvPr>
+          <p:cNvPicPr>
+            <a:picLocks noChangeAspect="1"/>
+          </p:cNvPicPr>
+          <p:nvPr/>
+        </p:nvPicPr>
+        <p:blipFill>
+          <a:blip r:embed="rId2"/>
+          <a:stretch>
+            <a:fillRect/>
+          </a:stretch>
+        </p:blipFill>
+        <p:spPr>
+          <a:xfrm>
+            <a:off x="1624615" y="727944"/>
+            <a:ext cx="8016535" cy="4842594"/>
+          </a:xfrm>
+          <a:prstGeom prst="rect">
+            <a:avLst/>
+          </a:prstGeom>
+        </p:spPr>
+      </p:pic>
+      <p:sp>
+        <p:nvSpPr>
+          <p:cNvPr id="8" name="TextBox 7">
+            <a:extLst>
+              <a:ext uri="{FF2B5EF4-FFF2-40B4-BE49-F238E27FC236}">
+                <a16:creationId xmlns:a16="http://schemas.microsoft.com/office/drawing/2014/main" id="{7DAEBE83-D681-FE2C-B0B2-A104A3B05E82}"/>
+              </a:ext>
+            </a:extLst>
+          </p:cNvPr>
+          <p:cNvSpPr txBox="1"/>
+          <p:nvPr/>
+        </p:nvSpPr>
+        <p:spPr>
+          <a:xfrm>
+            <a:off x="887764" y="5530790"/>
+            <a:ext cx="10326097" cy="369332"/>
+          </a:xfrm>
+          <a:prstGeom prst="rect">
+            <a:avLst/>
+          </a:prstGeom>
+          <a:noFill/>
+        </p:spPr>
+        <p:txBody>
+          <a:bodyPr wrap="none" rtlCol="0">
+            <a:spAutoFit/>
+          </a:bodyPr>
+          <a:lstStyle/>
+          <a:p>
+            <a:r>
+              <a:rPr lang="en-US" dirty="0">
+                <a:hlinkClick r:id="rId3"/>
+              </a:rPr>
+              <a:t>https://insidecybersecurity.com/sites/insidecybersecurity.com/files/documents/2025/mar/cs2025_0066a.pdf</a:t>
+            </a:r>
+            <a:endParaRPr lang="en-US" dirty="0"/>
+          </a:p>
+        </p:txBody>
+      </p:sp>
+    </p:spTree>
+    <p:extLst>
+      <p:ext uri="{BB962C8B-B14F-4D97-AF65-F5344CB8AC3E}">
+        <p14:creationId xmlns:p14="http://schemas.microsoft.com/office/powerpoint/2010/main" val="1032211655"/>
+      </p:ext>
+    </p:extLst>
+  </p:cSld>
+  <p:clrMapOvr>
+    <a:masterClrMapping/>
+  </p:clrMapOvr>
+</p:sld>
+</file>
+
+<file path=ppt/slides/slide6.xml><?xml version="1.0" encoding="utf-8"?>
 <p:sld xmlns:a="http://schemas.openxmlformats.org/drawingml/2006/main" xmlns:r="http://schemas.openxmlformats.org/officeDocument/2006/relationships" xmlns:p="http://schemas.openxmlformats.org/presentationml/2006/main">
   <p:cSld>
     <p:spTree>
@@ -14803,7 +15197,7 @@
           <a:p>
             <a:fld id="{8EE2707C-063E-46D3-BE25-A9A8D80E43A6}" type="datetime1">
               <a:rPr lang="en-US" smtClean="0"/>
-              <a:t>3/15/2025</a:t>
+              <a:t>3/20/2025</a:t>
             </a:fld>
             <a:endParaRPr lang="en-US" dirty="0"/>
           </a:p>
@@ -15034,7 +15428,7 @@
             <a:fld id="{8F422B43-45D4-4608-9F03-122930498C43}" type="datetime1">
               <a:rPr lang="en-US" smtClean="0"/>
               <a:pPr/>
-              <a:t>3/15/2025</a:t>
+              <a:t>3/20/2025</a:t>
             </a:fld>
             <a:endParaRPr lang="en-US" dirty="0"/>
           </a:p>
@@ -15068,7 +15462,7 @@
           <a:p>
             <a:fld id="{6D22F896-40B5-4ADD-8801-0D06FADFA095}" type="slidenum">
               <a:rPr lang="en-US" smtClean="0"/>
-              <a:t>5</a:t>
+              <a:t>6</a:t>
             </a:fld>
             <a:endParaRPr lang="en-US" dirty="0"/>
           </a:p>
@@ -15286,7 +15680,7 @@
 </p:sld>
 </file>
 
-<file path=ppt/slides/slide6.xml><?xml version="1.0" encoding="utf-8"?>
+<file path=ppt/slides/slide7.xml><?xml version="1.0" encoding="utf-8"?>
 <p:sld xmlns:a="http://schemas.openxmlformats.org/drawingml/2006/main" xmlns:r="http://schemas.openxmlformats.org/officeDocument/2006/relationships" xmlns:p="http://schemas.openxmlformats.org/presentationml/2006/main">
   <p:cSld>
     <p:spTree>
@@ -15614,7 +16008,7 @@
                   <a:schemeClr val="bg1"/>
                 </a:solidFill>
               </a:rPr>
-              <a:t>3/15/2025</a:t>
+              <a:t>3/20/2025</a:t>
             </a:fld>
             <a:endParaRPr lang="en-US" dirty="0">
               <a:solidFill>
@@ -15669,7 +16063,7 @@
 </p:sld>
 </file>
 
-<file path=ppt/slides/slide7.xml><?xml version="1.0" encoding="utf-8"?>
+<file path=ppt/slides/slide8.xml><?xml version="1.0" encoding="utf-8"?>
 <p:sld xmlns:a="http://schemas.openxmlformats.org/drawingml/2006/main" xmlns:r="http://schemas.openxmlformats.org/officeDocument/2006/relationships" xmlns:p="http://schemas.openxmlformats.org/presentationml/2006/main">
   <p:cSld>
     <p:spTree>
@@ -15737,7 +16131,7 @@
           <a:p>
             <a:fld id="{8EE2707C-063E-46D3-BE25-A9A8D80E43A6}" type="datetime1">
               <a:rPr lang="en-US" smtClean="0"/>
-              <a:t>3/15/2025</a:t>
+              <a:t>3/20/2025</a:t>
             </a:fld>
             <a:endParaRPr lang="en-US" dirty="0"/>
           </a:p>
@@ -15887,7 +16281,7 @@
 </p:sld>
 </file>
 
-<file path=ppt/slides/slide8.xml><?xml version="1.0" encoding="utf-8"?>
+<file path=ppt/slides/slide9.xml><?xml version="1.0" encoding="utf-8"?>
 <p:sld xmlns:a="http://schemas.openxmlformats.org/drawingml/2006/main" xmlns:r="http://schemas.openxmlformats.org/officeDocument/2006/relationships" xmlns:p="http://schemas.openxmlformats.org/presentationml/2006/main">
   <p:cSld>
     <p:spTree>
@@ -15960,7 +16354,7 @@
           <a:p>
             <a:fld id="{8EE2707C-063E-46D3-BE25-A9A8D80E43A6}" type="datetime1">
               <a:rPr lang="en-US" smtClean="0"/>
-              <a:t>3/15/2025</a:t>
+              <a:t>3/20/2025</a:t>
             </a:fld>
             <a:endParaRPr lang="en-US" dirty="0"/>
           </a:p>
@@ -16089,177 +16483,6 @@
     <p:extLst>
       <p:ext uri="{BB962C8B-B14F-4D97-AF65-F5344CB8AC3E}">
         <p14:creationId xmlns:p14="http://schemas.microsoft.com/office/powerpoint/2010/main" val="2980600175"/>
-      </p:ext>
-    </p:extLst>
-  </p:cSld>
-  <p:clrMapOvr>
-    <a:masterClrMapping/>
-  </p:clrMapOvr>
-</p:sld>
-</file>
-
-<file path=ppt/slides/slide9.xml><?xml version="1.0" encoding="utf-8"?>
-<p:sld xmlns:a="http://schemas.openxmlformats.org/drawingml/2006/main" xmlns:r="http://schemas.openxmlformats.org/officeDocument/2006/relationships" xmlns:p="http://schemas.openxmlformats.org/presentationml/2006/main">
-  <p:cSld>
-    <p:spTree>
-      <p:nvGrpSpPr>
-        <p:cNvPr id="1" name=""/>
-        <p:cNvGrpSpPr/>
-        <p:nvPr/>
-      </p:nvGrpSpPr>
-      <p:grpSpPr>
-        <a:xfrm>
-          <a:off x="0" y="0"/>
-          <a:ext cx="0" cy="0"/>
-          <a:chOff x="0" y="0"/>
-          <a:chExt cx="0" cy="0"/>
-        </a:xfrm>
-      </p:grpSpPr>
-      <p:sp>
-        <p:nvSpPr>
-          <p:cNvPr id="2" name="Title 1">
-            <a:extLst>
-              <a:ext uri="{FF2B5EF4-FFF2-40B4-BE49-F238E27FC236}">
-                <a16:creationId xmlns:a16="http://schemas.microsoft.com/office/drawing/2014/main" id="{3FC37284-D37A-C4A9-2B33-07849096E2B7}"/>
-              </a:ext>
-            </a:extLst>
-          </p:cNvPr>
-          <p:cNvSpPr>
-            <a:spLocks noGrp="1"/>
-          </p:cNvSpPr>
-          <p:nvPr>
-            <p:ph type="title"/>
-          </p:nvPr>
-        </p:nvSpPr>
-        <p:spPr/>
-        <p:txBody>
-          <a:bodyPr>
-            <a:normAutofit fontScale="90000"/>
-          </a:bodyPr>
-          <a:lstStyle/>
-          <a:p>
-            <a:r>
-              <a:rPr lang="en-US" dirty="0">
-                <a:solidFill>
-                  <a:schemeClr val="bg1"/>
-                </a:solidFill>
-              </a:rPr>
-              <a:t>Demonstration SAG-CTR Dashboard </a:t>
-            </a:r>
-            <a:br>
-              <a:rPr lang="en-US" dirty="0">
-                <a:solidFill>
-                  <a:schemeClr val="bg1"/>
-                </a:solidFill>
-              </a:rPr>
-            </a:br>
-            <a:r>
-              <a:rPr lang="en-US" dirty="0">
-                <a:solidFill>
-                  <a:schemeClr val="bg1"/>
-                </a:solidFill>
-              </a:rPr>
-              <a:t>(Sharing Risk Assessments For Trusted Products)</a:t>
-            </a:r>
-          </a:p>
-        </p:txBody>
-      </p:sp>
-      <p:sp>
-        <p:nvSpPr>
-          <p:cNvPr id="3" name="Content Placeholder 2">
-            <a:extLst>
-              <a:ext uri="{FF2B5EF4-FFF2-40B4-BE49-F238E27FC236}">
-                <a16:creationId xmlns:a16="http://schemas.microsoft.com/office/drawing/2014/main" id="{B13470FE-8AD9-5012-B494-6CD66EA623C5}"/>
-              </a:ext>
-            </a:extLst>
-          </p:cNvPr>
-          <p:cNvSpPr>
-            <a:spLocks noGrp="1"/>
-          </p:cNvSpPr>
-          <p:nvPr>
-            <p:ph idx="1"/>
-          </p:nvPr>
-        </p:nvSpPr>
-        <p:spPr/>
-        <p:txBody>
-          <a:bodyPr/>
-          <a:lstStyle/>
-          <a:p>
-            <a:r>
-              <a:rPr lang="en-US" dirty="0">
-                <a:hlinkClick r:id="rId2"/>
-              </a:rPr>
-              <a:t>https://softwareassuranceguardian.com/SAGCTR/</a:t>
-            </a:r>
-            <a:r>
-              <a:rPr lang="en-US" dirty="0"/>
-              <a:t> </a:t>
-            </a:r>
-          </a:p>
-        </p:txBody>
-      </p:sp>
-      <p:sp>
-        <p:nvSpPr>
-          <p:cNvPr id="4" name="Date Placeholder 3">
-            <a:extLst>
-              <a:ext uri="{FF2B5EF4-FFF2-40B4-BE49-F238E27FC236}">
-                <a16:creationId xmlns:a16="http://schemas.microsoft.com/office/drawing/2014/main" id="{A81BAD4F-BA89-B4E6-16A6-09C0EE129055}"/>
-              </a:ext>
-            </a:extLst>
-          </p:cNvPr>
-          <p:cNvSpPr>
-            <a:spLocks noGrp="1"/>
-          </p:cNvSpPr>
-          <p:nvPr>
-            <p:ph type="dt" sz="half" idx="10"/>
-          </p:nvPr>
-        </p:nvSpPr>
-        <p:spPr/>
-        <p:txBody>
-          <a:bodyPr/>
-          <a:lstStyle/>
-          <a:p>
-            <a:fld id="{8EE2707C-063E-46D3-BE25-A9A8D80E43A6}" type="datetime1">
-              <a:rPr lang="en-US" smtClean="0"/>
-              <a:t>3/15/2025</a:t>
-            </a:fld>
-            <a:endParaRPr lang="en-US" dirty="0"/>
-          </a:p>
-        </p:txBody>
-      </p:sp>
-      <p:sp>
-        <p:nvSpPr>
-          <p:cNvPr id="5" name="Footer Placeholder 4">
-            <a:extLst>
-              <a:ext uri="{FF2B5EF4-FFF2-40B4-BE49-F238E27FC236}">
-                <a16:creationId xmlns:a16="http://schemas.microsoft.com/office/drawing/2014/main" id="{A6B07A7A-7099-6585-24DA-54895F6E24C6}"/>
-              </a:ext>
-            </a:extLst>
-          </p:cNvPr>
-          <p:cNvSpPr>
-            <a:spLocks noGrp="1"/>
-          </p:cNvSpPr>
-          <p:nvPr>
-            <p:ph type="ftr" sz="quarter" idx="11"/>
-          </p:nvPr>
-        </p:nvSpPr>
-        <p:spPr/>
-        <p:txBody>
-          <a:bodyPr/>
-          <a:lstStyle/>
-          <a:p>
-            <a:r>
-              <a:rPr lang="en-US"/>
-              <a:t>Copyright Business Cyber Guardian™ (BCG) 2018-2025</a:t>
-            </a:r>
-            <a:endParaRPr lang="en-US" dirty="0"/>
-          </a:p>
-        </p:txBody>
-      </p:sp>
-    </p:spTree>
-    <p:extLst>
-      <p:ext uri="{BB962C8B-B14F-4D97-AF65-F5344CB8AC3E}">
-        <p14:creationId xmlns:p14="http://schemas.microsoft.com/office/powerpoint/2010/main" val="2942809789"/>
       </p:ext>
     </p:extLst>
   </p:cSld>

</xml_diff>